<commit_message>
add link to git
</commit_message>
<xml_diff>
--- a/reports/2023_403_БогатыреваВО_slides.pptx
+++ b/reports/2023_403_БогатыреваВО_slides.pptx
@@ -2,7 +2,7 @@
 <file path=ppt/presentation.xml><?xml version="1.0" encoding="utf-8"?>
 <p:presentation xmlns:a="http://schemas.openxmlformats.org/drawingml/2006/main" xmlns:r="http://schemas.openxmlformats.org/officeDocument/2006/relationships" xmlns:p="http://schemas.openxmlformats.org/presentationml/2006/main" saveSubsetFonts="1">
   <p:sldMasterIdLst>
-    <p:sldMasterId id="2147483648" r:id="rId1"/>
+    <p:sldMasterId id="2147483660" r:id="rId1"/>
   </p:sldMasterIdLst>
   <p:notesMasterIdLst>
     <p:notesMasterId r:id="rId20"/>
@@ -27,7 +27,7 @@
     <p:sldId id="272" r:id="rId18"/>
     <p:sldId id="273" r:id="rId19"/>
   </p:sldIdLst>
-  <p:sldSz cx="12192000" cy="6858000"/>
+  <p:sldSz cx="9144000" cy="6858000" type="screen4x3"/>
   <p:notesSz cx="6858000" cy="9144000"/>
   <p:defaultTextStyle>
     <a:defPPr>
@@ -214,7 +214,7 @@
           <a:p>
             <a:fld id="{7DEDA2BB-1C5C-4526-95E5-77A988EF9EA2}" type="datetimeFigureOut">
               <a:rPr lang="ru-RU" smtClean="0"/>
-              <a:t>17.05.2023</a:t>
+              <a:t>23.05.2023</a:t>
             </a:fld>
             <a:endParaRPr lang="ru-RU"/>
           </a:p>
@@ -232,8 +232,8 @@
         </p:nvSpPr>
         <p:spPr>
           <a:xfrm>
-            <a:off x="685800" y="1143000"/>
-            <a:ext cx="5486400" cy="3086100"/>
+            <a:off x="1371600" y="1143000"/>
+            <a:ext cx="4114800" cy="3086100"/>
           </a:xfrm>
           <a:prstGeom prst="rect">
             <a:avLst/>
@@ -509,7 +509,12 @@
             <p:ph type="sldImg"/>
           </p:nvPr>
         </p:nvSpPr>
-        <p:spPr/>
+        <p:spPr>
+          <a:xfrm>
+            <a:off x="1371600" y="1143000"/>
+            <a:ext cx="4114800" cy="3086100"/>
+          </a:xfrm>
+        </p:spPr>
       </p:sp>
       <p:sp>
         <p:nvSpPr>
@@ -742,6 +747,90 @@
     <p:extLst>
       <p:ext uri="{BB962C8B-B14F-4D97-AF65-F5344CB8AC3E}">
         <p14:creationId xmlns:p14="http://schemas.microsoft.com/office/powerpoint/2010/main" val="3610655931"/>
+      </p:ext>
+    </p:extLst>
+  </p:cSld>
+  <p:clrMapOvr>
+    <a:masterClrMapping/>
+  </p:clrMapOvr>
+</p:notes>
+</file>
+
+<file path=ppt/notesSlides/notesSlide2.xml><?xml version="1.0" encoding="utf-8"?>
+<p:notes xmlns:a="http://schemas.openxmlformats.org/drawingml/2006/main" xmlns:r="http://schemas.openxmlformats.org/officeDocument/2006/relationships" xmlns:p="http://schemas.openxmlformats.org/presentationml/2006/main">
+  <p:cSld>
+    <p:spTree>
+      <p:nvGrpSpPr>
+        <p:cNvPr id="1" name=""/>
+        <p:cNvGrpSpPr/>
+        <p:nvPr/>
+      </p:nvGrpSpPr>
+      <p:grpSpPr>
+        <a:xfrm>
+          <a:off x="0" y="0"/>
+          <a:ext cx="0" cy="0"/>
+          <a:chOff x="0" y="0"/>
+          <a:chExt cx="0" cy="0"/>
+        </a:xfrm>
+      </p:grpSpPr>
+      <p:sp>
+        <p:nvSpPr>
+          <p:cNvPr id="2" name="Образ слайда 1"/>
+          <p:cNvSpPr>
+            <a:spLocks noGrp="1" noRot="1" noChangeAspect="1"/>
+          </p:cNvSpPr>
+          <p:nvPr>
+            <p:ph type="sldImg"/>
+          </p:nvPr>
+        </p:nvSpPr>
+        <p:spPr/>
+      </p:sp>
+      <p:sp>
+        <p:nvSpPr>
+          <p:cNvPr id="3" name="Заметки 2"/>
+          <p:cNvSpPr>
+            <a:spLocks noGrp="1"/>
+          </p:cNvSpPr>
+          <p:nvPr>
+            <p:ph type="body" idx="1"/>
+          </p:nvPr>
+        </p:nvSpPr>
+        <p:spPr/>
+        <p:txBody>
+          <a:bodyPr/>
+          <a:lstStyle/>
+          <a:p>
+            <a:endParaRPr lang="ru-RU" dirty="0"/>
+          </a:p>
+        </p:txBody>
+      </p:sp>
+      <p:sp>
+        <p:nvSpPr>
+          <p:cNvPr id="4" name="Номер слайда 3"/>
+          <p:cNvSpPr>
+            <a:spLocks noGrp="1"/>
+          </p:cNvSpPr>
+          <p:nvPr>
+            <p:ph type="sldNum" sz="quarter" idx="10"/>
+          </p:nvPr>
+        </p:nvSpPr>
+        <p:spPr/>
+        <p:txBody>
+          <a:bodyPr/>
+          <a:lstStyle/>
+          <a:p>
+            <a:fld id="{BEC7A95C-97CA-431A-AE49-B22A2B1CD0AD}" type="slidenum">
+              <a:rPr lang="ru-RU" smtClean="0"/>
+              <a:t>12</a:t>
+            </a:fld>
+            <a:endParaRPr lang="ru-RU"/>
+          </a:p>
+        </p:txBody>
+      </p:sp>
+    </p:spTree>
+    <p:extLst>
+      <p:ext uri="{BB962C8B-B14F-4D97-AF65-F5344CB8AC3E}">
+        <p14:creationId xmlns:p14="http://schemas.microsoft.com/office/powerpoint/2010/main" val="1352105269"/>
       </p:ext>
     </p:extLst>
   </p:cSld>
@@ -770,7 +859,7 @@
       </p:grpSpPr>
       <p:sp>
         <p:nvSpPr>
-          <p:cNvPr id="2" name="Заголовок 1"/>
+          <p:cNvPr id="2" name="Title 1"/>
           <p:cNvSpPr>
             <a:spLocks noGrp="1"/>
           </p:cNvSpPr>
@@ -780,8 +869,8 @@
         </p:nvSpPr>
         <p:spPr>
           <a:xfrm>
-            <a:off x="1524000" y="1122363"/>
-            <a:ext cx="9144000" cy="2387600"/>
+            <a:off x="685800" y="1122363"/>
+            <a:ext cx="7772400" cy="2387600"/>
           </a:xfrm>
         </p:spPr>
         <p:txBody>
@@ -796,13 +885,13 @@
               <a:rPr lang="ru-RU" smtClean="0"/>
               <a:t>Образец заголовка</a:t>
             </a:r>
-            <a:endParaRPr lang="ru-RU"/>
-          </a:p>
-        </p:txBody>
-      </p:sp>
-      <p:sp>
-        <p:nvSpPr>
-          <p:cNvPr id="3" name="Подзаголовок 2"/>
+            <a:endParaRPr lang="en-US" dirty="0"/>
+          </a:p>
+        </p:txBody>
+      </p:sp>
+      <p:sp>
+        <p:nvSpPr>
+          <p:cNvPr id="3" name="Subtitle 2"/>
           <p:cNvSpPr>
             <a:spLocks noGrp="1"/>
           </p:cNvSpPr>
@@ -812,8 +901,8 @@
         </p:nvSpPr>
         <p:spPr>
           <a:xfrm>
-            <a:off x="1524000" y="3602038"/>
-            <a:ext cx="9144000" cy="1655762"/>
+            <a:off x="1143000" y="3602038"/>
+            <a:ext cx="6858000" cy="1655762"/>
           </a:xfrm>
         </p:spPr>
         <p:txBody>
@@ -861,13 +950,13 @@
               <a:rPr lang="ru-RU" smtClean="0"/>
               <a:t>Образец подзаголовка</a:t>
             </a:r>
-            <a:endParaRPr lang="ru-RU"/>
-          </a:p>
-        </p:txBody>
-      </p:sp>
-      <p:sp>
-        <p:nvSpPr>
-          <p:cNvPr id="4" name="Дата 3"/>
+            <a:endParaRPr lang="en-US" dirty="0"/>
+          </a:p>
+        </p:txBody>
+      </p:sp>
+      <p:sp>
+        <p:nvSpPr>
+          <p:cNvPr id="4" name="Date Placeholder 3"/>
           <p:cNvSpPr>
             <a:spLocks noGrp="1"/>
           </p:cNvSpPr>
@@ -882,7 +971,7 @@
           <a:p>
             <a:fld id="{9D1E7A46-1A4E-41C3-B23B-1269BF8B1FAC}" type="datetimeFigureOut">
               <a:rPr lang="ru-RU" smtClean="0"/>
-              <a:t>17.05.2023</a:t>
+              <a:t>23.05.2023</a:t>
             </a:fld>
             <a:endParaRPr lang="ru-RU"/>
           </a:p>
@@ -890,7 +979,7 @@
       </p:sp>
       <p:sp>
         <p:nvSpPr>
-          <p:cNvPr id="5" name="Нижний колонтитул 4"/>
+          <p:cNvPr id="5" name="Footer Placeholder 4"/>
           <p:cNvSpPr>
             <a:spLocks noGrp="1"/>
           </p:cNvSpPr>
@@ -909,7 +998,7 @@
       </p:sp>
       <p:sp>
         <p:nvSpPr>
-          <p:cNvPr id="6" name="Номер слайда 5"/>
+          <p:cNvPr id="6" name="Slide Number Placeholder 5"/>
           <p:cNvSpPr>
             <a:spLocks noGrp="1"/>
           </p:cNvSpPr>
@@ -933,7 +1022,7 @@
     </p:spTree>
     <p:extLst>
       <p:ext uri="{BB962C8B-B14F-4D97-AF65-F5344CB8AC3E}">
-        <p14:creationId xmlns:p14="http://schemas.microsoft.com/office/powerpoint/2010/main" val="3773714683"/>
+        <p14:creationId xmlns:p14="http://schemas.microsoft.com/office/powerpoint/2010/main" val="2972186146"/>
       </p:ext>
     </p:extLst>
   </p:cSld>
@@ -962,7 +1051,7 @@
       </p:grpSpPr>
       <p:sp>
         <p:nvSpPr>
-          <p:cNvPr id="2" name="Заголовок 1"/>
+          <p:cNvPr id="2" name="Title 1"/>
           <p:cNvSpPr>
             <a:spLocks noGrp="1"/>
           </p:cNvSpPr>
@@ -979,13 +1068,13 @@
               <a:rPr lang="ru-RU" smtClean="0"/>
               <a:t>Образец заголовка</a:t>
             </a:r>
-            <a:endParaRPr lang="ru-RU"/>
-          </a:p>
-        </p:txBody>
-      </p:sp>
-      <p:sp>
-        <p:nvSpPr>
-          <p:cNvPr id="3" name="Вертикальный текст 2"/>
+            <a:endParaRPr lang="en-US" dirty="0"/>
+          </a:p>
+        </p:txBody>
+      </p:sp>
+      <p:sp>
+        <p:nvSpPr>
+          <p:cNvPr id="3" name="Vertical Text Placeholder 2"/>
           <p:cNvSpPr>
             <a:spLocks noGrp="1"/>
           </p:cNvSpPr>
@@ -1031,13 +1120,13 @@
               <a:rPr lang="ru-RU" smtClean="0"/>
               <a:t>Пятый уровень</a:t>
             </a:r>
-            <a:endParaRPr lang="ru-RU"/>
-          </a:p>
-        </p:txBody>
-      </p:sp>
-      <p:sp>
-        <p:nvSpPr>
-          <p:cNvPr id="4" name="Дата 3"/>
+            <a:endParaRPr lang="en-US" dirty="0"/>
+          </a:p>
+        </p:txBody>
+      </p:sp>
+      <p:sp>
+        <p:nvSpPr>
+          <p:cNvPr id="4" name="Date Placeholder 3"/>
           <p:cNvSpPr>
             <a:spLocks noGrp="1"/>
           </p:cNvSpPr>
@@ -1052,7 +1141,7 @@
           <a:p>
             <a:fld id="{9D1E7A46-1A4E-41C3-B23B-1269BF8B1FAC}" type="datetimeFigureOut">
               <a:rPr lang="ru-RU" smtClean="0"/>
-              <a:t>17.05.2023</a:t>
+              <a:t>23.05.2023</a:t>
             </a:fld>
             <a:endParaRPr lang="ru-RU"/>
           </a:p>
@@ -1060,7 +1149,7 @@
       </p:sp>
       <p:sp>
         <p:nvSpPr>
-          <p:cNvPr id="5" name="Нижний колонтитул 4"/>
+          <p:cNvPr id="5" name="Footer Placeholder 4"/>
           <p:cNvSpPr>
             <a:spLocks noGrp="1"/>
           </p:cNvSpPr>
@@ -1079,7 +1168,7 @@
       </p:sp>
       <p:sp>
         <p:nvSpPr>
-          <p:cNvPr id="6" name="Номер слайда 5"/>
+          <p:cNvPr id="6" name="Slide Number Placeholder 5"/>
           <p:cNvSpPr>
             <a:spLocks noGrp="1"/>
           </p:cNvSpPr>
@@ -1103,7 +1192,7 @@
     </p:spTree>
     <p:extLst>
       <p:ext uri="{BB962C8B-B14F-4D97-AF65-F5344CB8AC3E}">
-        <p14:creationId xmlns:p14="http://schemas.microsoft.com/office/powerpoint/2010/main" val="3903403361"/>
+        <p14:creationId xmlns:p14="http://schemas.microsoft.com/office/powerpoint/2010/main" val="40594672"/>
       </p:ext>
     </p:extLst>
   </p:cSld>
@@ -1132,7 +1221,7 @@
       </p:grpSpPr>
       <p:sp>
         <p:nvSpPr>
-          <p:cNvPr id="2" name="Вертикальный заголовок 1"/>
+          <p:cNvPr id="2" name="Vertical Title 1"/>
           <p:cNvSpPr>
             <a:spLocks noGrp="1"/>
           </p:cNvSpPr>
@@ -1142,8 +1231,8 @@
         </p:nvSpPr>
         <p:spPr>
           <a:xfrm>
-            <a:off x="8724900" y="365125"/>
-            <a:ext cx="2628900" cy="5811838"/>
+            <a:off x="6543675" y="365125"/>
+            <a:ext cx="1971675" cy="5811838"/>
           </a:xfrm>
         </p:spPr>
         <p:txBody>
@@ -1154,13 +1243,13 @@
               <a:rPr lang="ru-RU" smtClean="0"/>
               <a:t>Образец заголовка</a:t>
             </a:r>
-            <a:endParaRPr lang="ru-RU"/>
-          </a:p>
-        </p:txBody>
-      </p:sp>
-      <p:sp>
-        <p:nvSpPr>
-          <p:cNvPr id="3" name="Вертикальный текст 2"/>
+            <a:endParaRPr lang="en-US" dirty="0"/>
+          </a:p>
+        </p:txBody>
+      </p:sp>
+      <p:sp>
+        <p:nvSpPr>
+          <p:cNvPr id="3" name="Vertical Text Placeholder 2"/>
           <p:cNvSpPr>
             <a:spLocks noGrp="1"/>
           </p:cNvSpPr>
@@ -1170,8 +1259,8 @@
         </p:nvSpPr>
         <p:spPr>
           <a:xfrm>
-            <a:off x="838200" y="365125"/>
-            <a:ext cx="7734300" cy="5811838"/>
+            <a:off x="628650" y="365125"/>
+            <a:ext cx="5800725" cy="5811838"/>
           </a:xfrm>
         </p:spPr>
         <p:txBody>
@@ -1211,13 +1300,13 @@
               <a:rPr lang="ru-RU" smtClean="0"/>
               <a:t>Пятый уровень</a:t>
             </a:r>
-            <a:endParaRPr lang="ru-RU"/>
-          </a:p>
-        </p:txBody>
-      </p:sp>
-      <p:sp>
-        <p:nvSpPr>
-          <p:cNvPr id="4" name="Дата 3"/>
+            <a:endParaRPr lang="en-US" dirty="0"/>
+          </a:p>
+        </p:txBody>
+      </p:sp>
+      <p:sp>
+        <p:nvSpPr>
+          <p:cNvPr id="4" name="Date Placeholder 3"/>
           <p:cNvSpPr>
             <a:spLocks noGrp="1"/>
           </p:cNvSpPr>
@@ -1232,7 +1321,7 @@
           <a:p>
             <a:fld id="{9D1E7A46-1A4E-41C3-B23B-1269BF8B1FAC}" type="datetimeFigureOut">
               <a:rPr lang="ru-RU" smtClean="0"/>
-              <a:t>17.05.2023</a:t>
+              <a:t>23.05.2023</a:t>
             </a:fld>
             <a:endParaRPr lang="ru-RU"/>
           </a:p>
@@ -1240,7 +1329,7 @@
       </p:sp>
       <p:sp>
         <p:nvSpPr>
-          <p:cNvPr id="5" name="Нижний колонтитул 4"/>
+          <p:cNvPr id="5" name="Footer Placeholder 4"/>
           <p:cNvSpPr>
             <a:spLocks noGrp="1"/>
           </p:cNvSpPr>
@@ -1259,7 +1348,7 @@
       </p:sp>
       <p:sp>
         <p:nvSpPr>
-          <p:cNvPr id="6" name="Номер слайда 5"/>
+          <p:cNvPr id="6" name="Slide Number Placeholder 5"/>
           <p:cNvSpPr>
             <a:spLocks noGrp="1"/>
           </p:cNvSpPr>
@@ -1283,7 +1372,7 @@
     </p:spTree>
     <p:extLst>
       <p:ext uri="{BB962C8B-B14F-4D97-AF65-F5344CB8AC3E}">
-        <p14:creationId xmlns:p14="http://schemas.microsoft.com/office/powerpoint/2010/main" val="3542821332"/>
+        <p14:creationId xmlns:p14="http://schemas.microsoft.com/office/powerpoint/2010/main" val="3889425811"/>
       </p:ext>
     </p:extLst>
   </p:cSld>
@@ -1312,7 +1401,7 @@
       </p:grpSpPr>
       <p:sp>
         <p:nvSpPr>
-          <p:cNvPr id="2" name="Заголовок 1"/>
+          <p:cNvPr id="2" name="Title 1"/>
           <p:cNvSpPr>
             <a:spLocks noGrp="1"/>
           </p:cNvSpPr>
@@ -1329,13 +1418,13 @@
               <a:rPr lang="ru-RU" smtClean="0"/>
               <a:t>Образец заголовка</a:t>
             </a:r>
-            <a:endParaRPr lang="ru-RU"/>
-          </a:p>
-        </p:txBody>
-      </p:sp>
-      <p:sp>
-        <p:nvSpPr>
-          <p:cNvPr id="3" name="Объект 2"/>
+            <a:endParaRPr lang="en-US" dirty="0"/>
+          </a:p>
+        </p:txBody>
+      </p:sp>
+      <p:sp>
+        <p:nvSpPr>
+          <p:cNvPr id="3" name="Content Placeholder 2"/>
           <p:cNvSpPr>
             <a:spLocks noGrp="1"/>
           </p:cNvSpPr>
@@ -1381,13 +1470,13 @@
               <a:rPr lang="ru-RU" smtClean="0"/>
               <a:t>Пятый уровень</a:t>
             </a:r>
-            <a:endParaRPr lang="ru-RU"/>
-          </a:p>
-        </p:txBody>
-      </p:sp>
-      <p:sp>
-        <p:nvSpPr>
-          <p:cNvPr id="4" name="Дата 3"/>
+            <a:endParaRPr lang="en-US" dirty="0"/>
+          </a:p>
+        </p:txBody>
+      </p:sp>
+      <p:sp>
+        <p:nvSpPr>
+          <p:cNvPr id="4" name="Date Placeholder 3"/>
           <p:cNvSpPr>
             <a:spLocks noGrp="1"/>
           </p:cNvSpPr>
@@ -1402,7 +1491,7 @@
           <a:p>
             <a:fld id="{9D1E7A46-1A4E-41C3-B23B-1269BF8B1FAC}" type="datetimeFigureOut">
               <a:rPr lang="ru-RU" smtClean="0"/>
-              <a:t>17.05.2023</a:t>
+              <a:t>23.05.2023</a:t>
             </a:fld>
             <a:endParaRPr lang="ru-RU"/>
           </a:p>
@@ -1410,7 +1499,7 @@
       </p:sp>
       <p:sp>
         <p:nvSpPr>
-          <p:cNvPr id="5" name="Нижний колонтитул 4"/>
+          <p:cNvPr id="5" name="Footer Placeholder 4"/>
           <p:cNvSpPr>
             <a:spLocks noGrp="1"/>
           </p:cNvSpPr>
@@ -1429,7 +1518,7 @@
       </p:sp>
       <p:sp>
         <p:nvSpPr>
-          <p:cNvPr id="6" name="Номер слайда 5"/>
+          <p:cNvPr id="6" name="Slide Number Placeholder 5"/>
           <p:cNvSpPr>
             <a:spLocks noGrp="1"/>
           </p:cNvSpPr>
@@ -1453,7 +1542,7 @@
     </p:spTree>
     <p:extLst>
       <p:ext uri="{BB962C8B-B14F-4D97-AF65-F5344CB8AC3E}">
-        <p14:creationId xmlns:p14="http://schemas.microsoft.com/office/powerpoint/2010/main" val="3931965659"/>
+        <p14:creationId xmlns:p14="http://schemas.microsoft.com/office/powerpoint/2010/main" val="3521447968"/>
       </p:ext>
     </p:extLst>
   </p:cSld>
@@ -1482,7 +1571,7 @@
       </p:grpSpPr>
       <p:sp>
         <p:nvSpPr>
-          <p:cNvPr id="2" name="Заголовок 1"/>
+          <p:cNvPr id="2" name="Title 1"/>
           <p:cNvSpPr>
             <a:spLocks noGrp="1"/>
           </p:cNvSpPr>
@@ -1492,8 +1581,8 @@
         </p:nvSpPr>
         <p:spPr>
           <a:xfrm>
-            <a:off x="831850" y="1709738"/>
-            <a:ext cx="10515600" cy="2852737"/>
+            <a:off x="623888" y="1709739"/>
+            <a:ext cx="7886700" cy="2852737"/>
           </a:xfrm>
         </p:spPr>
         <p:txBody>
@@ -1508,13 +1597,13 @@
               <a:rPr lang="ru-RU" smtClean="0"/>
               <a:t>Образец заголовка</a:t>
             </a:r>
-            <a:endParaRPr lang="ru-RU"/>
-          </a:p>
-        </p:txBody>
-      </p:sp>
-      <p:sp>
-        <p:nvSpPr>
-          <p:cNvPr id="3" name="Текст 2"/>
+            <a:endParaRPr lang="en-US" dirty="0"/>
+          </a:p>
+        </p:txBody>
+      </p:sp>
+      <p:sp>
+        <p:nvSpPr>
+          <p:cNvPr id="3" name="Text Placeholder 2"/>
           <p:cNvSpPr>
             <a:spLocks noGrp="1"/>
           </p:cNvSpPr>
@@ -1524,8 +1613,8 @@
         </p:nvSpPr>
         <p:spPr>
           <a:xfrm>
-            <a:off x="831850" y="4589463"/>
-            <a:ext cx="10515600" cy="1500187"/>
+            <a:off x="623888" y="4589464"/>
+            <a:ext cx="7886700" cy="1500187"/>
           </a:xfrm>
         </p:spPr>
         <p:txBody>
@@ -1535,9 +1624,7 @@
               <a:buNone/>
               <a:defRPr sz="2400">
                 <a:solidFill>
-                  <a:schemeClr val="tx1">
-                    <a:tint val="75000"/>
-                  </a:schemeClr>
+                  <a:schemeClr val="tx1"/>
                 </a:solidFill>
               </a:defRPr>
             </a:lvl1pPr>
@@ -1633,7 +1720,7 @@
       </p:sp>
       <p:sp>
         <p:nvSpPr>
-          <p:cNvPr id="4" name="Дата 3"/>
+          <p:cNvPr id="4" name="Date Placeholder 3"/>
           <p:cNvSpPr>
             <a:spLocks noGrp="1"/>
           </p:cNvSpPr>
@@ -1648,7 +1735,7 @@
           <a:p>
             <a:fld id="{9D1E7A46-1A4E-41C3-B23B-1269BF8B1FAC}" type="datetimeFigureOut">
               <a:rPr lang="ru-RU" smtClean="0"/>
-              <a:t>17.05.2023</a:t>
+              <a:t>23.05.2023</a:t>
             </a:fld>
             <a:endParaRPr lang="ru-RU"/>
           </a:p>
@@ -1656,7 +1743,7 @@
       </p:sp>
       <p:sp>
         <p:nvSpPr>
-          <p:cNvPr id="5" name="Нижний колонтитул 4"/>
+          <p:cNvPr id="5" name="Footer Placeholder 4"/>
           <p:cNvSpPr>
             <a:spLocks noGrp="1"/>
           </p:cNvSpPr>
@@ -1675,7 +1762,7 @@
       </p:sp>
       <p:sp>
         <p:nvSpPr>
-          <p:cNvPr id="6" name="Номер слайда 5"/>
+          <p:cNvPr id="6" name="Slide Number Placeholder 5"/>
           <p:cNvSpPr>
             <a:spLocks noGrp="1"/>
           </p:cNvSpPr>
@@ -1699,7 +1786,7 @@
     </p:spTree>
     <p:extLst>
       <p:ext uri="{BB962C8B-B14F-4D97-AF65-F5344CB8AC3E}">
-        <p14:creationId xmlns:p14="http://schemas.microsoft.com/office/powerpoint/2010/main" val="708257254"/>
+        <p14:creationId xmlns:p14="http://schemas.microsoft.com/office/powerpoint/2010/main" val="3639578264"/>
       </p:ext>
     </p:extLst>
   </p:cSld>
@@ -1728,7 +1815,7 @@
       </p:grpSpPr>
       <p:sp>
         <p:nvSpPr>
-          <p:cNvPr id="2" name="Заголовок 1"/>
+          <p:cNvPr id="2" name="Title 1"/>
           <p:cNvSpPr>
             <a:spLocks noGrp="1"/>
           </p:cNvSpPr>
@@ -1745,13 +1832,13 @@
               <a:rPr lang="ru-RU" smtClean="0"/>
               <a:t>Образец заголовка</a:t>
             </a:r>
-            <a:endParaRPr lang="ru-RU"/>
-          </a:p>
-        </p:txBody>
-      </p:sp>
-      <p:sp>
-        <p:nvSpPr>
-          <p:cNvPr id="3" name="Объект 2"/>
+            <a:endParaRPr lang="en-US" dirty="0"/>
+          </a:p>
+        </p:txBody>
+      </p:sp>
+      <p:sp>
+        <p:nvSpPr>
+          <p:cNvPr id="3" name="Content Placeholder 2"/>
           <p:cNvSpPr>
             <a:spLocks noGrp="1"/>
           </p:cNvSpPr>
@@ -1761,8 +1848,8 @@
         </p:nvSpPr>
         <p:spPr>
           <a:xfrm>
-            <a:off x="838200" y="1825625"/>
-            <a:ext cx="5181600" cy="4351338"/>
+            <a:off x="628650" y="1825625"/>
+            <a:ext cx="3886200" cy="4351338"/>
           </a:xfrm>
         </p:spPr>
         <p:txBody>
@@ -1802,13 +1889,13 @@
               <a:rPr lang="ru-RU" smtClean="0"/>
               <a:t>Пятый уровень</a:t>
             </a:r>
-            <a:endParaRPr lang="ru-RU"/>
-          </a:p>
-        </p:txBody>
-      </p:sp>
-      <p:sp>
-        <p:nvSpPr>
-          <p:cNvPr id="4" name="Объект 3"/>
+            <a:endParaRPr lang="en-US" dirty="0"/>
+          </a:p>
+        </p:txBody>
+      </p:sp>
+      <p:sp>
+        <p:nvSpPr>
+          <p:cNvPr id="4" name="Content Placeholder 3"/>
           <p:cNvSpPr>
             <a:spLocks noGrp="1"/>
           </p:cNvSpPr>
@@ -1818,8 +1905,8 @@
         </p:nvSpPr>
         <p:spPr>
           <a:xfrm>
-            <a:off x="6172200" y="1825625"/>
-            <a:ext cx="5181600" cy="4351338"/>
+            <a:off x="4629150" y="1825625"/>
+            <a:ext cx="3886200" cy="4351338"/>
           </a:xfrm>
         </p:spPr>
         <p:txBody>
@@ -1859,13 +1946,13 @@
               <a:rPr lang="ru-RU" smtClean="0"/>
               <a:t>Пятый уровень</a:t>
             </a:r>
-            <a:endParaRPr lang="ru-RU"/>
-          </a:p>
-        </p:txBody>
-      </p:sp>
-      <p:sp>
-        <p:nvSpPr>
-          <p:cNvPr id="5" name="Дата 4"/>
+            <a:endParaRPr lang="en-US" dirty="0"/>
+          </a:p>
+        </p:txBody>
+      </p:sp>
+      <p:sp>
+        <p:nvSpPr>
+          <p:cNvPr id="5" name="Date Placeholder 4"/>
           <p:cNvSpPr>
             <a:spLocks noGrp="1"/>
           </p:cNvSpPr>
@@ -1880,7 +1967,7 @@
           <a:p>
             <a:fld id="{9D1E7A46-1A4E-41C3-B23B-1269BF8B1FAC}" type="datetimeFigureOut">
               <a:rPr lang="ru-RU" smtClean="0"/>
-              <a:t>17.05.2023</a:t>
+              <a:t>23.05.2023</a:t>
             </a:fld>
             <a:endParaRPr lang="ru-RU"/>
           </a:p>
@@ -1888,7 +1975,7 @@
       </p:sp>
       <p:sp>
         <p:nvSpPr>
-          <p:cNvPr id="6" name="Нижний колонтитул 5"/>
+          <p:cNvPr id="6" name="Footer Placeholder 5"/>
           <p:cNvSpPr>
             <a:spLocks noGrp="1"/>
           </p:cNvSpPr>
@@ -1907,7 +1994,7 @@
       </p:sp>
       <p:sp>
         <p:nvSpPr>
-          <p:cNvPr id="7" name="Номер слайда 6"/>
+          <p:cNvPr id="7" name="Slide Number Placeholder 6"/>
           <p:cNvSpPr>
             <a:spLocks noGrp="1"/>
           </p:cNvSpPr>
@@ -1931,7 +2018,7 @@
     </p:spTree>
     <p:extLst>
       <p:ext uri="{BB962C8B-B14F-4D97-AF65-F5344CB8AC3E}">
-        <p14:creationId xmlns:p14="http://schemas.microsoft.com/office/powerpoint/2010/main" val="3299448770"/>
+        <p14:creationId xmlns:p14="http://schemas.microsoft.com/office/powerpoint/2010/main" val="3190475"/>
       </p:ext>
     </p:extLst>
   </p:cSld>
@@ -1960,7 +2047,7 @@
       </p:grpSpPr>
       <p:sp>
         <p:nvSpPr>
-          <p:cNvPr id="2" name="Заголовок 1"/>
+          <p:cNvPr id="2" name="Title 1"/>
           <p:cNvSpPr>
             <a:spLocks noGrp="1"/>
           </p:cNvSpPr>
@@ -1970,8 +2057,8 @@
         </p:nvSpPr>
         <p:spPr>
           <a:xfrm>
-            <a:off x="839788" y="365125"/>
-            <a:ext cx="10515600" cy="1325563"/>
+            <a:off x="629841" y="365126"/>
+            <a:ext cx="7886700" cy="1325563"/>
           </a:xfrm>
         </p:spPr>
         <p:txBody>
@@ -1982,13 +2069,13 @@
               <a:rPr lang="ru-RU" smtClean="0"/>
               <a:t>Образец заголовка</a:t>
             </a:r>
-            <a:endParaRPr lang="ru-RU"/>
-          </a:p>
-        </p:txBody>
-      </p:sp>
-      <p:sp>
-        <p:nvSpPr>
-          <p:cNvPr id="3" name="Текст 2"/>
+            <a:endParaRPr lang="en-US" dirty="0"/>
+          </a:p>
+        </p:txBody>
+      </p:sp>
+      <p:sp>
+        <p:nvSpPr>
+          <p:cNvPr id="3" name="Text Placeholder 2"/>
           <p:cNvSpPr>
             <a:spLocks noGrp="1"/>
           </p:cNvSpPr>
@@ -1998,8 +2085,8 @@
         </p:nvSpPr>
         <p:spPr>
           <a:xfrm>
-            <a:off x="839788" y="1681163"/>
-            <a:ext cx="5157787" cy="823912"/>
+            <a:off x="629842" y="1681163"/>
+            <a:ext cx="3868340" cy="823912"/>
           </a:xfrm>
         </p:spPr>
         <p:txBody>
@@ -2053,7 +2140,7 @@
       </p:sp>
       <p:sp>
         <p:nvSpPr>
-          <p:cNvPr id="4" name="Объект 3"/>
+          <p:cNvPr id="4" name="Content Placeholder 3"/>
           <p:cNvSpPr>
             <a:spLocks noGrp="1"/>
           </p:cNvSpPr>
@@ -2063,8 +2150,8 @@
         </p:nvSpPr>
         <p:spPr>
           <a:xfrm>
-            <a:off x="839788" y="2505075"/>
-            <a:ext cx="5157787" cy="3684588"/>
+            <a:off x="629842" y="2505075"/>
+            <a:ext cx="3868340" cy="3684588"/>
           </a:xfrm>
         </p:spPr>
         <p:txBody>
@@ -2104,13 +2191,13 @@
               <a:rPr lang="ru-RU" smtClean="0"/>
               <a:t>Пятый уровень</a:t>
             </a:r>
-            <a:endParaRPr lang="ru-RU"/>
-          </a:p>
-        </p:txBody>
-      </p:sp>
-      <p:sp>
-        <p:nvSpPr>
-          <p:cNvPr id="5" name="Текст 4"/>
+            <a:endParaRPr lang="en-US" dirty="0"/>
+          </a:p>
+        </p:txBody>
+      </p:sp>
+      <p:sp>
+        <p:nvSpPr>
+          <p:cNvPr id="5" name="Text Placeholder 4"/>
           <p:cNvSpPr>
             <a:spLocks noGrp="1"/>
           </p:cNvSpPr>
@@ -2120,8 +2207,8 @@
         </p:nvSpPr>
         <p:spPr>
           <a:xfrm>
-            <a:off x="6172200" y="1681163"/>
-            <a:ext cx="5183188" cy="823912"/>
+            <a:off x="4629150" y="1681163"/>
+            <a:ext cx="3887391" cy="823912"/>
           </a:xfrm>
         </p:spPr>
         <p:txBody>
@@ -2175,7 +2262,7 @@
       </p:sp>
       <p:sp>
         <p:nvSpPr>
-          <p:cNvPr id="6" name="Объект 5"/>
+          <p:cNvPr id="6" name="Content Placeholder 5"/>
           <p:cNvSpPr>
             <a:spLocks noGrp="1"/>
           </p:cNvSpPr>
@@ -2185,8 +2272,8 @@
         </p:nvSpPr>
         <p:spPr>
           <a:xfrm>
-            <a:off x="6172200" y="2505075"/>
-            <a:ext cx="5183188" cy="3684588"/>
+            <a:off x="4629150" y="2505075"/>
+            <a:ext cx="3887391" cy="3684588"/>
           </a:xfrm>
         </p:spPr>
         <p:txBody>
@@ -2226,13 +2313,13 @@
               <a:rPr lang="ru-RU" smtClean="0"/>
               <a:t>Пятый уровень</a:t>
             </a:r>
-            <a:endParaRPr lang="ru-RU"/>
-          </a:p>
-        </p:txBody>
-      </p:sp>
-      <p:sp>
-        <p:nvSpPr>
-          <p:cNvPr id="7" name="Дата 6"/>
+            <a:endParaRPr lang="en-US" dirty="0"/>
+          </a:p>
+        </p:txBody>
+      </p:sp>
+      <p:sp>
+        <p:nvSpPr>
+          <p:cNvPr id="7" name="Date Placeholder 6"/>
           <p:cNvSpPr>
             <a:spLocks noGrp="1"/>
           </p:cNvSpPr>
@@ -2247,7 +2334,7 @@
           <a:p>
             <a:fld id="{9D1E7A46-1A4E-41C3-B23B-1269BF8B1FAC}" type="datetimeFigureOut">
               <a:rPr lang="ru-RU" smtClean="0"/>
-              <a:t>17.05.2023</a:t>
+              <a:t>23.05.2023</a:t>
             </a:fld>
             <a:endParaRPr lang="ru-RU"/>
           </a:p>
@@ -2255,7 +2342,7 @@
       </p:sp>
       <p:sp>
         <p:nvSpPr>
-          <p:cNvPr id="8" name="Нижний колонтитул 7"/>
+          <p:cNvPr id="8" name="Footer Placeholder 7"/>
           <p:cNvSpPr>
             <a:spLocks noGrp="1"/>
           </p:cNvSpPr>
@@ -2274,7 +2361,7 @@
       </p:sp>
       <p:sp>
         <p:nvSpPr>
-          <p:cNvPr id="9" name="Номер слайда 8"/>
+          <p:cNvPr id="9" name="Slide Number Placeholder 8"/>
           <p:cNvSpPr>
             <a:spLocks noGrp="1"/>
           </p:cNvSpPr>
@@ -2298,7 +2385,7 @@
     </p:spTree>
     <p:extLst>
       <p:ext uri="{BB962C8B-B14F-4D97-AF65-F5344CB8AC3E}">
-        <p14:creationId xmlns:p14="http://schemas.microsoft.com/office/powerpoint/2010/main" val="1832771838"/>
+        <p14:creationId xmlns:p14="http://schemas.microsoft.com/office/powerpoint/2010/main" val="4214737464"/>
       </p:ext>
     </p:extLst>
   </p:cSld>
@@ -2327,7 +2414,7 @@
       </p:grpSpPr>
       <p:sp>
         <p:nvSpPr>
-          <p:cNvPr id="2" name="Заголовок 1"/>
+          <p:cNvPr id="2" name="Title 1"/>
           <p:cNvSpPr>
             <a:spLocks noGrp="1"/>
           </p:cNvSpPr>
@@ -2344,13 +2431,13 @@
               <a:rPr lang="ru-RU" smtClean="0"/>
               <a:t>Образец заголовка</a:t>
             </a:r>
-            <a:endParaRPr lang="ru-RU"/>
-          </a:p>
-        </p:txBody>
-      </p:sp>
-      <p:sp>
-        <p:nvSpPr>
-          <p:cNvPr id="3" name="Дата 2"/>
+            <a:endParaRPr lang="en-US" dirty="0"/>
+          </a:p>
+        </p:txBody>
+      </p:sp>
+      <p:sp>
+        <p:nvSpPr>
+          <p:cNvPr id="3" name="Date Placeholder 2"/>
           <p:cNvSpPr>
             <a:spLocks noGrp="1"/>
           </p:cNvSpPr>
@@ -2365,7 +2452,7 @@
           <a:p>
             <a:fld id="{9D1E7A46-1A4E-41C3-B23B-1269BF8B1FAC}" type="datetimeFigureOut">
               <a:rPr lang="ru-RU" smtClean="0"/>
-              <a:t>17.05.2023</a:t>
+              <a:t>23.05.2023</a:t>
             </a:fld>
             <a:endParaRPr lang="ru-RU"/>
           </a:p>
@@ -2373,7 +2460,7 @@
       </p:sp>
       <p:sp>
         <p:nvSpPr>
-          <p:cNvPr id="4" name="Нижний колонтитул 3"/>
+          <p:cNvPr id="4" name="Footer Placeholder 3"/>
           <p:cNvSpPr>
             <a:spLocks noGrp="1"/>
           </p:cNvSpPr>
@@ -2392,7 +2479,7 @@
       </p:sp>
       <p:sp>
         <p:nvSpPr>
-          <p:cNvPr id="5" name="Номер слайда 4"/>
+          <p:cNvPr id="5" name="Slide Number Placeholder 4"/>
           <p:cNvSpPr>
             <a:spLocks noGrp="1"/>
           </p:cNvSpPr>
@@ -2416,7 +2503,7 @@
     </p:spTree>
     <p:extLst>
       <p:ext uri="{BB962C8B-B14F-4D97-AF65-F5344CB8AC3E}">
-        <p14:creationId xmlns:p14="http://schemas.microsoft.com/office/powerpoint/2010/main" val="425099468"/>
+        <p14:creationId xmlns:p14="http://schemas.microsoft.com/office/powerpoint/2010/main" val="1663398041"/>
       </p:ext>
     </p:extLst>
   </p:cSld>
@@ -2445,7 +2532,7 @@
       </p:grpSpPr>
       <p:sp>
         <p:nvSpPr>
-          <p:cNvPr id="2" name="Дата 1"/>
+          <p:cNvPr id="2" name="Date Placeholder 1"/>
           <p:cNvSpPr>
             <a:spLocks noGrp="1"/>
           </p:cNvSpPr>
@@ -2460,7 +2547,7 @@
           <a:p>
             <a:fld id="{9D1E7A46-1A4E-41C3-B23B-1269BF8B1FAC}" type="datetimeFigureOut">
               <a:rPr lang="ru-RU" smtClean="0"/>
-              <a:t>17.05.2023</a:t>
+              <a:t>23.05.2023</a:t>
             </a:fld>
             <a:endParaRPr lang="ru-RU"/>
           </a:p>
@@ -2468,7 +2555,7 @@
       </p:sp>
       <p:sp>
         <p:nvSpPr>
-          <p:cNvPr id="3" name="Нижний колонтитул 2"/>
+          <p:cNvPr id="3" name="Footer Placeholder 2"/>
           <p:cNvSpPr>
             <a:spLocks noGrp="1"/>
           </p:cNvSpPr>
@@ -2487,7 +2574,7 @@
       </p:sp>
       <p:sp>
         <p:nvSpPr>
-          <p:cNvPr id="4" name="Номер слайда 3"/>
+          <p:cNvPr id="4" name="Slide Number Placeholder 3"/>
           <p:cNvSpPr>
             <a:spLocks noGrp="1"/>
           </p:cNvSpPr>
@@ -2511,7 +2598,7 @@
     </p:spTree>
     <p:extLst>
       <p:ext uri="{BB962C8B-B14F-4D97-AF65-F5344CB8AC3E}">
-        <p14:creationId xmlns:p14="http://schemas.microsoft.com/office/powerpoint/2010/main" val="1438281047"/>
+        <p14:creationId xmlns:p14="http://schemas.microsoft.com/office/powerpoint/2010/main" val="1427329469"/>
       </p:ext>
     </p:extLst>
   </p:cSld>
@@ -2540,7 +2627,7 @@
       </p:grpSpPr>
       <p:sp>
         <p:nvSpPr>
-          <p:cNvPr id="2" name="Заголовок 1"/>
+          <p:cNvPr id="2" name="Title 1"/>
           <p:cNvSpPr>
             <a:spLocks noGrp="1"/>
           </p:cNvSpPr>
@@ -2550,8 +2637,8 @@
         </p:nvSpPr>
         <p:spPr>
           <a:xfrm>
-            <a:off x="839788" y="457200"/>
-            <a:ext cx="3932237" cy="1600200"/>
+            <a:off x="629841" y="457200"/>
+            <a:ext cx="2949178" cy="1600200"/>
           </a:xfrm>
         </p:spPr>
         <p:txBody>
@@ -2566,13 +2653,13 @@
               <a:rPr lang="ru-RU" smtClean="0"/>
               <a:t>Образец заголовка</a:t>
             </a:r>
-            <a:endParaRPr lang="ru-RU"/>
-          </a:p>
-        </p:txBody>
-      </p:sp>
-      <p:sp>
-        <p:nvSpPr>
-          <p:cNvPr id="3" name="Объект 2"/>
+            <a:endParaRPr lang="en-US" dirty="0"/>
+          </a:p>
+        </p:txBody>
+      </p:sp>
+      <p:sp>
+        <p:nvSpPr>
+          <p:cNvPr id="3" name="Content Placeholder 2"/>
           <p:cNvSpPr>
             <a:spLocks noGrp="1"/>
           </p:cNvSpPr>
@@ -2582,8 +2669,8 @@
         </p:nvSpPr>
         <p:spPr>
           <a:xfrm>
-            <a:off x="5183188" y="987425"/>
-            <a:ext cx="6172200" cy="4873625"/>
+            <a:off x="3887391" y="987426"/>
+            <a:ext cx="4629150" cy="4873625"/>
           </a:xfrm>
         </p:spPr>
         <p:txBody>
@@ -2651,13 +2738,13 @@
               <a:rPr lang="ru-RU" smtClean="0"/>
               <a:t>Пятый уровень</a:t>
             </a:r>
-            <a:endParaRPr lang="ru-RU"/>
-          </a:p>
-        </p:txBody>
-      </p:sp>
-      <p:sp>
-        <p:nvSpPr>
-          <p:cNvPr id="4" name="Текст 3"/>
+            <a:endParaRPr lang="en-US" dirty="0"/>
+          </a:p>
+        </p:txBody>
+      </p:sp>
+      <p:sp>
+        <p:nvSpPr>
+          <p:cNvPr id="4" name="Text Placeholder 3"/>
           <p:cNvSpPr>
             <a:spLocks noGrp="1"/>
           </p:cNvSpPr>
@@ -2667,8 +2754,8 @@
         </p:nvSpPr>
         <p:spPr>
           <a:xfrm>
-            <a:off x="839788" y="2057400"/>
-            <a:ext cx="3932237" cy="3811588"/>
+            <a:off x="629841" y="2057400"/>
+            <a:ext cx="2949178" cy="3811588"/>
           </a:xfrm>
         </p:spPr>
         <p:txBody>
@@ -2722,7 +2809,7 @@
       </p:sp>
       <p:sp>
         <p:nvSpPr>
-          <p:cNvPr id="5" name="Дата 4"/>
+          <p:cNvPr id="5" name="Date Placeholder 4"/>
           <p:cNvSpPr>
             <a:spLocks noGrp="1"/>
           </p:cNvSpPr>
@@ -2737,7 +2824,7 @@
           <a:p>
             <a:fld id="{9D1E7A46-1A4E-41C3-B23B-1269BF8B1FAC}" type="datetimeFigureOut">
               <a:rPr lang="ru-RU" smtClean="0"/>
-              <a:t>17.05.2023</a:t>
+              <a:t>23.05.2023</a:t>
             </a:fld>
             <a:endParaRPr lang="ru-RU"/>
           </a:p>
@@ -2745,7 +2832,7 @@
       </p:sp>
       <p:sp>
         <p:nvSpPr>
-          <p:cNvPr id="6" name="Нижний колонтитул 5"/>
+          <p:cNvPr id="6" name="Footer Placeholder 5"/>
           <p:cNvSpPr>
             <a:spLocks noGrp="1"/>
           </p:cNvSpPr>
@@ -2764,7 +2851,7 @@
       </p:sp>
       <p:sp>
         <p:nvSpPr>
-          <p:cNvPr id="7" name="Номер слайда 6"/>
+          <p:cNvPr id="7" name="Slide Number Placeholder 6"/>
           <p:cNvSpPr>
             <a:spLocks noGrp="1"/>
           </p:cNvSpPr>
@@ -2788,7 +2875,7 @@
     </p:spTree>
     <p:extLst>
       <p:ext uri="{BB962C8B-B14F-4D97-AF65-F5344CB8AC3E}">
-        <p14:creationId xmlns:p14="http://schemas.microsoft.com/office/powerpoint/2010/main" val="1360675765"/>
+        <p14:creationId xmlns:p14="http://schemas.microsoft.com/office/powerpoint/2010/main" val="3798297077"/>
       </p:ext>
     </p:extLst>
   </p:cSld>
@@ -2817,7 +2904,7 @@
       </p:grpSpPr>
       <p:sp>
         <p:nvSpPr>
-          <p:cNvPr id="2" name="Заголовок 1"/>
+          <p:cNvPr id="2" name="Title 1"/>
           <p:cNvSpPr>
             <a:spLocks noGrp="1"/>
           </p:cNvSpPr>
@@ -2827,8 +2914,8 @@
         </p:nvSpPr>
         <p:spPr>
           <a:xfrm>
-            <a:off x="839788" y="457200"/>
-            <a:ext cx="3932237" cy="1600200"/>
+            <a:off x="629841" y="457200"/>
+            <a:ext cx="2949178" cy="1600200"/>
           </a:xfrm>
         </p:spPr>
         <p:txBody>
@@ -2843,15 +2930,15 @@
               <a:rPr lang="ru-RU" smtClean="0"/>
               <a:t>Образец заголовка</a:t>
             </a:r>
-            <a:endParaRPr lang="ru-RU"/>
-          </a:p>
-        </p:txBody>
-      </p:sp>
-      <p:sp>
-        <p:nvSpPr>
-          <p:cNvPr id="3" name="Рисунок 2"/>
+            <a:endParaRPr lang="en-US" dirty="0"/>
+          </a:p>
+        </p:txBody>
+      </p:sp>
+      <p:sp>
+        <p:nvSpPr>
+          <p:cNvPr id="3" name="Picture Placeholder 2"/>
           <p:cNvSpPr>
-            <a:spLocks noGrp="1"/>
+            <a:spLocks noGrp="1" noChangeAspect="1"/>
           </p:cNvSpPr>
           <p:nvPr>
             <p:ph type="pic" idx="1"/>
@@ -2859,12 +2946,12 @@
         </p:nvSpPr>
         <p:spPr>
           <a:xfrm>
-            <a:off x="5183188" y="987425"/>
-            <a:ext cx="6172200" cy="4873625"/>
-          </a:xfrm>
-        </p:spPr>
-        <p:txBody>
-          <a:bodyPr/>
+            <a:off x="3887391" y="987426"/>
+            <a:ext cx="4629150" cy="4873625"/>
+          </a:xfrm>
+        </p:spPr>
+        <p:txBody>
+          <a:bodyPr anchor="t"/>
           <a:lstStyle>
             <a:lvl1pPr marL="0" indent="0">
               <a:buNone/>
@@ -2904,13 +2991,17 @@
             </a:lvl9pPr>
           </a:lstStyle>
           <a:p>
-            <a:endParaRPr lang="ru-RU"/>
-          </a:p>
-        </p:txBody>
-      </p:sp>
-      <p:sp>
-        <p:nvSpPr>
-          <p:cNvPr id="4" name="Текст 3"/>
+            <a:r>
+              <a:rPr lang="ru-RU" smtClean="0"/>
+              <a:t>Вставка рисунка</a:t>
+            </a:r>
+            <a:endParaRPr lang="en-US" dirty="0"/>
+          </a:p>
+        </p:txBody>
+      </p:sp>
+      <p:sp>
+        <p:nvSpPr>
+          <p:cNvPr id="4" name="Text Placeholder 3"/>
           <p:cNvSpPr>
             <a:spLocks noGrp="1"/>
           </p:cNvSpPr>
@@ -2920,8 +3011,8 @@
         </p:nvSpPr>
         <p:spPr>
           <a:xfrm>
-            <a:off x="839788" y="2057400"/>
-            <a:ext cx="3932237" cy="3811588"/>
+            <a:off x="629841" y="2057400"/>
+            <a:ext cx="2949178" cy="3811588"/>
           </a:xfrm>
         </p:spPr>
         <p:txBody>
@@ -2975,7 +3066,7 @@
       </p:sp>
       <p:sp>
         <p:nvSpPr>
-          <p:cNvPr id="5" name="Дата 4"/>
+          <p:cNvPr id="5" name="Date Placeholder 4"/>
           <p:cNvSpPr>
             <a:spLocks noGrp="1"/>
           </p:cNvSpPr>
@@ -2990,7 +3081,7 @@
           <a:p>
             <a:fld id="{9D1E7A46-1A4E-41C3-B23B-1269BF8B1FAC}" type="datetimeFigureOut">
               <a:rPr lang="ru-RU" smtClean="0"/>
-              <a:t>17.05.2023</a:t>
+              <a:t>23.05.2023</a:t>
             </a:fld>
             <a:endParaRPr lang="ru-RU"/>
           </a:p>
@@ -2998,7 +3089,7 @@
       </p:sp>
       <p:sp>
         <p:nvSpPr>
-          <p:cNvPr id="6" name="Нижний колонтитул 5"/>
+          <p:cNvPr id="6" name="Footer Placeholder 5"/>
           <p:cNvSpPr>
             <a:spLocks noGrp="1"/>
           </p:cNvSpPr>
@@ -3017,7 +3108,7 @@
       </p:sp>
       <p:sp>
         <p:nvSpPr>
-          <p:cNvPr id="7" name="Номер слайда 6"/>
+          <p:cNvPr id="7" name="Slide Number Placeholder 6"/>
           <p:cNvSpPr>
             <a:spLocks noGrp="1"/>
           </p:cNvSpPr>
@@ -3041,7 +3132,7 @@
     </p:spTree>
     <p:extLst>
       <p:ext uri="{BB962C8B-B14F-4D97-AF65-F5344CB8AC3E}">
-        <p14:creationId xmlns:p14="http://schemas.microsoft.com/office/powerpoint/2010/main" val="501224408"/>
+        <p14:creationId xmlns:p14="http://schemas.microsoft.com/office/powerpoint/2010/main" val="737244541"/>
       </p:ext>
     </p:extLst>
   </p:cSld>
@@ -3075,7 +3166,7 @@
       </p:grpSpPr>
       <p:sp>
         <p:nvSpPr>
-          <p:cNvPr id="2" name="Заголовок 1"/>
+          <p:cNvPr id="2" name="Title Placeholder 1"/>
           <p:cNvSpPr>
             <a:spLocks noGrp="1"/>
           </p:cNvSpPr>
@@ -3085,8 +3176,8 @@
         </p:nvSpPr>
         <p:spPr>
           <a:xfrm>
-            <a:off x="838200" y="365125"/>
-            <a:ext cx="10515600" cy="1325563"/>
+            <a:off x="628650" y="365126"/>
+            <a:ext cx="7886700" cy="1325563"/>
           </a:xfrm>
           <a:prstGeom prst="rect">
             <a:avLst/>
@@ -3102,13 +3193,13 @@
               <a:rPr lang="ru-RU" smtClean="0"/>
               <a:t>Образец заголовка</a:t>
             </a:r>
-            <a:endParaRPr lang="ru-RU"/>
-          </a:p>
-        </p:txBody>
-      </p:sp>
-      <p:sp>
-        <p:nvSpPr>
-          <p:cNvPr id="3" name="Текст 2"/>
+            <a:endParaRPr lang="en-US" dirty="0"/>
+          </a:p>
+        </p:txBody>
+      </p:sp>
+      <p:sp>
+        <p:nvSpPr>
+          <p:cNvPr id="3" name="Text Placeholder 2"/>
           <p:cNvSpPr>
             <a:spLocks noGrp="1"/>
           </p:cNvSpPr>
@@ -3118,8 +3209,8 @@
         </p:nvSpPr>
         <p:spPr>
           <a:xfrm>
-            <a:off x="838200" y="1825625"/>
-            <a:ext cx="10515600" cy="4351338"/>
+            <a:off x="628650" y="1825625"/>
+            <a:ext cx="7886700" cy="4351338"/>
           </a:xfrm>
           <a:prstGeom prst="rect">
             <a:avLst/>
@@ -3164,13 +3255,13 @@
               <a:rPr lang="ru-RU" smtClean="0"/>
               <a:t>Пятый уровень</a:t>
             </a:r>
-            <a:endParaRPr lang="ru-RU"/>
-          </a:p>
-        </p:txBody>
-      </p:sp>
-      <p:sp>
-        <p:nvSpPr>
-          <p:cNvPr id="4" name="Дата 3"/>
+            <a:endParaRPr lang="en-US" dirty="0"/>
+          </a:p>
+        </p:txBody>
+      </p:sp>
+      <p:sp>
+        <p:nvSpPr>
+          <p:cNvPr id="4" name="Date Placeholder 3"/>
           <p:cNvSpPr>
             <a:spLocks noGrp="1"/>
           </p:cNvSpPr>
@@ -3180,8 +3271,8 @@
         </p:nvSpPr>
         <p:spPr>
           <a:xfrm>
-            <a:off x="838200" y="6356350"/>
-            <a:ext cx="2743200" cy="365125"/>
+            <a:off x="628650" y="6356351"/>
+            <a:ext cx="2057400" cy="365125"/>
           </a:xfrm>
           <a:prstGeom prst="rect">
             <a:avLst/>
@@ -3203,7 +3294,7 @@
           <a:p>
             <a:fld id="{9D1E7A46-1A4E-41C3-B23B-1269BF8B1FAC}" type="datetimeFigureOut">
               <a:rPr lang="ru-RU" smtClean="0"/>
-              <a:t>17.05.2023</a:t>
+              <a:t>23.05.2023</a:t>
             </a:fld>
             <a:endParaRPr lang="ru-RU"/>
           </a:p>
@@ -3211,7 +3302,7 @@
       </p:sp>
       <p:sp>
         <p:nvSpPr>
-          <p:cNvPr id="5" name="Нижний колонтитул 4"/>
+          <p:cNvPr id="5" name="Footer Placeholder 4"/>
           <p:cNvSpPr>
             <a:spLocks noGrp="1"/>
           </p:cNvSpPr>
@@ -3221,8 +3312,8 @@
         </p:nvSpPr>
         <p:spPr>
           <a:xfrm>
-            <a:off x="4038600" y="6356350"/>
-            <a:ext cx="4114800" cy="365125"/>
+            <a:off x="3028950" y="6356351"/>
+            <a:ext cx="3086100" cy="365125"/>
           </a:xfrm>
           <a:prstGeom prst="rect">
             <a:avLst/>
@@ -3248,7 +3339,7 @@
       </p:sp>
       <p:sp>
         <p:nvSpPr>
-          <p:cNvPr id="6" name="Номер слайда 5"/>
+          <p:cNvPr id="6" name="Slide Number Placeholder 5"/>
           <p:cNvSpPr>
             <a:spLocks noGrp="1"/>
           </p:cNvSpPr>
@@ -3258,8 +3349,8 @@
         </p:nvSpPr>
         <p:spPr>
           <a:xfrm>
-            <a:off x="8610600" y="6356350"/>
-            <a:ext cx="2743200" cy="365125"/>
+            <a:off x="6457950" y="6356351"/>
+            <a:ext cx="2057400" cy="365125"/>
           </a:xfrm>
           <a:prstGeom prst="rect">
             <a:avLst/>
@@ -3290,23 +3381,23 @@
     </p:spTree>
     <p:extLst>
       <p:ext uri="{BB962C8B-B14F-4D97-AF65-F5344CB8AC3E}">
-        <p14:creationId xmlns:p14="http://schemas.microsoft.com/office/powerpoint/2010/main" val="4013787059"/>
+        <p14:creationId xmlns:p14="http://schemas.microsoft.com/office/powerpoint/2010/main" val="3535096941"/>
       </p:ext>
     </p:extLst>
   </p:cSld>
   <p:clrMap bg1="lt1" tx1="dk1" bg2="lt2" tx2="dk2" accent1="accent1" accent2="accent2" accent3="accent3" accent4="accent4" accent5="accent5" accent6="accent6" hlink="hlink" folHlink="folHlink"/>
   <p:sldLayoutIdLst>
-    <p:sldLayoutId id="2147483649" r:id="rId1"/>
-    <p:sldLayoutId id="2147483650" r:id="rId2"/>
-    <p:sldLayoutId id="2147483651" r:id="rId3"/>
-    <p:sldLayoutId id="2147483652" r:id="rId4"/>
-    <p:sldLayoutId id="2147483653" r:id="rId5"/>
-    <p:sldLayoutId id="2147483654" r:id="rId6"/>
-    <p:sldLayoutId id="2147483655" r:id="rId7"/>
-    <p:sldLayoutId id="2147483656" r:id="rId8"/>
-    <p:sldLayoutId id="2147483657" r:id="rId9"/>
-    <p:sldLayoutId id="2147483658" r:id="rId10"/>
-    <p:sldLayoutId id="2147483659" r:id="rId11"/>
+    <p:sldLayoutId id="2147483661" r:id="rId1"/>
+    <p:sldLayoutId id="2147483662" r:id="rId2"/>
+    <p:sldLayoutId id="2147483663" r:id="rId3"/>
+    <p:sldLayoutId id="2147483664" r:id="rId4"/>
+    <p:sldLayoutId id="2147483665" r:id="rId5"/>
+    <p:sldLayoutId id="2147483666" r:id="rId6"/>
+    <p:sldLayoutId id="2147483667" r:id="rId7"/>
+    <p:sldLayoutId id="2147483668" r:id="rId8"/>
+    <p:sldLayoutId id="2147483669" r:id="rId9"/>
+    <p:sldLayoutId id="2147483670" r:id="rId10"/>
+    <p:sldLayoutId id="2147483671" r:id="rId11"/>
   </p:sldLayoutIdLst>
   <p:txStyles>
     <p:titleStyle>
@@ -3494,7 +3585,7 @@
     </p:bodyStyle>
     <p:otherStyle>
       <a:defPPr>
-        <a:defRPr lang="ru-RU"/>
+        <a:defRPr lang="en-US"/>
       </a:defPPr>
       <a:lvl1pPr marL="0" algn="l" defTabSz="914400" rtl="0" eaLnBrk="1" latinLnBrk="0" hangingPunct="1">
         <a:defRPr sz="1800" kern="1200">
@@ -3620,107 +3711,103 @@
         </p:nvSpPr>
         <p:spPr>
           <a:xfrm>
-            <a:off x="1046018" y="180110"/>
-            <a:ext cx="10099964" cy="1385455"/>
+            <a:off x="0" y="123363"/>
+            <a:ext cx="9144000" cy="1314855"/>
           </a:xfrm>
         </p:spPr>
         <p:txBody>
           <a:bodyPr>
-            <a:normAutofit fontScale="90000"/>
+            <a:normAutofit/>
           </a:bodyPr>
           <a:lstStyle/>
           <a:p>
             <a:r>
-              <a:rPr lang="ru-RU" sz="2000" dirty="0" smtClean="0">
+              <a:rPr lang="ru-RU" sz="1600" dirty="0">
                 <a:latin typeface="Times New Roman" panose="02020603050405020304" pitchFamily="18" charset="0"/>
                 <a:cs typeface="Times New Roman" panose="02020603050405020304" pitchFamily="18" charset="0"/>
               </a:rPr>
               <a:t>МИНИСТЕРСТВО НАУКИ И ВЫСШЕГО ОБРАЗОВАНИЯ РОССИЙСКОЙ ФЕДЕРАЦИИ </a:t>
             </a:r>
             <a:r>
-              <a:rPr lang="en-US" sz="2000" dirty="0" smtClean="0">
+              <a:rPr lang="en-US" sz="1600" dirty="0">
                 <a:latin typeface="Times New Roman" panose="02020603050405020304" pitchFamily="18" charset="0"/>
                 <a:cs typeface="Times New Roman" panose="02020603050405020304" pitchFamily="18" charset="0"/>
               </a:rPr>
               <a:t/>
             </a:r>
             <a:br>
-              <a:rPr lang="en-US" sz="2000" dirty="0" smtClean="0">
+              <a:rPr lang="en-US" sz="1600" dirty="0">
                 <a:latin typeface="Times New Roman" panose="02020603050405020304" pitchFamily="18" charset="0"/>
                 <a:cs typeface="Times New Roman" panose="02020603050405020304" pitchFamily="18" charset="0"/>
               </a:rPr>
             </a:br>
             <a:r>
-              <a:rPr lang="ru-RU" sz="2000" dirty="0" smtClean="0">
+              <a:rPr lang="ru-RU" sz="1600" dirty="0">
                 <a:latin typeface="Times New Roman" panose="02020603050405020304" pitchFamily="18" charset="0"/>
                 <a:cs typeface="Times New Roman" panose="02020603050405020304" pitchFamily="18" charset="0"/>
               </a:rPr>
               <a:t>Федеральное государственное автономное образовательное учреждение высшего образования </a:t>
             </a:r>
             <a:r>
-              <a:rPr lang="en-US" sz="2000" dirty="0" smtClean="0">
+              <a:rPr lang="en-US" sz="1600" dirty="0">
                 <a:latin typeface="Times New Roman" panose="02020603050405020304" pitchFamily="18" charset="0"/>
                 <a:cs typeface="Times New Roman" panose="02020603050405020304" pitchFamily="18" charset="0"/>
               </a:rPr>
               <a:t/>
             </a:r>
             <a:br>
-              <a:rPr lang="en-US" sz="2000" dirty="0" smtClean="0">
+              <a:rPr lang="en-US" sz="1600" dirty="0">
                 <a:latin typeface="Times New Roman" panose="02020603050405020304" pitchFamily="18" charset="0"/>
                 <a:cs typeface="Times New Roman" panose="02020603050405020304" pitchFamily="18" charset="0"/>
               </a:rPr>
             </a:br>
             <a:r>
-              <a:rPr lang="ru-RU" sz="2000" dirty="0" smtClean="0">
+              <a:rPr lang="ru-RU" sz="1600" dirty="0">
                 <a:latin typeface="Times New Roman" panose="02020603050405020304" pitchFamily="18" charset="0"/>
                 <a:cs typeface="Times New Roman" panose="02020603050405020304" pitchFamily="18" charset="0"/>
               </a:rPr>
               <a:t>«Южно-Уральский государственный университет (национальный исследовательский университет)» </a:t>
             </a:r>
             <a:r>
-              <a:rPr lang="en-US" sz="2000" dirty="0" smtClean="0">
+              <a:rPr lang="en-US" sz="1600" dirty="0">
                 <a:latin typeface="Times New Roman" panose="02020603050405020304" pitchFamily="18" charset="0"/>
                 <a:cs typeface="Times New Roman" panose="02020603050405020304" pitchFamily="18" charset="0"/>
               </a:rPr>
               <a:t/>
             </a:r>
             <a:br>
-              <a:rPr lang="en-US" sz="2000" dirty="0" smtClean="0">
+              <a:rPr lang="en-US" sz="1600" dirty="0">
                 <a:latin typeface="Times New Roman" panose="02020603050405020304" pitchFamily="18" charset="0"/>
                 <a:cs typeface="Times New Roman" panose="02020603050405020304" pitchFamily="18" charset="0"/>
               </a:rPr>
             </a:br>
             <a:r>
-              <a:rPr lang="ru-RU" sz="2000" dirty="0" smtClean="0">
+              <a:rPr lang="ru-RU" sz="1600" dirty="0">
                 <a:latin typeface="Times New Roman" panose="02020603050405020304" pitchFamily="18" charset="0"/>
                 <a:cs typeface="Times New Roman" panose="02020603050405020304" pitchFamily="18" charset="0"/>
               </a:rPr>
               <a:t>Высшая школа электроники и компьютерных наук </a:t>
             </a:r>
             <a:r>
-              <a:rPr lang="en-US" sz="2000" dirty="0" smtClean="0">
+              <a:rPr lang="en-US" sz="1600" dirty="0">
                 <a:latin typeface="Times New Roman" panose="02020603050405020304" pitchFamily="18" charset="0"/>
                 <a:cs typeface="Times New Roman" panose="02020603050405020304" pitchFamily="18" charset="0"/>
               </a:rPr>
               <a:t/>
             </a:r>
             <a:br>
-              <a:rPr lang="en-US" sz="2000" dirty="0" smtClean="0">
+              <a:rPr lang="en-US" sz="1600" dirty="0">
                 <a:latin typeface="Times New Roman" panose="02020603050405020304" pitchFamily="18" charset="0"/>
                 <a:cs typeface="Times New Roman" panose="02020603050405020304" pitchFamily="18" charset="0"/>
               </a:rPr>
             </a:br>
             <a:r>
-              <a:rPr lang="ru-RU" sz="2000" dirty="0" smtClean="0">
+              <a:rPr lang="ru-RU" sz="1600" dirty="0">
                 <a:latin typeface="Times New Roman" panose="02020603050405020304" pitchFamily="18" charset="0"/>
                 <a:cs typeface="Times New Roman" panose="02020603050405020304" pitchFamily="18" charset="0"/>
               </a:rPr>
               <a:t>Кафедра системного программирования </a:t>
             </a:r>
-            <a:endParaRPr lang="ru-RU" sz="2000" dirty="0">
-              <a:latin typeface="Times New Roman" panose="02020603050405020304" pitchFamily="18" charset="0"/>
-              <a:cs typeface="Times New Roman" panose="02020603050405020304" pitchFamily="18" charset="0"/>
-            </a:endParaRPr>
           </a:p>
         </p:txBody>
       </p:sp>
@@ -3736,7 +3823,7 @@
         </p:nvSpPr>
         <p:spPr>
           <a:xfrm>
-            <a:off x="1524000" y="2410546"/>
+            <a:off x="0" y="2528973"/>
             <a:ext cx="9144000" cy="1454871"/>
           </a:xfrm>
         </p:spPr>
@@ -3747,7 +3834,7 @@
           <a:lstStyle/>
           <a:p>
             <a:r>
-              <a:rPr lang="ru-RU" sz="3000" b="1" dirty="0" smtClean="0">
+              <a:rPr lang="ru-RU" sz="3000" b="1" dirty="0">
                 <a:latin typeface="Times New Roman" panose="02020603050405020304" pitchFamily="18" charset="0"/>
                 <a:cs typeface="Times New Roman" panose="02020603050405020304" pitchFamily="18" charset="0"/>
               </a:rPr>
@@ -3768,7 +3855,7 @@
         </p:nvSpPr>
         <p:spPr>
           <a:xfrm>
-            <a:off x="1046018" y="4505236"/>
+            <a:off x="419100" y="4505236"/>
             <a:ext cx="3193473" cy="923330"/>
           </a:xfrm>
           <a:prstGeom prst="rect">
@@ -3783,8 +3870,7 @@
           <a:p>
             <a:pPr marL="22860"/>
             <a:r>
-              <a:rPr lang="ru-RU" dirty="0" smtClean="0">
-                <a:effectLst/>
+              <a:rPr lang="ru-RU" dirty="0">
                 <a:latin typeface="Times New Roman" panose="02020603050405020304" pitchFamily="18" charset="0"/>
                 <a:cs typeface="Times New Roman" panose="02020603050405020304" pitchFamily="18" charset="0"/>
               </a:rPr>
@@ -3794,16 +3880,14 @@
           <a:p>
             <a:pPr marL="22860"/>
             <a:r>
-              <a:rPr lang="ru-RU" dirty="0" smtClean="0">
-                <a:effectLst/>
+              <a:rPr lang="ru-RU" dirty="0">
                 <a:latin typeface="Times New Roman" panose="02020603050405020304" pitchFamily="18" charset="0"/>
                 <a:cs typeface="Times New Roman" panose="02020603050405020304" pitchFamily="18" charset="0"/>
               </a:rPr>
               <a:t>доцент кафедры СП, к.ф.-м.н.,</a:t>
             </a:r>
             <a:r>
-              <a:rPr lang="en-US" dirty="0" smtClean="0">
-                <a:effectLst/>
+              <a:rPr lang="en-US" dirty="0">
                 <a:latin typeface="Times New Roman" panose="02020603050405020304" pitchFamily="18" charset="0"/>
                 <a:cs typeface="Times New Roman" panose="02020603050405020304" pitchFamily="18" charset="0"/>
               </a:rPr>
@@ -3813,40 +3897,26 @@
           <a:p>
             <a:pPr marL="22860"/>
             <a:r>
-              <a:rPr lang="ru-RU" dirty="0" smtClean="0">
-                <a:latin typeface="Times New Roman" panose="02020603050405020304" pitchFamily="18" charset="0"/>
-                <a:cs typeface="Times New Roman" panose="02020603050405020304" pitchFamily="18" charset="0"/>
-              </a:rPr>
-              <a:t>д</a:t>
-            </a:r>
-            <a:r>
-              <a:rPr lang="ru-RU" dirty="0" smtClean="0">
-                <a:effectLst/>
-                <a:latin typeface="Times New Roman" panose="02020603050405020304" pitchFamily="18" charset="0"/>
-                <a:cs typeface="Times New Roman" panose="02020603050405020304" pitchFamily="18" charset="0"/>
-              </a:rPr>
-              <a:t>оцент</a:t>
-            </a:r>
-            <a:r>
-              <a:rPr lang="en-US" dirty="0" smtClean="0">
+              <a:rPr lang="ru-RU" dirty="0">
+                <a:latin typeface="Times New Roman" panose="02020603050405020304" pitchFamily="18" charset="0"/>
+                <a:cs typeface="Times New Roman" panose="02020603050405020304" pitchFamily="18" charset="0"/>
+              </a:rPr>
+              <a:t>доцент</a:t>
+            </a:r>
+            <a:r>
+              <a:rPr lang="en-US" dirty="0">
                 <a:latin typeface="Times New Roman" panose="02020603050405020304" pitchFamily="18" charset="0"/>
                 <a:cs typeface="Times New Roman" panose="02020603050405020304" pitchFamily="18" charset="0"/>
               </a:rPr>
               <a:t> </a:t>
             </a:r>
             <a:r>
-              <a:rPr lang="ru-RU" dirty="0" smtClean="0">
-                <a:effectLst/>
+              <a:rPr lang="ru-RU" dirty="0">
                 <a:latin typeface="Times New Roman" panose="02020603050405020304" pitchFamily="18" charset="0"/>
                 <a:cs typeface="Times New Roman" panose="02020603050405020304" pitchFamily="18" charset="0"/>
               </a:rPr>
               <a:t>Г.И. Радченко</a:t>
             </a:r>
-            <a:endParaRPr lang="ru-RU" dirty="0">
-              <a:effectLst/>
-              <a:latin typeface="Times New Roman" panose="02020603050405020304" pitchFamily="18" charset="0"/>
-              <a:cs typeface="Times New Roman" panose="02020603050405020304" pitchFamily="18" charset="0"/>
-            </a:endParaRPr>
           </a:p>
         </p:txBody>
       </p:sp>
@@ -3858,8 +3928,8 @@
         </p:nvSpPr>
         <p:spPr>
           <a:xfrm>
-            <a:off x="8451273" y="4505236"/>
-            <a:ext cx="3546764" cy="923330"/>
+            <a:off x="6123710" y="4505236"/>
+            <a:ext cx="2618508" cy="923330"/>
           </a:xfrm>
           <a:prstGeom prst="rect">
             <a:avLst/>
@@ -3873,23 +3943,20 @@
           <a:p>
             <a:pPr marL="22860"/>
             <a:r>
-              <a:rPr lang="ru-RU" dirty="0" smtClean="0">
-                <a:effectLst/>
+              <a:rPr lang="ru-RU" dirty="0">
                 <a:latin typeface="Times New Roman" panose="02020603050405020304" pitchFamily="18" charset="0"/>
                 <a:cs typeface="Times New Roman" panose="02020603050405020304" pitchFamily="18" charset="0"/>
               </a:rPr>
               <a:t>Автор:</a:t>
             </a:r>
             <a:br>
-              <a:rPr lang="ru-RU" dirty="0" smtClean="0">
-                <a:effectLst/>
+              <a:rPr lang="ru-RU" dirty="0">
                 <a:latin typeface="Times New Roman" panose="02020603050405020304" pitchFamily="18" charset="0"/>
                 <a:cs typeface="Times New Roman" panose="02020603050405020304" pitchFamily="18" charset="0"/>
               </a:rPr>
             </a:br>
             <a:r>
-              <a:rPr lang="ru-RU" dirty="0" smtClean="0">
-                <a:effectLst/>
+              <a:rPr lang="ru-RU" dirty="0">
                 <a:latin typeface="Times New Roman" panose="02020603050405020304" pitchFamily="18" charset="0"/>
                 <a:cs typeface="Times New Roman" panose="02020603050405020304" pitchFamily="18" charset="0"/>
               </a:rPr>
@@ -3899,18 +3966,12 @@
           <a:p>
             <a:pPr marL="22860"/>
             <a:r>
-              <a:rPr lang="ru-RU" dirty="0" smtClean="0">
-                <a:effectLst/>
+              <a:rPr lang="ru-RU" dirty="0">
                 <a:latin typeface="Times New Roman" panose="02020603050405020304" pitchFamily="18" charset="0"/>
                 <a:cs typeface="Times New Roman" panose="02020603050405020304" pitchFamily="18" charset="0"/>
               </a:rPr>
               <a:t>В.О. Богатырева</a:t>
             </a:r>
-            <a:endParaRPr lang="ru-RU" dirty="0">
-              <a:effectLst/>
-              <a:latin typeface="Times New Roman" panose="02020603050405020304" pitchFamily="18" charset="0"/>
-              <a:cs typeface="Times New Roman" panose="02020603050405020304" pitchFamily="18" charset="0"/>
-            </a:endParaRPr>
           </a:p>
         </p:txBody>
       </p:sp>
@@ -3922,7 +3983,7 @@
         </p:nvSpPr>
         <p:spPr>
           <a:xfrm>
-            <a:off x="5136572" y="6389454"/>
+            <a:off x="3612573" y="6389454"/>
             <a:ext cx="1918855" cy="338554"/>
           </a:xfrm>
           <a:prstGeom prst="rect">
@@ -3937,18 +3998,12 @@
           <a:p>
             <a:pPr marL="22860"/>
             <a:r>
-              <a:rPr lang="ru-RU" sz="1600" dirty="0" smtClean="0">
-                <a:effectLst/>
+              <a:rPr lang="ru-RU" sz="1600" dirty="0">
                 <a:latin typeface="Times New Roman" panose="02020603050405020304" pitchFamily="18" charset="0"/>
                 <a:cs typeface="Times New Roman" panose="02020603050405020304" pitchFamily="18" charset="0"/>
               </a:rPr>
               <a:t>Челябинск, 2023 г.</a:t>
             </a:r>
-            <a:endParaRPr lang="ru-RU" sz="1600" dirty="0">
-              <a:effectLst/>
-              <a:latin typeface="Times New Roman" panose="02020603050405020304" pitchFamily="18" charset="0"/>
-              <a:cs typeface="Times New Roman" panose="02020603050405020304" pitchFamily="18" charset="0"/>
-            </a:endParaRPr>
           </a:p>
         </p:txBody>
       </p:sp>
@@ -4001,25 +4056,45 @@
         </p:nvSpPr>
         <p:spPr>
           <a:xfrm>
-            <a:off x="838198" y="221673"/>
-            <a:ext cx="10515600" cy="895639"/>
+            <a:off x="0" y="221674"/>
+            <a:ext cx="9144000" cy="895639"/>
           </a:xfrm>
         </p:spPr>
         <p:txBody>
           <a:bodyPr>
-            <a:normAutofit fontScale="90000"/>
+            <a:noAutofit/>
           </a:bodyPr>
           <a:lstStyle/>
           <a:p>
             <a:pPr algn="ctr"/>
             <a:r>
-              <a:rPr lang="ru-RU" sz="3600" b="1" dirty="0" smtClean="0">
-                <a:latin typeface="Times New Roman" panose="02020603050405020304" pitchFamily="18" charset="0"/>
-                <a:cs typeface="Times New Roman" panose="02020603050405020304" pitchFamily="18" charset="0"/>
-              </a:rPr>
-              <a:t>ДИАГРАММА КОМПОНЕНТОВ ВЕБ-ИНТЕРФЕЙСА</a:t>
-            </a:r>
-            <a:endParaRPr lang="ru-RU" sz="3600" b="1" dirty="0">
+              <a:rPr lang="ru-RU" sz="3000" b="1" dirty="0">
+                <a:latin typeface="Times New Roman" panose="02020603050405020304" pitchFamily="18" charset="0"/>
+                <a:cs typeface="Times New Roman" panose="02020603050405020304" pitchFamily="18" charset="0"/>
+              </a:rPr>
+              <a:t>ДИАГРАММА КОМПОНЕНТОВ </a:t>
+            </a:r>
+            <a:r>
+              <a:rPr lang="ru-RU" sz="3000" b="1" dirty="0" smtClean="0">
+                <a:latin typeface="Times New Roman" panose="02020603050405020304" pitchFamily="18" charset="0"/>
+                <a:cs typeface="Times New Roman" panose="02020603050405020304" pitchFamily="18" charset="0"/>
+              </a:rPr>
+              <a:t/>
+            </a:r>
+            <a:br>
+              <a:rPr lang="ru-RU" sz="3000" b="1" dirty="0" smtClean="0">
+                <a:latin typeface="Times New Roman" panose="02020603050405020304" pitchFamily="18" charset="0"/>
+                <a:cs typeface="Times New Roman" panose="02020603050405020304" pitchFamily="18" charset="0"/>
+              </a:rPr>
+            </a:br>
+            <a:r>
+              <a:rPr lang="ru-RU" sz="3000" b="1" dirty="0" smtClean="0">
+                <a:latin typeface="Times New Roman" panose="02020603050405020304" pitchFamily="18" charset="0"/>
+                <a:cs typeface="Times New Roman" panose="02020603050405020304" pitchFamily="18" charset="0"/>
+              </a:rPr>
+              <a:t>ВЕБ-ИНТЕРФЕЙСА</a:t>
+            </a:r>
+            <a:endParaRPr lang="ru-RU" sz="3000" b="1" dirty="0">
               <a:latin typeface="Times New Roman" panose="02020603050405020304" pitchFamily="18" charset="0"/>
               <a:cs typeface="Times New Roman" panose="02020603050405020304" pitchFamily="18" charset="0"/>
             </a:endParaRPr>
@@ -4051,8 +4126,8 @@
         </p:blipFill>
         <p:spPr bwMode="auto">
           <a:xfrm>
-            <a:off x="2378000" y="1662968"/>
-            <a:ext cx="7435995" cy="3903456"/>
+            <a:off x="1057382" y="1881081"/>
+            <a:ext cx="7029235" cy="3689931"/>
           </a:xfrm>
           <a:prstGeom prst="rect">
             <a:avLst/>
@@ -4077,7 +4152,7 @@
         </p:nvSpPr>
         <p:spPr>
           <a:xfrm>
-            <a:off x="11111345" y="6334780"/>
+            <a:off x="7883236" y="6334781"/>
             <a:ext cx="1080656" cy="430887"/>
           </a:xfrm>
           <a:prstGeom prst="rect">
@@ -4186,29 +4261,25 @@
           </a:lstStyle>
           <a:p>
             <a:r>
-              <a:rPr lang="ru-RU" sz="2200" dirty="0" smtClean="0">
+              <a:rPr lang="ru-RU" sz="2200" dirty="0">
                 <a:latin typeface="Times New Roman" panose="02020603050405020304" pitchFamily="18" charset="0"/>
                 <a:cs typeface="Times New Roman" panose="02020603050405020304" pitchFamily="18" charset="0"/>
               </a:rPr>
               <a:t>10/18</a:t>
             </a:r>
-            <a:endParaRPr lang="ru-RU" sz="2200" dirty="0">
-              <a:latin typeface="Times New Roman" panose="02020603050405020304" pitchFamily="18" charset="0"/>
-              <a:cs typeface="Times New Roman" panose="02020603050405020304" pitchFamily="18" charset="0"/>
-            </a:endParaRPr>
-          </a:p>
-        </p:txBody>
-      </p:sp>
-      <p:sp>
-        <p:nvSpPr>
-          <p:cNvPr id="7" name="Прямоугольник 6"/>
+          </a:p>
+        </p:txBody>
+      </p:sp>
+      <p:sp>
+        <p:nvSpPr>
+          <p:cNvPr id="6" name="Прямоугольник 5"/>
           <p:cNvSpPr/>
           <p:nvPr/>
         </p:nvSpPr>
         <p:spPr>
           <a:xfrm>
-            <a:off x="117062" y="6334780"/>
-            <a:ext cx="3100529" cy="430887"/>
+            <a:off x="0" y="5981495"/>
+            <a:ext cx="2826415" cy="400110"/>
           </a:xfrm>
           <a:prstGeom prst="rect">
             <a:avLst/>
@@ -4221,11 +4292,42 @@
           <a:lstStyle/>
           <a:p>
             <a:r>
-              <a:rPr lang="ru-RU" sz="2200" dirty="0">
+              <a:rPr lang="ru-RU" sz="2000" dirty="0">
                 <a:latin typeface="Times New Roman" panose="02020603050405020304" pitchFamily="18" charset="0"/>
                 <a:cs typeface="Times New Roman" panose="02020603050405020304" pitchFamily="18" charset="0"/>
               </a:rPr>
               <a:t>http://veronijo.beget.tech/</a:t>
+            </a:r>
+          </a:p>
+        </p:txBody>
+      </p:sp>
+      <p:sp>
+        <p:nvSpPr>
+          <p:cNvPr id="8" name="Прямоугольник 7"/>
+          <p:cNvSpPr/>
+          <p:nvPr/>
+        </p:nvSpPr>
+        <p:spPr>
+          <a:xfrm>
+            <a:off x="0" y="6362992"/>
+            <a:ext cx="4410759" cy="400110"/>
+          </a:xfrm>
+          <a:prstGeom prst="rect">
+            <a:avLst/>
+          </a:prstGeom>
+        </p:spPr>
+        <p:txBody>
+          <a:bodyPr wrap="none">
+            <a:spAutoFit/>
+          </a:bodyPr>
+          <a:lstStyle/>
+          <a:p>
+            <a:r>
+              <a:rPr lang="ru-RU" sz="2000" dirty="0">
+                <a:latin typeface="Times New Roman" panose="02020603050405020304" pitchFamily="18" charset="0"/>
+                <a:cs typeface="Times New Roman" panose="02020603050405020304" pitchFamily="18" charset="0"/>
+              </a:rPr>
+              <a:t>https://github.com/wbogatyrewa/EVoting</a:t>
             </a:r>
           </a:p>
         </p:txBody>
@@ -4279,8 +4381,8 @@
         </p:nvSpPr>
         <p:spPr>
           <a:xfrm>
-            <a:off x="838198" y="22077"/>
-            <a:ext cx="10515600" cy="895639"/>
+            <a:off x="0" y="22078"/>
+            <a:ext cx="9144000" cy="895639"/>
           </a:xfrm>
         </p:spPr>
         <p:txBody>
@@ -4291,16 +4393,12 @@
           <a:p>
             <a:pPr algn="ctr"/>
             <a:r>
-              <a:rPr lang="ru-RU" sz="3600" b="1" dirty="0" smtClean="0">
+              <a:rPr lang="ru-RU" sz="3600" b="1" dirty="0">
                 <a:latin typeface="Times New Roman" panose="02020603050405020304" pitchFamily="18" charset="0"/>
                 <a:cs typeface="Times New Roman" panose="02020603050405020304" pitchFamily="18" charset="0"/>
               </a:rPr>
               <a:t>СОЗДАНИЕ ГОЛОСОВАНИЯ</a:t>
             </a:r>
-            <a:endParaRPr lang="ru-RU" sz="3600" b="1" dirty="0">
-              <a:latin typeface="Times New Roman" panose="02020603050405020304" pitchFamily="18" charset="0"/>
-              <a:cs typeface="Times New Roman" panose="02020603050405020304" pitchFamily="18" charset="0"/>
-            </a:endParaRPr>
           </a:p>
         </p:txBody>
       </p:sp>
@@ -4329,8 +4427,8 @@
         </p:blipFill>
         <p:spPr bwMode="auto">
           <a:xfrm>
-            <a:off x="1013423" y="800037"/>
-            <a:ext cx="10165150" cy="5652423"/>
+            <a:off x="165316" y="917717"/>
+            <a:ext cx="8813367" cy="4900752"/>
           </a:xfrm>
           <a:prstGeom prst="rect">
             <a:avLst/>
@@ -4355,7 +4453,7 @@
         </p:nvSpPr>
         <p:spPr>
           <a:xfrm>
-            <a:off x="11062851" y="6427112"/>
+            <a:off x="8063344" y="6351098"/>
             <a:ext cx="1080656" cy="430887"/>
           </a:xfrm>
           <a:prstGeom prst="rect">
@@ -4464,29 +4562,25 @@
           </a:lstStyle>
           <a:p>
             <a:r>
-              <a:rPr lang="ru-RU" sz="2200" dirty="0" smtClean="0">
+              <a:rPr lang="ru-RU" sz="2200" dirty="0">
                 <a:latin typeface="Times New Roman" panose="02020603050405020304" pitchFamily="18" charset="0"/>
                 <a:cs typeface="Times New Roman" panose="02020603050405020304" pitchFamily="18" charset="0"/>
               </a:rPr>
               <a:t>11/18</a:t>
             </a:r>
-            <a:endParaRPr lang="ru-RU" sz="2200" dirty="0">
-              <a:latin typeface="Times New Roman" panose="02020603050405020304" pitchFamily="18" charset="0"/>
-              <a:cs typeface="Times New Roman" panose="02020603050405020304" pitchFamily="18" charset="0"/>
-            </a:endParaRPr>
-          </a:p>
-        </p:txBody>
-      </p:sp>
-      <p:sp>
-        <p:nvSpPr>
-          <p:cNvPr id="5" name="Прямоугольник 4"/>
+          </a:p>
+        </p:txBody>
+      </p:sp>
+      <p:sp>
+        <p:nvSpPr>
+          <p:cNvPr id="7" name="Прямоугольник 6"/>
           <p:cNvSpPr/>
           <p:nvPr/>
         </p:nvSpPr>
         <p:spPr>
           <a:xfrm>
-            <a:off x="103208" y="6427113"/>
-            <a:ext cx="3100529" cy="430887"/>
+            <a:off x="0" y="5981495"/>
+            <a:ext cx="2826415" cy="400110"/>
           </a:xfrm>
           <a:prstGeom prst="rect">
             <a:avLst/>
@@ -4499,11 +4593,42 @@
           <a:lstStyle/>
           <a:p>
             <a:r>
-              <a:rPr lang="ru-RU" sz="2200" dirty="0">
+              <a:rPr lang="ru-RU" sz="2000" dirty="0">
                 <a:latin typeface="Times New Roman" panose="02020603050405020304" pitchFamily="18" charset="0"/>
                 <a:cs typeface="Times New Roman" panose="02020603050405020304" pitchFamily="18" charset="0"/>
               </a:rPr>
               <a:t>http://veronijo.beget.tech/</a:t>
+            </a:r>
+          </a:p>
+        </p:txBody>
+      </p:sp>
+      <p:sp>
+        <p:nvSpPr>
+          <p:cNvPr id="8" name="Прямоугольник 7"/>
+          <p:cNvSpPr/>
+          <p:nvPr/>
+        </p:nvSpPr>
+        <p:spPr>
+          <a:xfrm>
+            <a:off x="0" y="6362992"/>
+            <a:ext cx="4410759" cy="400110"/>
+          </a:xfrm>
+          <a:prstGeom prst="rect">
+            <a:avLst/>
+          </a:prstGeom>
+        </p:spPr>
+        <p:txBody>
+          <a:bodyPr wrap="none">
+            <a:spAutoFit/>
+          </a:bodyPr>
+          <a:lstStyle/>
+          <a:p>
+            <a:r>
+              <a:rPr lang="ru-RU" sz="2000" dirty="0">
+                <a:latin typeface="Times New Roman" panose="02020603050405020304" pitchFamily="18" charset="0"/>
+                <a:cs typeface="Times New Roman" panose="02020603050405020304" pitchFamily="18" charset="0"/>
+              </a:rPr>
+              <a:t>https://github.com/wbogatyrewa/EVoting</a:t>
             </a:r>
           </a:p>
         </p:txBody>
@@ -4557,8 +4682,8 @@
         </p:nvSpPr>
         <p:spPr>
           <a:xfrm>
-            <a:off x="838200" y="0"/>
-            <a:ext cx="10515600" cy="895639"/>
+            <a:off x="0" y="1"/>
+            <a:ext cx="9144000" cy="895639"/>
           </a:xfrm>
         </p:spPr>
         <p:txBody>
@@ -4569,16 +4694,12 @@
           <a:p>
             <a:pPr algn="ctr"/>
             <a:r>
-              <a:rPr lang="ru-RU" sz="3600" b="1" dirty="0" smtClean="0">
+              <a:rPr lang="ru-RU" sz="3600" b="1" dirty="0">
                 <a:latin typeface="Times New Roman" panose="02020603050405020304" pitchFamily="18" charset="0"/>
                 <a:cs typeface="Times New Roman" panose="02020603050405020304" pitchFamily="18" charset="0"/>
               </a:rPr>
               <a:t>СРЕДСТВА РЕАЛИЗАЦИИ</a:t>
             </a:r>
-            <a:endParaRPr lang="ru-RU" sz="3600" b="1" dirty="0">
-              <a:latin typeface="Times New Roman" panose="02020603050405020304" pitchFamily="18" charset="0"/>
-              <a:cs typeface="Times New Roman" panose="02020603050405020304" pitchFamily="18" charset="0"/>
-            </a:endParaRPr>
           </a:p>
         </p:txBody>
       </p:sp>
@@ -4594,13 +4715,13 @@
         </p:nvSpPr>
         <p:spPr>
           <a:xfrm>
-            <a:off x="838200" y="721096"/>
-            <a:ext cx="10515600" cy="5611092"/>
+            <a:off x="332508" y="721096"/>
+            <a:ext cx="8215747" cy="5611092"/>
           </a:xfrm>
         </p:spPr>
         <p:txBody>
           <a:bodyPr>
-            <a:normAutofit fontScale="70000" lnSpcReduction="20000"/>
+            <a:normAutofit fontScale="62500" lnSpcReduction="20000"/>
           </a:bodyPr>
           <a:lstStyle/>
           <a:p>
@@ -5078,7 +5199,7 @@
         </p:nvSpPr>
         <p:spPr>
           <a:xfrm>
-            <a:off x="11111344" y="6434737"/>
+            <a:off x="8063344" y="6427113"/>
             <a:ext cx="1080656" cy="430887"/>
           </a:xfrm>
           <a:prstGeom prst="rect">
@@ -5187,47 +5308,85 @@
           </a:lstStyle>
           <a:p>
             <a:r>
-              <a:rPr lang="ru-RU" sz="2200" dirty="0" smtClean="0">
+              <a:rPr lang="ru-RU" sz="2200" dirty="0">
                 <a:latin typeface="Times New Roman" panose="02020603050405020304" pitchFamily="18" charset="0"/>
                 <a:cs typeface="Times New Roman" panose="02020603050405020304" pitchFamily="18" charset="0"/>
               </a:rPr>
               <a:t>12/18</a:t>
             </a:r>
-            <a:endParaRPr lang="ru-RU" sz="2200" dirty="0">
+          </a:p>
+        </p:txBody>
+      </p:sp>
+      <p:sp>
+        <p:nvSpPr>
+          <p:cNvPr id="7" name="Прямоугольник 6"/>
+          <p:cNvSpPr/>
+          <p:nvPr/>
+        </p:nvSpPr>
+        <p:spPr>
+          <a:xfrm>
+            <a:off x="0" y="6194985"/>
+            <a:ext cx="2569934" cy="369332"/>
+          </a:xfrm>
+          <a:prstGeom prst="rect">
+            <a:avLst/>
+          </a:prstGeom>
+        </p:spPr>
+        <p:txBody>
+          <a:bodyPr wrap="none">
+            <a:spAutoFit/>
+          </a:bodyPr>
+          <a:lstStyle/>
+          <a:p>
+            <a:r>
+              <a:rPr lang="ru-RU" dirty="0">
+                <a:latin typeface="Times New Roman" panose="02020603050405020304" pitchFamily="18" charset="0"/>
+                <a:cs typeface="Times New Roman" panose="02020603050405020304" pitchFamily="18" charset="0"/>
+              </a:rPr>
+              <a:t>http://veronijo.beget.tech/</a:t>
+            </a:r>
+          </a:p>
+        </p:txBody>
+      </p:sp>
+      <p:sp>
+        <p:nvSpPr>
+          <p:cNvPr id="8" name="Прямоугольник 7"/>
+          <p:cNvSpPr/>
+          <p:nvPr/>
+        </p:nvSpPr>
+        <p:spPr>
+          <a:xfrm>
+            <a:off x="0" y="6513630"/>
+            <a:ext cx="4063035" cy="400110"/>
+          </a:xfrm>
+          <a:prstGeom prst="rect">
+            <a:avLst/>
+          </a:prstGeom>
+        </p:spPr>
+        <p:txBody>
+          <a:bodyPr wrap="none">
+            <a:spAutoFit/>
+          </a:bodyPr>
+          <a:lstStyle/>
+          <a:p>
+            <a:r>
+              <a:rPr lang="ru-RU" sz="2000" dirty="0">
+                <a:latin typeface="Times New Roman" panose="02020603050405020304" pitchFamily="18" charset="0"/>
+                <a:cs typeface="Times New Roman" panose="02020603050405020304" pitchFamily="18" charset="0"/>
+              </a:rPr>
+              <a:t>https://</a:t>
+            </a:r>
+            <a:r>
+              <a:rPr lang="ru-RU" dirty="0">
+                <a:latin typeface="Times New Roman" panose="02020603050405020304" pitchFamily="18" charset="0"/>
+                <a:cs typeface="Times New Roman" panose="02020603050405020304" pitchFamily="18" charset="0"/>
+              </a:rPr>
+              <a:t>github.com/wbogatyrewa/EVoting</a:t>
+            </a:r>
+            <a:endParaRPr lang="ru-RU" sz="2000" dirty="0">
               <a:latin typeface="Times New Roman" panose="02020603050405020304" pitchFamily="18" charset="0"/>
               <a:cs typeface="Times New Roman" panose="02020603050405020304" pitchFamily="18" charset="0"/>
             </a:endParaRPr>
-          </a:p>
-        </p:txBody>
-      </p:sp>
-      <p:sp>
-        <p:nvSpPr>
-          <p:cNvPr id="6" name="Прямоугольник 5"/>
-          <p:cNvSpPr/>
-          <p:nvPr/>
-        </p:nvSpPr>
-        <p:spPr>
-          <a:xfrm>
-            <a:off x="0" y="6434738"/>
-            <a:ext cx="3100529" cy="430887"/>
-          </a:xfrm>
-          <a:prstGeom prst="rect">
-            <a:avLst/>
-          </a:prstGeom>
-        </p:spPr>
-        <p:txBody>
-          <a:bodyPr wrap="none">
-            <a:spAutoFit/>
-          </a:bodyPr>
-          <a:lstStyle/>
-          <a:p>
-            <a:r>
-              <a:rPr lang="ru-RU" sz="2200" dirty="0">
-                <a:latin typeface="Times New Roman" panose="02020603050405020304" pitchFamily="18" charset="0"/>
-                <a:cs typeface="Times New Roman" panose="02020603050405020304" pitchFamily="18" charset="0"/>
-              </a:rPr>
-              <a:t>http://veronijo.beget.tech/</a:t>
-            </a:r>
           </a:p>
         </p:txBody>
       </p:sp>
@@ -5280,8 +5439,8 @@
         </p:nvSpPr>
         <p:spPr>
           <a:xfrm>
-            <a:off x="838200" y="0"/>
-            <a:ext cx="10515600" cy="895639"/>
+            <a:off x="0" y="1"/>
+            <a:ext cx="9144000" cy="895639"/>
           </a:xfrm>
         </p:spPr>
         <p:txBody>
@@ -5292,16 +5451,12 @@
           <a:p>
             <a:pPr algn="ctr"/>
             <a:r>
-              <a:rPr lang="ru-RU" sz="3600" b="1" dirty="0" smtClean="0">
+              <a:rPr lang="ru-RU" sz="3600" b="1" dirty="0">
                 <a:latin typeface="Times New Roman" panose="02020603050405020304" pitchFamily="18" charset="0"/>
                 <a:cs typeface="Times New Roman" panose="02020603050405020304" pitchFamily="18" charset="0"/>
               </a:rPr>
               <a:t>ГЛАВНАЯ СТРАНИЦА</a:t>
             </a:r>
-            <a:endParaRPr lang="ru-RU" sz="3600" b="1" dirty="0">
-              <a:latin typeface="Times New Roman" panose="02020603050405020304" pitchFamily="18" charset="0"/>
-              <a:cs typeface="Times New Roman" panose="02020603050405020304" pitchFamily="18" charset="0"/>
-            </a:endParaRPr>
           </a:p>
         </p:txBody>
       </p:sp>
@@ -5323,8 +5478,8 @@
         </p:blipFill>
         <p:spPr>
           <a:xfrm>
-            <a:off x="1041631" y="895639"/>
-            <a:ext cx="10312169" cy="5200361"/>
+            <a:off x="286934" y="992623"/>
+            <a:ext cx="8581358" cy="4327524"/>
           </a:xfrm>
           <a:prstGeom prst="rect">
             <a:avLst/>
@@ -5350,7 +5505,7 @@
         </p:nvSpPr>
         <p:spPr>
           <a:xfrm>
-            <a:off x="11111345" y="6334780"/>
+            <a:off x="7924799" y="6334781"/>
             <a:ext cx="1080656" cy="430887"/>
           </a:xfrm>
           <a:prstGeom prst="rect">
@@ -5459,29 +5614,25 @@
           </a:lstStyle>
           <a:p>
             <a:r>
-              <a:rPr lang="ru-RU" sz="2200" dirty="0" smtClean="0">
+              <a:rPr lang="ru-RU" sz="2200" dirty="0">
                 <a:latin typeface="Times New Roman" panose="02020603050405020304" pitchFamily="18" charset="0"/>
                 <a:cs typeface="Times New Roman" panose="02020603050405020304" pitchFamily="18" charset="0"/>
               </a:rPr>
               <a:t>13/18</a:t>
             </a:r>
-            <a:endParaRPr lang="ru-RU" sz="2200" dirty="0">
-              <a:latin typeface="Times New Roman" panose="02020603050405020304" pitchFamily="18" charset="0"/>
-              <a:cs typeface="Times New Roman" panose="02020603050405020304" pitchFamily="18" charset="0"/>
-            </a:endParaRPr>
-          </a:p>
-        </p:txBody>
-      </p:sp>
-      <p:sp>
-        <p:nvSpPr>
-          <p:cNvPr id="6" name="Прямоугольник 5"/>
+          </a:p>
+        </p:txBody>
+      </p:sp>
+      <p:sp>
+        <p:nvSpPr>
+          <p:cNvPr id="7" name="Прямоугольник 6"/>
           <p:cNvSpPr/>
           <p:nvPr/>
         </p:nvSpPr>
         <p:spPr>
           <a:xfrm>
-            <a:off x="117062" y="6334780"/>
-            <a:ext cx="3100529" cy="430887"/>
+            <a:off x="0" y="5981495"/>
+            <a:ext cx="2826415" cy="400110"/>
           </a:xfrm>
           <a:prstGeom prst="rect">
             <a:avLst/>
@@ -5494,11 +5645,42 @@
           <a:lstStyle/>
           <a:p>
             <a:r>
-              <a:rPr lang="ru-RU" sz="2200" dirty="0">
+              <a:rPr lang="ru-RU" sz="2000" dirty="0">
                 <a:latin typeface="Times New Roman" panose="02020603050405020304" pitchFamily="18" charset="0"/>
                 <a:cs typeface="Times New Roman" panose="02020603050405020304" pitchFamily="18" charset="0"/>
               </a:rPr>
               <a:t>http://veronijo.beget.tech/</a:t>
+            </a:r>
+          </a:p>
+        </p:txBody>
+      </p:sp>
+      <p:sp>
+        <p:nvSpPr>
+          <p:cNvPr id="8" name="Прямоугольник 7"/>
+          <p:cNvSpPr/>
+          <p:nvPr/>
+        </p:nvSpPr>
+        <p:spPr>
+          <a:xfrm>
+            <a:off x="0" y="6362992"/>
+            <a:ext cx="4410759" cy="400110"/>
+          </a:xfrm>
+          <a:prstGeom prst="rect">
+            <a:avLst/>
+          </a:prstGeom>
+        </p:spPr>
+        <p:txBody>
+          <a:bodyPr wrap="none">
+            <a:spAutoFit/>
+          </a:bodyPr>
+          <a:lstStyle/>
+          <a:p>
+            <a:r>
+              <a:rPr lang="ru-RU" sz="2000" dirty="0">
+                <a:latin typeface="Times New Roman" panose="02020603050405020304" pitchFamily="18" charset="0"/>
+                <a:cs typeface="Times New Roman" panose="02020603050405020304" pitchFamily="18" charset="0"/>
+              </a:rPr>
+              <a:t>https://github.com/wbogatyrewa/EVoting</a:t>
             </a:r>
           </a:p>
         </p:txBody>
@@ -5552,8 +5734,8 @@
         </p:nvSpPr>
         <p:spPr>
           <a:xfrm>
-            <a:off x="893619" y="0"/>
-            <a:ext cx="10515600" cy="895639"/>
+            <a:off x="-1" y="1"/>
+            <a:ext cx="9144001" cy="895639"/>
           </a:xfrm>
         </p:spPr>
         <p:txBody>
@@ -5564,16 +5746,12 @@
           <a:p>
             <a:pPr algn="ctr"/>
             <a:r>
-              <a:rPr lang="ru-RU" sz="3600" b="1" dirty="0" smtClean="0">
+              <a:rPr lang="ru-RU" sz="3600" b="1" dirty="0">
                 <a:latin typeface="Times New Roman" panose="02020603050405020304" pitchFamily="18" charset="0"/>
                 <a:cs typeface="Times New Roman" panose="02020603050405020304" pitchFamily="18" charset="0"/>
               </a:rPr>
               <a:t>АВТОРИЗАЦИЯ</a:t>
             </a:r>
-            <a:endParaRPr lang="ru-RU" sz="3600" b="1" dirty="0">
-              <a:latin typeface="Times New Roman" panose="02020603050405020304" pitchFamily="18" charset="0"/>
-              <a:cs typeface="Times New Roman" panose="02020603050405020304" pitchFamily="18" charset="0"/>
-            </a:endParaRPr>
           </a:p>
         </p:txBody>
       </p:sp>
@@ -5602,8 +5780,8 @@
         </p:blipFill>
         <p:spPr bwMode="auto">
           <a:xfrm>
-            <a:off x="1805503" y="895639"/>
-            <a:ext cx="4345916" cy="5073193"/>
+            <a:off x="669431" y="1096842"/>
+            <a:ext cx="3888715" cy="4539481"/>
           </a:xfrm>
           <a:prstGeom prst="rect">
             <a:avLst/>
@@ -5637,8 +5815,8 @@
         </p:blipFill>
         <p:spPr bwMode="auto">
           <a:xfrm>
-            <a:off x="6389759" y="895639"/>
-            <a:ext cx="4408964" cy="5073193"/>
+            <a:off x="4782631" y="1094508"/>
+            <a:ext cx="3947159" cy="4541815"/>
           </a:xfrm>
           <a:prstGeom prst="rect">
             <a:avLst/>
@@ -5665,7 +5843,7 @@
         </p:nvSpPr>
         <p:spPr>
           <a:xfrm>
-            <a:off x="11111345" y="6334780"/>
+            <a:off x="7938654" y="6334781"/>
             <a:ext cx="1080656" cy="430887"/>
           </a:xfrm>
           <a:prstGeom prst="rect">
@@ -5774,29 +5952,25 @@
           </a:lstStyle>
           <a:p>
             <a:r>
-              <a:rPr lang="ru-RU" sz="2200" dirty="0" smtClean="0">
+              <a:rPr lang="ru-RU" sz="2200" dirty="0">
                 <a:latin typeface="Times New Roman" panose="02020603050405020304" pitchFamily="18" charset="0"/>
                 <a:cs typeface="Times New Roman" panose="02020603050405020304" pitchFamily="18" charset="0"/>
               </a:rPr>
               <a:t>14/18</a:t>
             </a:r>
-            <a:endParaRPr lang="ru-RU" sz="2200" dirty="0">
-              <a:latin typeface="Times New Roman" panose="02020603050405020304" pitchFamily="18" charset="0"/>
-              <a:cs typeface="Times New Roman" panose="02020603050405020304" pitchFamily="18" charset="0"/>
-            </a:endParaRPr>
-          </a:p>
-        </p:txBody>
-      </p:sp>
-      <p:sp>
-        <p:nvSpPr>
-          <p:cNvPr id="8" name="Прямоугольник 7"/>
+          </a:p>
+        </p:txBody>
+      </p:sp>
+      <p:sp>
+        <p:nvSpPr>
+          <p:cNvPr id="9" name="Прямоугольник 8"/>
           <p:cNvSpPr/>
           <p:nvPr/>
         </p:nvSpPr>
         <p:spPr>
           <a:xfrm>
-            <a:off x="117062" y="6334780"/>
-            <a:ext cx="3100529" cy="430887"/>
+            <a:off x="0" y="5981495"/>
+            <a:ext cx="2826415" cy="400110"/>
           </a:xfrm>
           <a:prstGeom prst="rect">
             <a:avLst/>
@@ -5809,11 +5983,42 @@
           <a:lstStyle/>
           <a:p>
             <a:r>
-              <a:rPr lang="ru-RU" sz="2200" dirty="0">
+              <a:rPr lang="ru-RU" sz="2000" dirty="0">
                 <a:latin typeface="Times New Roman" panose="02020603050405020304" pitchFamily="18" charset="0"/>
                 <a:cs typeface="Times New Roman" panose="02020603050405020304" pitchFamily="18" charset="0"/>
               </a:rPr>
               <a:t>http://veronijo.beget.tech/</a:t>
+            </a:r>
+          </a:p>
+        </p:txBody>
+      </p:sp>
+      <p:sp>
+        <p:nvSpPr>
+          <p:cNvPr id="10" name="Прямоугольник 9"/>
+          <p:cNvSpPr/>
+          <p:nvPr/>
+        </p:nvSpPr>
+        <p:spPr>
+          <a:xfrm>
+            <a:off x="0" y="6362992"/>
+            <a:ext cx="4410759" cy="400110"/>
+          </a:xfrm>
+          <a:prstGeom prst="rect">
+            <a:avLst/>
+          </a:prstGeom>
+        </p:spPr>
+        <p:txBody>
+          <a:bodyPr wrap="none">
+            <a:spAutoFit/>
+          </a:bodyPr>
+          <a:lstStyle/>
+          <a:p>
+            <a:r>
+              <a:rPr lang="ru-RU" sz="2000" dirty="0">
+                <a:latin typeface="Times New Roman" panose="02020603050405020304" pitchFamily="18" charset="0"/>
+                <a:cs typeface="Times New Roman" panose="02020603050405020304" pitchFamily="18" charset="0"/>
+              </a:rPr>
+              <a:t>https://github.com/wbogatyrewa/EVoting</a:t>
             </a:r>
           </a:p>
         </p:txBody>
@@ -5867,28 +6072,24 @@
         </p:nvSpPr>
         <p:spPr>
           <a:xfrm>
-            <a:off x="838199" y="0"/>
-            <a:ext cx="10515600" cy="895639"/>
+            <a:off x="-1" y="1"/>
+            <a:ext cx="9144001" cy="895639"/>
           </a:xfrm>
         </p:spPr>
         <p:txBody>
           <a:bodyPr>
-            <a:normAutofit/>
+            <a:normAutofit fontScale="90000"/>
           </a:bodyPr>
           <a:lstStyle/>
           <a:p>
             <a:pPr algn="ctr"/>
             <a:r>
-              <a:rPr lang="ru-RU" sz="3600" b="1" dirty="0" smtClean="0">
+              <a:rPr lang="ru-RU" sz="3600" b="1" dirty="0">
                 <a:latin typeface="Times New Roman" panose="02020603050405020304" pitchFamily="18" charset="0"/>
                 <a:cs typeface="Times New Roman" panose="02020603050405020304" pitchFamily="18" charset="0"/>
               </a:rPr>
               <a:t>СТРАНИЦА СОЗДАНИЯ ГОЛОСОВАНИЯ</a:t>
             </a:r>
-            <a:endParaRPr lang="ru-RU" sz="3600" b="1" dirty="0">
-              <a:latin typeface="Times New Roman" panose="02020603050405020304" pitchFamily="18" charset="0"/>
-              <a:cs typeface="Times New Roman" panose="02020603050405020304" pitchFamily="18" charset="0"/>
-            </a:endParaRPr>
           </a:p>
         </p:txBody>
       </p:sp>
@@ -5910,8 +6111,8 @@
         </p:blipFill>
         <p:spPr>
           <a:xfrm>
-            <a:off x="954540" y="895639"/>
-            <a:ext cx="10282918" cy="5214216"/>
+            <a:off x="152399" y="1184366"/>
+            <a:ext cx="8839200" cy="4482143"/>
           </a:xfrm>
           <a:prstGeom prst="rect">
             <a:avLst/>
@@ -5937,7 +6138,7 @@
         </p:nvSpPr>
         <p:spPr>
           <a:xfrm>
-            <a:off x="11111345" y="6334780"/>
+            <a:off x="7910943" y="6334781"/>
             <a:ext cx="1080656" cy="430887"/>
           </a:xfrm>
           <a:prstGeom prst="rect">
@@ -6046,29 +6247,25 @@
           </a:lstStyle>
           <a:p>
             <a:r>
-              <a:rPr lang="ru-RU" sz="2200" dirty="0" smtClean="0">
+              <a:rPr lang="ru-RU" sz="2200" dirty="0">
                 <a:latin typeface="Times New Roman" panose="02020603050405020304" pitchFamily="18" charset="0"/>
                 <a:cs typeface="Times New Roman" panose="02020603050405020304" pitchFamily="18" charset="0"/>
               </a:rPr>
               <a:t>15/18</a:t>
             </a:r>
-            <a:endParaRPr lang="ru-RU" sz="2200" dirty="0">
-              <a:latin typeface="Times New Roman" panose="02020603050405020304" pitchFamily="18" charset="0"/>
-              <a:cs typeface="Times New Roman" panose="02020603050405020304" pitchFamily="18" charset="0"/>
-            </a:endParaRPr>
-          </a:p>
-        </p:txBody>
-      </p:sp>
-      <p:sp>
-        <p:nvSpPr>
-          <p:cNvPr id="5" name="Прямоугольник 4"/>
+          </a:p>
+        </p:txBody>
+      </p:sp>
+      <p:sp>
+        <p:nvSpPr>
+          <p:cNvPr id="6" name="Прямоугольник 5"/>
           <p:cNvSpPr/>
           <p:nvPr/>
         </p:nvSpPr>
         <p:spPr>
           <a:xfrm>
-            <a:off x="117062" y="6334780"/>
-            <a:ext cx="3100529" cy="430887"/>
+            <a:off x="0" y="5981495"/>
+            <a:ext cx="2826415" cy="400110"/>
           </a:xfrm>
           <a:prstGeom prst="rect">
             <a:avLst/>
@@ -6081,11 +6278,42 @@
           <a:lstStyle/>
           <a:p>
             <a:r>
-              <a:rPr lang="ru-RU" sz="2200" dirty="0">
+              <a:rPr lang="ru-RU" sz="2000" dirty="0">
                 <a:latin typeface="Times New Roman" panose="02020603050405020304" pitchFamily="18" charset="0"/>
                 <a:cs typeface="Times New Roman" panose="02020603050405020304" pitchFamily="18" charset="0"/>
               </a:rPr>
               <a:t>http://veronijo.beget.tech/</a:t>
+            </a:r>
+          </a:p>
+        </p:txBody>
+      </p:sp>
+      <p:sp>
+        <p:nvSpPr>
+          <p:cNvPr id="8" name="Прямоугольник 7"/>
+          <p:cNvSpPr/>
+          <p:nvPr/>
+        </p:nvSpPr>
+        <p:spPr>
+          <a:xfrm>
+            <a:off x="0" y="6362992"/>
+            <a:ext cx="4410759" cy="400110"/>
+          </a:xfrm>
+          <a:prstGeom prst="rect">
+            <a:avLst/>
+          </a:prstGeom>
+        </p:spPr>
+        <p:txBody>
+          <a:bodyPr wrap="none">
+            <a:spAutoFit/>
+          </a:bodyPr>
+          <a:lstStyle/>
+          <a:p>
+            <a:r>
+              <a:rPr lang="ru-RU" sz="2000" dirty="0">
+                <a:latin typeface="Times New Roman" panose="02020603050405020304" pitchFamily="18" charset="0"/>
+                <a:cs typeface="Times New Roman" panose="02020603050405020304" pitchFamily="18" charset="0"/>
+              </a:rPr>
+              <a:t>https://github.com/wbogatyrewa/EVoting</a:t>
             </a:r>
           </a:p>
         </p:txBody>
@@ -6139,8 +6367,8 @@
         </p:nvSpPr>
         <p:spPr>
           <a:xfrm>
-            <a:off x="838200" y="0"/>
-            <a:ext cx="10515600" cy="895639"/>
+            <a:off x="0" y="1"/>
+            <a:ext cx="9144000" cy="895639"/>
           </a:xfrm>
         </p:spPr>
         <p:txBody>
@@ -6151,16 +6379,12 @@
           <a:p>
             <a:pPr algn="ctr"/>
             <a:r>
-              <a:rPr lang="ru-RU" sz="3600" b="1" dirty="0" smtClean="0">
+              <a:rPr lang="ru-RU" sz="3600" b="1" dirty="0">
                 <a:latin typeface="Times New Roman" panose="02020603050405020304" pitchFamily="18" charset="0"/>
                 <a:cs typeface="Times New Roman" panose="02020603050405020304" pitchFamily="18" charset="0"/>
               </a:rPr>
               <a:t>СТРАНИЦА ГОЛОСОВАНИЯ</a:t>
             </a:r>
-            <a:endParaRPr lang="ru-RU" sz="3600" b="1" dirty="0">
-              <a:latin typeface="Times New Roman" panose="02020603050405020304" pitchFamily="18" charset="0"/>
-              <a:cs typeface="Times New Roman" panose="02020603050405020304" pitchFamily="18" charset="0"/>
-            </a:endParaRPr>
           </a:p>
         </p:txBody>
       </p:sp>
@@ -6182,8 +6406,8 @@
         </p:blipFill>
         <p:spPr>
           <a:xfrm>
-            <a:off x="1089025" y="895639"/>
-            <a:ext cx="10562648" cy="5281324"/>
+            <a:off x="256309" y="1210107"/>
+            <a:ext cx="8631382" cy="4315691"/>
           </a:xfrm>
           <a:prstGeom prst="rect">
             <a:avLst/>
@@ -6209,7 +6433,7 @@
         </p:nvSpPr>
         <p:spPr>
           <a:xfrm>
-            <a:off x="11111345" y="6334780"/>
+            <a:off x="7807035" y="6334781"/>
             <a:ext cx="1080656" cy="430887"/>
           </a:xfrm>
           <a:prstGeom prst="rect">
@@ -6318,29 +6542,25 @@
           </a:lstStyle>
           <a:p>
             <a:r>
-              <a:rPr lang="ru-RU" sz="2200" dirty="0" smtClean="0">
+              <a:rPr lang="ru-RU" sz="2200" dirty="0">
                 <a:latin typeface="Times New Roman" panose="02020603050405020304" pitchFamily="18" charset="0"/>
                 <a:cs typeface="Times New Roman" panose="02020603050405020304" pitchFamily="18" charset="0"/>
               </a:rPr>
               <a:t>16/18</a:t>
             </a:r>
-            <a:endParaRPr lang="ru-RU" sz="2200" dirty="0">
-              <a:latin typeface="Times New Roman" panose="02020603050405020304" pitchFamily="18" charset="0"/>
-              <a:cs typeface="Times New Roman" panose="02020603050405020304" pitchFamily="18" charset="0"/>
-            </a:endParaRPr>
-          </a:p>
-        </p:txBody>
-      </p:sp>
-      <p:sp>
-        <p:nvSpPr>
-          <p:cNvPr id="5" name="Прямоугольник 4"/>
+          </a:p>
+        </p:txBody>
+      </p:sp>
+      <p:sp>
+        <p:nvSpPr>
+          <p:cNvPr id="7" name="Прямоугольник 6"/>
           <p:cNvSpPr/>
           <p:nvPr/>
         </p:nvSpPr>
         <p:spPr>
           <a:xfrm>
-            <a:off x="117062" y="6334780"/>
-            <a:ext cx="3100529" cy="430887"/>
+            <a:off x="0" y="5981495"/>
+            <a:ext cx="2826415" cy="400110"/>
           </a:xfrm>
           <a:prstGeom prst="rect">
             <a:avLst/>
@@ -6353,11 +6573,42 @@
           <a:lstStyle/>
           <a:p>
             <a:r>
-              <a:rPr lang="ru-RU" sz="2200" dirty="0">
+              <a:rPr lang="ru-RU" sz="2000" dirty="0">
                 <a:latin typeface="Times New Roman" panose="02020603050405020304" pitchFamily="18" charset="0"/>
                 <a:cs typeface="Times New Roman" panose="02020603050405020304" pitchFamily="18" charset="0"/>
               </a:rPr>
               <a:t>http://veronijo.beget.tech/</a:t>
+            </a:r>
+          </a:p>
+        </p:txBody>
+      </p:sp>
+      <p:sp>
+        <p:nvSpPr>
+          <p:cNvPr id="8" name="Прямоугольник 7"/>
+          <p:cNvSpPr/>
+          <p:nvPr/>
+        </p:nvSpPr>
+        <p:spPr>
+          <a:xfrm>
+            <a:off x="0" y="6362992"/>
+            <a:ext cx="4410759" cy="400110"/>
+          </a:xfrm>
+          <a:prstGeom prst="rect">
+            <a:avLst/>
+          </a:prstGeom>
+        </p:spPr>
+        <p:txBody>
+          <a:bodyPr wrap="none">
+            <a:spAutoFit/>
+          </a:bodyPr>
+          <a:lstStyle/>
+          <a:p>
+            <a:r>
+              <a:rPr lang="ru-RU" sz="2000" dirty="0">
+                <a:latin typeface="Times New Roman" panose="02020603050405020304" pitchFamily="18" charset="0"/>
+                <a:cs typeface="Times New Roman" panose="02020603050405020304" pitchFamily="18" charset="0"/>
+              </a:rPr>
+              <a:t>https://github.com/wbogatyrewa/EVoting</a:t>
             </a:r>
           </a:p>
         </p:txBody>
@@ -6411,8 +6662,8 @@
         </p:nvSpPr>
         <p:spPr>
           <a:xfrm>
-            <a:off x="838200" y="365125"/>
-            <a:ext cx="10515600" cy="895639"/>
+            <a:off x="0" y="365126"/>
+            <a:ext cx="9144000" cy="895639"/>
           </a:xfrm>
         </p:spPr>
         <p:txBody>
@@ -6423,16 +6674,12 @@
           <a:p>
             <a:pPr algn="ctr"/>
             <a:r>
-              <a:rPr lang="ru-RU" sz="3600" b="1" dirty="0" smtClean="0">
+              <a:rPr lang="ru-RU" sz="3600" b="1" dirty="0">
                 <a:latin typeface="Times New Roman" panose="02020603050405020304" pitchFamily="18" charset="0"/>
                 <a:cs typeface="Times New Roman" panose="02020603050405020304" pitchFamily="18" charset="0"/>
               </a:rPr>
               <a:t>ТЕСТИРОВАНИЕ</a:t>
             </a:r>
-            <a:endParaRPr lang="ru-RU" sz="3600" b="1" dirty="0">
-              <a:latin typeface="Times New Roman" panose="02020603050405020304" pitchFamily="18" charset="0"/>
-              <a:cs typeface="Times New Roman" panose="02020603050405020304" pitchFamily="18" charset="0"/>
-            </a:endParaRPr>
           </a:p>
         </p:txBody>
       </p:sp>
@@ -6448,8 +6695,8 @@
         </p:nvSpPr>
         <p:spPr>
           <a:xfrm>
-            <a:off x="838200" y="1423843"/>
-            <a:ext cx="10515600" cy="4351338"/>
+            <a:off x="581891" y="1423843"/>
+            <a:ext cx="8229600" cy="4351338"/>
           </a:xfrm>
         </p:spPr>
         <p:txBody>
@@ -6580,7 +6827,7 @@
         </p:nvSpPr>
         <p:spPr>
           <a:xfrm>
-            <a:off x="11111345" y="6334780"/>
+            <a:off x="7910946" y="6334781"/>
             <a:ext cx="1080656" cy="430887"/>
           </a:xfrm>
           <a:prstGeom prst="rect">
@@ -6689,29 +6936,25 @@
           </a:lstStyle>
           <a:p>
             <a:r>
-              <a:rPr lang="ru-RU" sz="2200" dirty="0" smtClean="0">
+              <a:rPr lang="ru-RU" sz="2200" dirty="0">
                 <a:latin typeface="Times New Roman" panose="02020603050405020304" pitchFamily="18" charset="0"/>
                 <a:cs typeface="Times New Roman" panose="02020603050405020304" pitchFamily="18" charset="0"/>
               </a:rPr>
               <a:t>17/18</a:t>
             </a:r>
-            <a:endParaRPr lang="ru-RU" sz="2200" dirty="0">
-              <a:latin typeface="Times New Roman" panose="02020603050405020304" pitchFamily="18" charset="0"/>
-              <a:cs typeface="Times New Roman" panose="02020603050405020304" pitchFamily="18" charset="0"/>
-            </a:endParaRPr>
-          </a:p>
-        </p:txBody>
-      </p:sp>
-      <p:sp>
-        <p:nvSpPr>
-          <p:cNvPr id="5" name="Прямоугольник 4"/>
+          </a:p>
+        </p:txBody>
+      </p:sp>
+      <p:sp>
+        <p:nvSpPr>
+          <p:cNvPr id="6" name="Прямоугольник 5"/>
           <p:cNvSpPr/>
           <p:nvPr/>
         </p:nvSpPr>
         <p:spPr>
           <a:xfrm>
-            <a:off x="117062" y="6334780"/>
-            <a:ext cx="3100529" cy="430887"/>
+            <a:off x="0" y="5981495"/>
+            <a:ext cx="2826415" cy="400110"/>
           </a:xfrm>
           <a:prstGeom prst="rect">
             <a:avLst/>
@@ -6724,11 +6967,42 @@
           <a:lstStyle/>
           <a:p>
             <a:r>
-              <a:rPr lang="ru-RU" sz="2200" dirty="0">
+              <a:rPr lang="ru-RU" sz="2000" dirty="0">
                 <a:latin typeface="Times New Roman" panose="02020603050405020304" pitchFamily="18" charset="0"/>
                 <a:cs typeface="Times New Roman" panose="02020603050405020304" pitchFamily="18" charset="0"/>
               </a:rPr>
               <a:t>http://veronijo.beget.tech/</a:t>
+            </a:r>
+          </a:p>
+        </p:txBody>
+      </p:sp>
+      <p:sp>
+        <p:nvSpPr>
+          <p:cNvPr id="7" name="Прямоугольник 6"/>
+          <p:cNvSpPr/>
+          <p:nvPr/>
+        </p:nvSpPr>
+        <p:spPr>
+          <a:xfrm>
+            <a:off x="0" y="6362992"/>
+            <a:ext cx="4410759" cy="400110"/>
+          </a:xfrm>
+          <a:prstGeom prst="rect">
+            <a:avLst/>
+          </a:prstGeom>
+        </p:spPr>
+        <p:txBody>
+          <a:bodyPr wrap="none">
+            <a:spAutoFit/>
+          </a:bodyPr>
+          <a:lstStyle/>
+          <a:p>
+            <a:r>
+              <a:rPr lang="ru-RU" sz="2000" dirty="0">
+                <a:latin typeface="Times New Roman" panose="02020603050405020304" pitchFamily="18" charset="0"/>
+                <a:cs typeface="Times New Roman" panose="02020603050405020304" pitchFamily="18" charset="0"/>
+              </a:rPr>
+              <a:t>https://github.com/wbogatyrewa/EVoting</a:t>
             </a:r>
           </a:p>
         </p:txBody>
@@ -6782,8 +7056,8 @@
         </p:nvSpPr>
         <p:spPr>
           <a:xfrm>
-            <a:off x="838200" y="365125"/>
-            <a:ext cx="10515600" cy="895639"/>
+            <a:off x="0" y="365126"/>
+            <a:ext cx="9144000" cy="895639"/>
           </a:xfrm>
         </p:spPr>
         <p:txBody>
@@ -6794,16 +7068,12 @@
           <a:p>
             <a:pPr algn="ctr"/>
             <a:r>
-              <a:rPr lang="ru-RU" sz="3600" b="1" smtClean="0">
+              <a:rPr lang="ru-RU" sz="3600" b="1" dirty="0">
                 <a:latin typeface="Times New Roman" panose="02020603050405020304" pitchFamily="18" charset="0"/>
                 <a:cs typeface="Times New Roman" panose="02020603050405020304" pitchFamily="18" charset="0"/>
               </a:rPr>
               <a:t>ОСНОВНЫЕ РЕЗУЛЬТАТЫ</a:t>
             </a:r>
-            <a:endParaRPr lang="ru-RU" sz="3600" b="1" dirty="0">
-              <a:latin typeface="Times New Roman" panose="02020603050405020304" pitchFamily="18" charset="0"/>
-              <a:cs typeface="Times New Roman" panose="02020603050405020304" pitchFamily="18" charset="0"/>
-            </a:endParaRPr>
           </a:p>
         </p:txBody>
       </p:sp>
@@ -6819,15 +7089,17 @@
         </p:nvSpPr>
         <p:spPr>
           <a:xfrm>
-            <a:off x="838200" y="1493116"/>
-            <a:ext cx="10515600" cy="4351338"/>
-          </a:xfrm>
-        </p:spPr>
-        <p:txBody>
-          <a:bodyPr/>
-          <a:lstStyle/>
-          <a:p>
-            <a:pPr marL="514350" lvl="0" indent="-514350">
+            <a:off x="304800" y="1493116"/>
+            <a:ext cx="8534400" cy="4351338"/>
+          </a:xfrm>
+        </p:spPr>
+        <p:txBody>
+          <a:bodyPr>
+            <a:normAutofit fontScale="92500" lnSpcReduction="10000"/>
+          </a:bodyPr>
+          <a:lstStyle/>
+          <a:p>
+            <a:pPr marL="514350" indent="-514350">
               <a:lnSpc>
                 <a:spcPct val="120000"/>
               </a:lnSpc>
@@ -6850,7 +7122,7 @@
             </a:r>
           </a:p>
           <a:p>
-            <a:pPr marL="514350" lvl="0" indent="-514350">
+            <a:pPr marL="514350" indent="-514350">
               <a:lnSpc>
                 <a:spcPct val="120000"/>
               </a:lnSpc>
@@ -6873,7 +7145,7 @@
             </a:r>
           </a:p>
           <a:p>
-            <a:pPr marL="514350" lvl="0" indent="-514350">
+            <a:pPr marL="514350" indent="-514350">
               <a:lnSpc>
                 <a:spcPct val="120000"/>
               </a:lnSpc>
@@ -6896,7 +7168,7 @@
             </a:r>
           </a:p>
           <a:p>
-            <a:pPr marL="514350" lvl="0" indent="-514350">
+            <a:pPr marL="514350" indent="-514350">
               <a:lnSpc>
                 <a:spcPct val="120000"/>
               </a:lnSpc>
@@ -6919,7 +7191,7 @@
             </a:r>
           </a:p>
           <a:p>
-            <a:pPr marL="514350" lvl="0" indent="-514350">
+            <a:pPr marL="514350" indent="-514350">
               <a:lnSpc>
                 <a:spcPct val="120000"/>
               </a:lnSpc>
@@ -6960,8 +7232,8 @@
         </p:nvSpPr>
         <p:spPr>
           <a:xfrm>
-            <a:off x="11111345" y="6334780"/>
-            <a:ext cx="1080656" cy="523220"/>
+            <a:off x="7952508" y="6334780"/>
+            <a:ext cx="1080656" cy="430887"/>
           </a:xfrm>
           <a:prstGeom prst="rect">
             <a:avLst/>
@@ -7069,29 +7341,25 @@
           </a:lstStyle>
           <a:p>
             <a:r>
-              <a:rPr lang="ru-RU" sz="2800" dirty="0" smtClean="0">
+              <a:rPr lang="ru-RU" sz="2200" dirty="0">
                 <a:latin typeface="Times New Roman" panose="02020603050405020304" pitchFamily="18" charset="0"/>
                 <a:cs typeface="Times New Roman" panose="02020603050405020304" pitchFamily="18" charset="0"/>
               </a:rPr>
               <a:t>18/18</a:t>
             </a:r>
-            <a:endParaRPr lang="ru-RU" sz="2800" dirty="0">
-              <a:latin typeface="Times New Roman" panose="02020603050405020304" pitchFamily="18" charset="0"/>
-              <a:cs typeface="Times New Roman" panose="02020603050405020304" pitchFamily="18" charset="0"/>
-            </a:endParaRPr>
-          </a:p>
-        </p:txBody>
-      </p:sp>
-      <p:sp>
-        <p:nvSpPr>
-          <p:cNvPr id="5" name="Прямоугольник 4"/>
+          </a:p>
+        </p:txBody>
+      </p:sp>
+      <p:sp>
+        <p:nvSpPr>
+          <p:cNvPr id="6" name="Прямоугольник 5"/>
           <p:cNvSpPr/>
           <p:nvPr/>
         </p:nvSpPr>
         <p:spPr>
           <a:xfrm>
-            <a:off x="117062" y="6334780"/>
-            <a:ext cx="3100529" cy="430887"/>
+            <a:off x="0" y="5981495"/>
+            <a:ext cx="2826415" cy="400110"/>
           </a:xfrm>
           <a:prstGeom prst="rect">
             <a:avLst/>
@@ -7104,11 +7372,42 @@
           <a:lstStyle/>
           <a:p>
             <a:r>
-              <a:rPr lang="ru-RU" sz="2200" dirty="0">
+              <a:rPr lang="ru-RU" sz="2000" dirty="0">
                 <a:latin typeface="Times New Roman" panose="02020603050405020304" pitchFamily="18" charset="0"/>
                 <a:cs typeface="Times New Roman" panose="02020603050405020304" pitchFamily="18" charset="0"/>
               </a:rPr>
               <a:t>http://veronijo.beget.tech/</a:t>
+            </a:r>
+          </a:p>
+        </p:txBody>
+      </p:sp>
+      <p:sp>
+        <p:nvSpPr>
+          <p:cNvPr id="7" name="Прямоугольник 6"/>
+          <p:cNvSpPr/>
+          <p:nvPr/>
+        </p:nvSpPr>
+        <p:spPr>
+          <a:xfrm>
+            <a:off x="0" y="6362992"/>
+            <a:ext cx="4410759" cy="400110"/>
+          </a:xfrm>
+          <a:prstGeom prst="rect">
+            <a:avLst/>
+          </a:prstGeom>
+        </p:spPr>
+        <p:txBody>
+          <a:bodyPr wrap="none">
+            <a:spAutoFit/>
+          </a:bodyPr>
+          <a:lstStyle/>
+          <a:p>
+            <a:r>
+              <a:rPr lang="ru-RU" sz="2000" dirty="0">
+                <a:latin typeface="Times New Roman" panose="02020603050405020304" pitchFamily="18" charset="0"/>
+                <a:cs typeface="Times New Roman" panose="02020603050405020304" pitchFamily="18" charset="0"/>
+              </a:rPr>
+              <a:t>https://github.com/wbogatyrewa/EVoting</a:t>
             </a:r>
           </a:p>
         </p:txBody>
@@ -7162,8 +7461,8 @@
         </p:nvSpPr>
         <p:spPr>
           <a:xfrm>
-            <a:off x="838200" y="365125"/>
-            <a:ext cx="10515600" cy="895639"/>
+            <a:off x="0" y="365126"/>
+            <a:ext cx="9144000" cy="895639"/>
           </a:xfrm>
         </p:spPr>
         <p:txBody>
@@ -7174,16 +7473,12 @@
           <a:p>
             <a:pPr algn="ctr"/>
             <a:r>
-              <a:rPr lang="ru-RU" sz="3600" b="1" dirty="0" smtClean="0">
+              <a:rPr lang="ru-RU" sz="3600" b="1" dirty="0">
                 <a:latin typeface="Times New Roman" panose="02020603050405020304" pitchFamily="18" charset="0"/>
                 <a:cs typeface="Times New Roman" panose="02020603050405020304" pitchFamily="18" charset="0"/>
               </a:rPr>
               <a:t>АКТУАЛЬНОСТЬ</a:t>
             </a:r>
-            <a:endParaRPr lang="ru-RU" sz="3600" b="1" dirty="0">
-              <a:latin typeface="Times New Roman" panose="02020603050405020304" pitchFamily="18" charset="0"/>
-              <a:cs typeface="Times New Roman" panose="02020603050405020304" pitchFamily="18" charset="0"/>
-            </a:endParaRPr>
           </a:p>
         </p:txBody>
       </p:sp>
@@ -7199,8 +7494,8 @@
         </p:nvSpPr>
         <p:spPr>
           <a:xfrm>
-            <a:off x="838200" y="1645516"/>
-            <a:ext cx="10515600" cy="4351338"/>
+            <a:off x="255606" y="1645516"/>
+            <a:ext cx="8639011" cy="4351338"/>
           </a:xfrm>
         </p:spPr>
         <p:txBody>
@@ -7314,7 +7609,7 @@
         </p:nvSpPr>
         <p:spPr>
           <a:xfrm>
-            <a:off x="11288443" y="6334780"/>
+            <a:off x="8129607" y="6334781"/>
             <a:ext cx="903557" cy="430887"/>
           </a:xfrm>
           <a:prstGeom prst="rect">
@@ -7423,16 +7718,12 @@
           </a:lstStyle>
           <a:p>
             <a:r>
-              <a:rPr lang="ru-RU" sz="2200" dirty="0" smtClean="0">
+              <a:rPr lang="ru-RU" sz="2200" dirty="0">
                 <a:latin typeface="Times New Roman" panose="02020603050405020304" pitchFamily="18" charset="0"/>
                 <a:cs typeface="Times New Roman" panose="02020603050405020304" pitchFamily="18" charset="0"/>
               </a:rPr>
               <a:t>2/18</a:t>
             </a:r>
-            <a:endParaRPr lang="ru-RU" sz="2200" dirty="0">
-              <a:latin typeface="Times New Roman" panose="02020603050405020304" pitchFamily="18" charset="0"/>
-              <a:cs typeface="Times New Roman" panose="02020603050405020304" pitchFamily="18" charset="0"/>
-            </a:endParaRPr>
           </a:p>
         </p:txBody>
       </p:sp>
@@ -7444,8 +7735,8 @@
         </p:nvSpPr>
         <p:spPr>
           <a:xfrm>
-            <a:off x="117062" y="6334780"/>
-            <a:ext cx="3100529" cy="430887"/>
+            <a:off x="0" y="5981495"/>
+            <a:ext cx="2826415" cy="400110"/>
           </a:xfrm>
           <a:prstGeom prst="rect">
             <a:avLst/>
@@ -7458,11 +7749,42 @@
           <a:lstStyle/>
           <a:p>
             <a:r>
-              <a:rPr lang="ru-RU" sz="2200" dirty="0">
+              <a:rPr lang="ru-RU" sz="2000" dirty="0">
                 <a:latin typeface="Times New Roman" panose="02020603050405020304" pitchFamily="18" charset="0"/>
                 <a:cs typeface="Times New Roman" panose="02020603050405020304" pitchFamily="18" charset="0"/>
               </a:rPr>
               <a:t>http://veronijo.beget.tech/</a:t>
+            </a:r>
+          </a:p>
+        </p:txBody>
+      </p:sp>
+      <p:sp>
+        <p:nvSpPr>
+          <p:cNvPr id="6" name="Прямоугольник 5"/>
+          <p:cNvSpPr/>
+          <p:nvPr/>
+        </p:nvSpPr>
+        <p:spPr>
+          <a:xfrm>
+            <a:off x="0" y="6362992"/>
+            <a:ext cx="4410759" cy="400110"/>
+          </a:xfrm>
+          <a:prstGeom prst="rect">
+            <a:avLst/>
+          </a:prstGeom>
+        </p:spPr>
+        <p:txBody>
+          <a:bodyPr wrap="none">
+            <a:spAutoFit/>
+          </a:bodyPr>
+          <a:lstStyle/>
+          <a:p>
+            <a:r>
+              <a:rPr lang="ru-RU" sz="2000" dirty="0">
+                <a:latin typeface="Times New Roman" panose="02020603050405020304" pitchFamily="18" charset="0"/>
+                <a:cs typeface="Times New Roman" panose="02020603050405020304" pitchFamily="18" charset="0"/>
+              </a:rPr>
+              <a:t>https://github.com/wbogatyrewa/EVoting</a:t>
             </a:r>
           </a:p>
         </p:txBody>
@@ -7516,8 +7838,8 @@
         </p:nvSpPr>
         <p:spPr>
           <a:xfrm>
-            <a:off x="838200" y="365125"/>
-            <a:ext cx="10515600" cy="895639"/>
+            <a:off x="0" y="169656"/>
+            <a:ext cx="9144000" cy="895639"/>
           </a:xfrm>
         </p:spPr>
         <p:txBody>
@@ -7528,16 +7850,12 @@
           <a:p>
             <a:pPr algn="ctr"/>
             <a:r>
-              <a:rPr lang="ru-RU" sz="3600" b="1" dirty="0" smtClean="0">
+              <a:rPr lang="ru-RU" sz="3600" b="1" dirty="0">
                 <a:latin typeface="Times New Roman" panose="02020603050405020304" pitchFamily="18" charset="0"/>
                 <a:cs typeface="Times New Roman" panose="02020603050405020304" pitchFamily="18" charset="0"/>
               </a:rPr>
               <a:t>ЦЕЛЬ И ЗАДАЧИ ИССЛЕДОВАНИЯ</a:t>
             </a:r>
-            <a:endParaRPr lang="ru-RU" sz="3600" b="1" dirty="0">
-              <a:latin typeface="Times New Roman" panose="02020603050405020304" pitchFamily="18" charset="0"/>
-              <a:cs typeface="Times New Roman" panose="02020603050405020304" pitchFamily="18" charset="0"/>
-            </a:endParaRPr>
           </a:p>
         </p:txBody>
       </p:sp>
@@ -7553,13 +7871,13 @@
         </p:nvSpPr>
         <p:spPr>
           <a:xfrm>
-            <a:off x="838200" y="1524000"/>
-            <a:ext cx="10515600" cy="4916199"/>
+            <a:off x="159327" y="1061952"/>
+            <a:ext cx="8825346" cy="4916199"/>
           </a:xfrm>
         </p:spPr>
         <p:txBody>
           <a:bodyPr>
-            <a:normAutofit fontScale="85000" lnSpcReduction="20000"/>
+            <a:normAutofit fontScale="77500" lnSpcReduction="20000"/>
           </a:bodyPr>
           <a:lstStyle/>
           <a:p>
@@ -7622,7 +7940,7 @@
             </a:r>
           </a:p>
           <a:p>
-            <a:pPr marL="514350" lvl="0" indent="-514350">
+            <a:pPr marL="514350" indent="-514350">
               <a:lnSpc>
                 <a:spcPct val="120000"/>
               </a:lnSpc>
@@ -7663,7 +7981,7 @@
             </a:endParaRPr>
           </a:p>
           <a:p>
-            <a:pPr marL="514350" lvl="0" indent="-514350">
+            <a:pPr marL="514350" indent="-514350">
               <a:lnSpc>
                 <a:spcPct val="120000"/>
               </a:lnSpc>
@@ -7704,7 +8022,7 @@
             </a:endParaRPr>
           </a:p>
           <a:p>
-            <a:pPr marL="514350" lvl="0" indent="-514350">
+            <a:pPr marL="514350" indent="-514350">
               <a:lnSpc>
                 <a:spcPct val="120000"/>
               </a:lnSpc>
@@ -7745,7 +8063,7 @@
             </a:endParaRPr>
           </a:p>
           <a:p>
-            <a:pPr marL="514350" lvl="0" indent="-514350">
+            <a:pPr marL="514350" indent="-514350">
               <a:lnSpc>
                 <a:spcPct val="120000"/>
               </a:lnSpc>
@@ -7786,7 +8104,7 @@
             </a:endParaRPr>
           </a:p>
           <a:p>
-            <a:pPr marL="514350" lvl="0" indent="-514350">
+            <a:pPr marL="514350" indent="-514350">
               <a:lnSpc>
                 <a:spcPct val="120000"/>
               </a:lnSpc>
@@ -7850,7 +8168,7 @@
         </p:nvSpPr>
         <p:spPr>
           <a:xfrm>
-            <a:off x="11288443" y="6334780"/>
+            <a:off x="8240443" y="6338034"/>
             <a:ext cx="903557" cy="430887"/>
           </a:xfrm>
           <a:prstGeom prst="rect">
@@ -7959,29 +8277,25 @@
           </a:lstStyle>
           <a:p>
             <a:r>
-              <a:rPr lang="ru-RU" sz="2200" dirty="0" smtClean="0">
+              <a:rPr lang="ru-RU" sz="2200" dirty="0">
                 <a:latin typeface="Times New Roman" panose="02020603050405020304" pitchFamily="18" charset="0"/>
                 <a:cs typeface="Times New Roman" panose="02020603050405020304" pitchFamily="18" charset="0"/>
               </a:rPr>
               <a:t>3/18</a:t>
             </a:r>
-            <a:endParaRPr lang="ru-RU" sz="2200" dirty="0">
-              <a:latin typeface="Times New Roman" panose="02020603050405020304" pitchFamily="18" charset="0"/>
-              <a:cs typeface="Times New Roman" panose="02020603050405020304" pitchFamily="18" charset="0"/>
-            </a:endParaRPr>
-          </a:p>
-        </p:txBody>
-      </p:sp>
-      <p:sp>
-        <p:nvSpPr>
-          <p:cNvPr id="6" name="Прямоугольник 5"/>
+          </a:p>
+        </p:txBody>
+      </p:sp>
+      <p:sp>
+        <p:nvSpPr>
+          <p:cNvPr id="7" name="Прямоугольник 6"/>
           <p:cNvSpPr/>
           <p:nvPr/>
         </p:nvSpPr>
         <p:spPr>
           <a:xfrm>
-            <a:off x="117062" y="6334780"/>
-            <a:ext cx="3100529" cy="430887"/>
+            <a:off x="0" y="5981495"/>
+            <a:ext cx="2826415" cy="400110"/>
           </a:xfrm>
           <a:prstGeom prst="rect">
             <a:avLst/>
@@ -7994,11 +8308,42 @@
           <a:lstStyle/>
           <a:p>
             <a:r>
-              <a:rPr lang="ru-RU" sz="2200" dirty="0">
+              <a:rPr lang="ru-RU" sz="2000" dirty="0">
                 <a:latin typeface="Times New Roman" panose="02020603050405020304" pitchFamily="18" charset="0"/>
                 <a:cs typeface="Times New Roman" panose="02020603050405020304" pitchFamily="18" charset="0"/>
               </a:rPr>
               <a:t>http://veronijo.beget.tech/</a:t>
+            </a:r>
+          </a:p>
+        </p:txBody>
+      </p:sp>
+      <p:sp>
+        <p:nvSpPr>
+          <p:cNvPr id="8" name="Прямоугольник 7"/>
+          <p:cNvSpPr/>
+          <p:nvPr/>
+        </p:nvSpPr>
+        <p:spPr>
+          <a:xfrm>
+            <a:off x="0" y="6362992"/>
+            <a:ext cx="4410759" cy="400110"/>
+          </a:xfrm>
+          <a:prstGeom prst="rect">
+            <a:avLst/>
+          </a:prstGeom>
+        </p:spPr>
+        <p:txBody>
+          <a:bodyPr wrap="none">
+            <a:spAutoFit/>
+          </a:bodyPr>
+          <a:lstStyle/>
+          <a:p>
+            <a:r>
+              <a:rPr lang="ru-RU" sz="2000" dirty="0">
+                <a:latin typeface="Times New Roman" panose="02020603050405020304" pitchFamily="18" charset="0"/>
+                <a:cs typeface="Times New Roman" panose="02020603050405020304" pitchFamily="18" charset="0"/>
+              </a:rPr>
+              <a:t>https://github.com/wbogatyrewa/EVoting</a:t>
             </a:r>
           </a:p>
         </p:txBody>
@@ -8052,8 +8397,8 @@
         </p:nvSpPr>
         <p:spPr>
           <a:xfrm>
-            <a:off x="838200" y="365125"/>
-            <a:ext cx="10515600" cy="895639"/>
+            <a:off x="-1" y="143453"/>
+            <a:ext cx="9144001" cy="895639"/>
           </a:xfrm>
         </p:spPr>
         <p:txBody>
@@ -8064,16 +8409,12 @@
           <a:p>
             <a:pPr algn="ctr"/>
             <a:r>
-              <a:rPr lang="ru-RU" sz="3600" b="1" dirty="0" smtClean="0">
+              <a:rPr lang="ru-RU" sz="3600" b="1" dirty="0">
                 <a:latin typeface="Times New Roman" panose="02020603050405020304" pitchFamily="18" charset="0"/>
                 <a:cs typeface="Times New Roman" panose="02020603050405020304" pitchFamily="18" charset="0"/>
               </a:rPr>
               <a:t>БЛОКЧЕЙН</a:t>
             </a:r>
-            <a:endParaRPr lang="ru-RU" sz="3600" b="1" dirty="0">
-              <a:latin typeface="Times New Roman" panose="02020603050405020304" pitchFamily="18" charset="0"/>
-              <a:cs typeface="Times New Roman" panose="02020603050405020304" pitchFamily="18" charset="0"/>
-            </a:endParaRPr>
           </a:p>
         </p:txBody>
       </p:sp>
@@ -8101,8 +8442,8 @@
         </p:blipFill>
         <p:spPr>
           <a:xfrm>
-            <a:off x="3114458" y="1432143"/>
-            <a:ext cx="5963083" cy="4743015"/>
+            <a:off x="1979792" y="1420589"/>
+            <a:ext cx="5184415" cy="4123665"/>
           </a:xfrm>
         </p:spPr>
       </p:pic>
@@ -8120,7 +8461,7 @@
         </p:nvSpPr>
         <p:spPr>
           <a:xfrm>
-            <a:off x="11288443" y="6334779"/>
+            <a:off x="8115753" y="6334780"/>
             <a:ext cx="903557" cy="430887"/>
           </a:xfrm>
           <a:prstGeom prst="rect">
@@ -8229,29 +8570,25 @@
           </a:lstStyle>
           <a:p>
             <a:r>
-              <a:rPr lang="ru-RU" sz="2200" dirty="0" smtClean="0">
+              <a:rPr lang="ru-RU" sz="2200" dirty="0">
                 <a:latin typeface="Times New Roman" panose="02020603050405020304" pitchFamily="18" charset="0"/>
                 <a:cs typeface="Times New Roman" panose="02020603050405020304" pitchFamily="18" charset="0"/>
               </a:rPr>
               <a:t>4/18</a:t>
             </a:r>
-            <a:endParaRPr lang="ru-RU" sz="2200" dirty="0">
-              <a:latin typeface="Times New Roman" panose="02020603050405020304" pitchFamily="18" charset="0"/>
-              <a:cs typeface="Times New Roman" panose="02020603050405020304" pitchFamily="18" charset="0"/>
-            </a:endParaRPr>
-          </a:p>
-        </p:txBody>
-      </p:sp>
-      <p:sp>
-        <p:nvSpPr>
-          <p:cNvPr id="5" name="Прямоугольник 4"/>
+          </a:p>
+        </p:txBody>
+      </p:sp>
+      <p:sp>
+        <p:nvSpPr>
+          <p:cNvPr id="6" name="Прямоугольник 5"/>
           <p:cNvSpPr/>
           <p:nvPr/>
         </p:nvSpPr>
         <p:spPr>
           <a:xfrm>
-            <a:off x="117062" y="6334780"/>
-            <a:ext cx="3100529" cy="430887"/>
+            <a:off x="0" y="5981495"/>
+            <a:ext cx="2826415" cy="400110"/>
           </a:xfrm>
           <a:prstGeom prst="rect">
             <a:avLst/>
@@ -8264,11 +8601,42 @@
           <a:lstStyle/>
           <a:p>
             <a:r>
-              <a:rPr lang="ru-RU" sz="2200" dirty="0">
+              <a:rPr lang="ru-RU" sz="2000" dirty="0">
                 <a:latin typeface="Times New Roman" panose="02020603050405020304" pitchFamily="18" charset="0"/>
                 <a:cs typeface="Times New Roman" panose="02020603050405020304" pitchFamily="18" charset="0"/>
               </a:rPr>
               <a:t>http://veronijo.beget.tech/</a:t>
+            </a:r>
+          </a:p>
+        </p:txBody>
+      </p:sp>
+      <p:sp>
+        <p:nvSpPr>
+          <p:cNvPr id="9" name="Прямоугольник 8"/>
+          <p:cNvSpPr/>
+          <p:nvPr/>
+        </p:nvSpPr>
+        <p:spPr>
+          <a:xfrm>
+            <a:off x="0" y="6362992"/>
+            <a:ext cx="4410759" cy="400110"/>
+          </a:xfrm>
+          <a:prstGeom prst="rect">
+            <a:avLst/>
+          </a:prstGeom>
+        </p:spPr>
+        <p:txBody>
+          <a:bodyPr wrap="none">
+            <a:spAutoFit/>
+          </a:bodyPr>
+          <a:lstStyle/>
+          <a:p>
+            <a:r>
+              <a:rPr lang="ru-RU" sz="2000" dirty="0">
+                <a:latin typeface="Times New Roman" panose="02020603050405020304" pitchFamily="18" charset="0"/>
+                <a:cs typeface="Times New Roman" panose="02020603050405020304" pitchFamily="18" charset="0"/>
+              </a:rPr>
+              <a:t>https://github.com/wbogatyrewa/EVoting</a:t>
             </a:r>
           </a:p>
         </p:txBody>
@@ -8322,8 +8690,8 @@
         </p:nvSpPr>
         <p:spPr>
           <a:xfrm>
-            <a:off x="967937" y="0"/>
-            <a:ext cx="10515600" cy="895639"/>
+            <a:off x="-1" y="1"/>
+            <a:ext cx="9144001" cy="895639"/>
           </a:xfrm>
         </p:spPr>
         <p:txBody>
@@ -8334,16 +8702,12 @@
           <a:p>
             <a:pPr algn="ctr"/>
             <a:r>
-              <a:rPr lang="ru-RU" sz="3600" b="1" dirty="0" smtClean="0">
+              <a:rPr lang="ru-RU" sz="3600" b="1" dirty="0">
                 <a:latin typeface="Times New Roman" panose="02020603050405020304" pitchFamily="18" charset="0"/>
                 <a:cs typeface="Times New Roman" panose="02020603050405020304" pitchFamily="18" charset="0"/>
               </a:rPr>
               <a:t>ОБЗОР АНАЛОГОВ</a:t>
             </a:r>
-            <a:endParaRPr lang="ru-RU" sz="3600" b="1" dirty="0">
-              <a:latin typeface="Times New Roman" panose="02020603050405020304" pitchFamily="18" charset="0"/>
-              <a:cs typeface="Times New Roman" panose="02020603050405020304" pitchFamily="18" charset="0"/>
-            </a:endParaRPr>
           </a:p>
         </p:txBody>
       </p:sp>
@@ -8365,8 +8729,8 @@
         </p:blipFill>
         <p:spPr>
           <a:xfrm>
-            <a:off x="452248" y="895639"/>
-            <a:ext cx="11287973" cy="5305183"/>
+            <a:off x="290944" y="1277137"/>
+            <a:ext cx="8562112" cy="4024068"/>
           </a:xfrm>
           <a:prstGeom prst="rect">
             <a:avLst/>
@@ -8392,7 +8756,7 @@
         </p:nvSpPr>
         <p:spPr>
           <a:xfrm>
-            <a:off x="11288443" y="6334780"/>
+            <a:off x="8101899" y="6334781"/>
             <a:ext cx="903557" cy="430887"/>
           </a:xfrm>
           <a:prstGeom prst="rect">
@@ -8505,32 +8869,21 @@
                 <a:latin typeface="Times New Roman" panose="02020603050405020304" pitchFamily="18" charset="0"/>
                 <a:cs typeface="Times New Roman" panose="02020603050405020304" pitchFamily="18" charset="0"/>
               </a:rPr>
-              <a:t>5</a:t>
-            </a:r>
-            <a:r>
-              <a:rPr lang="ru-RU" sz="2200" dirty="0" smtClean="0">
-                <a:latin typeface="Times New Roman" panose="02020603050405020304" pitchFamily="18" charset="0"/>
-                <a:cs typeface="Times New Roman" panose="02020603050405020304" pitchFamily="18" charset="0"/>
-              </a:rPr>
-              <a:t>/18</a:t>
-            </a:r>
-            <a:endParaRPr lang="ru-RU" sz="2200" dirty="0">
-              <a:latin typeface="Times New Roman" panose="02020603050405020304" pitchFamily="18" charset="0"/>
-              <a:cs typeface="Times New Roman" panose="02020603050405020304" pitchFamily="18" charset="0"/>
-            </a:endParaRPr>
-          </a:p>
-        </p:txBody>
-      </p:sp>
-      <p:sp>
-        <p:nvSpPr>
-          <p:cNvPr id="5" name="Прямоугольник 4"/>
+              <a:t>5/18</a:t>
+            </a:r>
+          </a:p>
+        </p:txBody>
+      </p:sp>
+      <p:sp>
+        <p:nvSpPr>
+          <p:cNvPr id="7" name="Прямоугольник 6"/>
           <p:cNvSpPr/>
           <p:nvPr/>
         </p:nvSpPr>
         <p:spPr>
           <a:xfrm>
-            <a:off x="117062" y="6334780"/>
-            <a:ext cx="3100529" cy="430887"/>
+            <a:off x="0" y="5981495"/>
+            <a:ext cx="2826415" cy="400110"/>
           </a:xfrm>
           <a:prstGeom prst="rect">
             <a:avLst/>
@@ -8543,11 +8896,42 @@
           <a:lstStyle/>
           <a:p>
             <a:r>
-              <a:rPr lang="ru-RU" sz="2200" dirty="0">
+              <a:rPr lang="ru-RU" sz="2000" dirty="0">
                 <a:latin typeface="Times New Roman" panose="02020603050405020304" pitchFamily="18" charset="0"/>
                 <a:cs typeface="Times New Roman" panose="02020603050405020304" pitchFamily="18" charset="0"/>
               </a:rPr>
               <a:t>http://veronijo.beget.tech/</a:t>
+            </a:r>
+          </a:p>
+        </p:txBody>
+      </p:sp>
+      <p:sp>
+        <p:nvSpPr>
+          <p:cNvPr id="8" name="Прямоугольник 7"/>
+          <p:cNvSpPr/>
+          <p:nvPr/>
+        </p:nvSpPr>
+        <p:spPr>
+          <a:xfrm>
+            <a:off x="0" y="6362992"/>
+            <a:ext cx="4410759" cy="400110"/>
+          </a:xfrm>
+          <a:prstGeom prst="rect">
+            <a:avLst/>
+          </a:prstGeom>
+        </p:spPr>
+        <p:txBody>
+          <a:bodyPr wrap="none">
+            <a:spAutoFit/>
+          </a:bodyPr>
+          <a:lstStyle/>
+          <a:p>
+            <a:r>
+              <a:rPr lang="ru-RU" sz="2000" dirty="0">
+                <a:latin typeface="Times New Roman" panose="02020603050405020304" pitchFamily="18" charset="0"/>
+                <a:cs typeface="Times New Roman" panose="02020603050405020304" pitchFamily="18" charset="0"/>
+              </a:rPr>
+              <a:t>https://github.com/wbogatyrewa/EVoting</a:t>
             </a:r>
           </a:p>
         </p:txBody>
@@ -8601,8 +8985,8 @@
         </p:nvSpPr>
         <p:spPr>
           <a:xfrm>
-            <a:off x="838199" y="14751"/>
-            <a:ext cx="10515600" cy="895639"/>
+            <a:off x="152671" y="14752"/>
+            <a:ext cx="8838659" cy="895639"/>
           </a:xfrm>
         </p:spPr>
         <p:txBody>
@@ -8613,16 +8997,12 @@
           <a:p>
             <a:pPr algn="ctr"/>
             <a:r>
-              <a:rPr lang="ru-RU" sz="3600" b="1" dirty="0" smtClean="0">
+              <a:rPr lang="ru-RU" sz="3600" b="1" dirty="0">
                 <a:latin typeface="Times New Roman" panose="02020603050405020304" pitchFamily="18" charset="0"/>
                 <a:cs typeface="Times New Roman" panose="02020603050405020304" pitchFamily="18" charset="0"/>
               </a:rPr>
               <a:t>ОБЗОР АНАЛОГОВ</a:t>
             </a:r>
-            <a:endParaRPr lang="ru-RU" sz="3600" b="1" dirty="0">
-              <a:latin typeface="Times New Roman" panose="02020603050405020304" pitchFamily="18" charset="0"/>
-              <a:cs typeface="Times New Roman" panose="02020603050405020304" pitchFamily="18" charset="0"/>
-            </a:endParaRPr>
           </a:p>
         </p:txBody>
       </p:sp>
@@ -8651,8 +9031,8 @@
         </p:blipFill>
         <p:spPr bwMode="auto">
           <a:xfrm>
-            <a:off x="1676670" y="893458"/>
-            <a:ext cx="8838659" cy="5441322"/>
+            <a:off x="518039" y="910391"/>
+            <a:ext cx="8021512" cy="4938264"/>
           </a:xfrm>
           <a:prstGeom prst="rect">
             <a:avLst/>
@@ -8679,7 +9059,7 @@
         </p:nvSpPr>
         <p:spPr>
           <a:xfrm>
-            <a:off x="11288443" y="6393451"/>
+            <a:off x="8087773" y="6393452"/>
             <a:ext cx="903557" cy="430887"/>
           </a:xfrm>
           <a:prstGeom prst="rect">
@@ -8792,32 +9172,21 @@
                 <a:latin typeface="Times New Roman" panose="02020603050405020304" pitchFamily="18" charset="0"/>
                 <a:cs typeface="Times New Roman" panose="02020603050405020304" pitchFamily="18" charset="0"/>
               </a:rPr>
-              <a:t>6</a:t>
-            </a:r>
-            <a:r>
-              <a:rPr lang="ru-RU" sz="2200" dirty="0" smtClean="0">
-                <a:latin typeface="Times New Roman" panose="02020603050405020304" pitchFamily="18" charset="0"/>
-                <a:cs typeface="Times New Roman" panose="02020603050405020304" pitchFamily="18" charset="0"/>
-              </a:rPr>
-              <a:t>/18</a:t>
-            </a:r>
-            <a:endParaRPr lang="ru-RU" sz="2200" dirty="0">
-              <a:latin typeface="Times New Roman" panose="02020603050405020304" pitchFamily="18" charset="0"/>
-              <a:cs typeface="Times New Roman" panose="02020603050405020304" pitchFamily="18" charset="0"/>
-            </a:endParaRPr>
-          </a:p>
-        </p:txBody>
-      </p:sp>
-      <p:sp>
-        <p:nvSpPr>
-          <p:cNvPr id="7" name="Прямоугольник 6"/>
+              <a:t>6/18</a:t>
+            </a:r>
+          </a:p>
+        </p:txBody>
+      </p:sp>
+      <p:sp>
+        <p:nvSpPr>
+          <p:cNvPr id="8" name="Прямоугольник 7"/>
           <p:cNvSpPr/>
           <p:nvPr/>
         </p:nvSpPr>
         <p:spPr>
           <a:xfrm>
-            <a:off x="126405" y="6393451"/>
-            <a:ext cx="3100529" cy="430887"/>
+            <a:off x="0" y="5981495"/>
+            <a:ext cx="2826415" cy="400110"/>
           </a:xfrm>
           <a:prstGeom prst="rect">
             <a:avLst/>
@@ -8830,11 +9199,42 @@
           <a:lstStyle/>
           <a:p>
             <a:r>
-              <a:rPr lang="ru-RU" sz="2200" dirty="0">
+              <a:rPr lang="ru-RU" sz="2000" dirty="0">
                 <a:latin typeface="Times New Roman" panose="02020603050405020304" pitchFamily="18" charset="0"/>
                 <a:cs typeface="Times New Roman" panose="02020603050405020304" pitchFamily="18" charset="0"/>
               </a:rPr>
               <a:t>http://veronijo.beget.tech/</a:t>
+            </a:r>
+          </a:p>
+        </p:txBody>
+      </p:sp>
+      <p:sp>
+        <p:nvSpPr>
+          <p:cNvPr id="9" name="Прямоугольник 8"/>
+          <p:cNvSpPr/>
+          <p:nvPr/>
+        </p:nvSpPr>
+        <p:spPr>
+          <a:xfrm>
+            <a:off x="0" y="6362992"/>
+            <a:ext cx="4410759" cy="400110"/>
+          </a:xfrm>
+          <a:prstGeom prst="rect">
+            <a:avLst/>
+          </a:prstGeom>
+        </p:spPr>
+        <p:txBody>
+          <a:bodyPr wrap="none">
+            <a:spAutoFit/>
+          </a:bodyPr>
+          <a:lstStyle/>
+          <a:p>
+            <a:r>
+              <a:rPr lang="ru-RU" sz="2000" dirty="0">
+                <a:latin typeface="Times New Roman" panose="02020603050405020304" pitchFamily="18" charset="0"/>
+                <a:cs typeface="Times New Roman" panose="02020603050405020304" pitchFamily="18" charset="0"/>
+              </a:rPr>
+              <a:t>https://github.com/wbogatyrewa/EVoting</a:t>
             </a:r>
           </a:p>
         </p:txBody>
@@ -8888,28 +9288,24 @@
         </p:nvSpPr>
         <p:spPr>
           <a:xfrm>
-            <a:off x="838199" y="0"/>
-            <a:ext cx="10515600" cy="895639"/>
+            <a:off x="96981" y="1"/>
+            <a:ext cx="9047019" cy="895639"/>
           </a:xfrm>
         </p:spPr>
         <p:txBody>
           <a:bodyPr>
-            <a:normAutofit fontScale="90000"/>
+            <a:normAutofit/>
           </a:bodyPr>
           <a:lstStyle/>
           <a:p>
             <a:pPr algn="ctr"/>
             <a:r>
-              <a:rPr lang="ru-RU" sz="3600" b="1" dirty="0" smtClean="0">
+              <a:rPr lang="ru-RU" sz="3000" b="1" dirty="0">
                 <a:latin typeface="Times New Roman" panose="02020603050405020304" pitchFamily="18" charset="0"/>
                 <a:cs typeface="Times New Roman" panose="02020603050405020304" pitchFamily="18" charset="0"/>
               </a:rPr>
               <a:t>ДИАГРАММА ВАРИАНТОВ ИСПОЛЬЗОВАНИЯ</a:t>
             </a:r>
-            <a:endParaRPr lang="ru-RU" sz="3600" b="1" dirty="0">
-              <a:latin typeface="Times New Roman" panose="02020603050405020304" pitchFamily="18" charset="0"/>
-              <a:cs typeface="Times New Roman" panose="02020603050405020304" pitchFamily="18" charset="0"/>
-            </a:endParaRPr>
           </a:p>
         </p:txBody>
       </p:sp>
@@ -8938,8 +9334,8 @@
         </p:blipFill>
         <p:spPr bwMode="auto">
           <a:xfrm>
-            <a:off x="3023257" y="802783"/>
-            <a:ext cx="6145483" cy="5624854"/>
+            <a:off x="1747156" y="721669"/>
+            <a:ext cx="5746668" cy="5259826"/>
           </a:xfrm>
           <a:prstGeom prst="rect">
             <a:avLst/>
@@ -8964,7 +9360,7 @@
         </p:nvSpPr>
         <p:spPr>
           <a:xfrm>
-            <a:off x="11288443" y="6427637"/>
+            <a:off x="8143461" y="6427638"/>
             <a:ext cx="903557" cy="430887"/>
           </a:xfrm>
           <a:prstGeom prst="rect">
@@ -9077,32 +9473,21 @@
                 <a:latin typeface="Times New Roman" panose="02020603050405020304" pitchFamily="18" charset="0"/>
                 <a:cs typeface="Times New Roman" panose="02020603050405020304" pitchFamily="18" charset="0"/>
               </a:rPr>
-              <a:t>7</a:t>
-            </a:r>
-            <a:r>
-              <a:rPr lang="ru-RU" sz="2200" dirty="0" smtClean="0">
-                <a:latin typeface="Times New Roman" panose="02020603050405020304" pitchFamily="18" charset="0"/>
-                <a:cs typeface="Times New Roman" panose="02020603050405020304" pitchFamily="18" charset="0"/>
-              </a:rPr>
-              <a:t>/18</a:t>
-            </a:r>
-            <a:endParaRPr lang="ru-RU" sz="2200" dirty="0">
-              <a:latin typeface="Times New Roman" panose="02020603050405020304" pitchFamily="18" charset="0"/>
-              <a:cs typeface="Times New Roman" panose="02020603050405020304" pitchFamily="18" charset="0"/>
-            </a:endParaRPr>
-          </a:p>
-        </p:txBody>
-      </p:sp>
-      <p:sp>
-        <p:nvSpPr>
-          <p:cNvPr id="6" name="Прямоугольник 5"/>
+              <a:t>7/18</a:t>
+            </a:r>
+          </a:p>
+        </p:txBody>
+      </p:sp>
+      <p:sp>
+        <p:nvSpPr>
+          <p:cNvPr id="7" name="Прямоугольник 6"/>
           <p:cNvSpPr/>
           <p:nvPr/>
         </p:nvSpPr>
         <p:spPr>
           <a:xfrm>
-            <a:off x="117062" y="6427637"/>
-            <a:ext cx="3100529" cy="430887"/>
+            <a:off x="0" y="5981495"/>
+            <a:ext cx="2826415" cy="400110"/>
           </a:xfrm>
           <a:prstGeom prst="rect">
             <a:avLst/>
@@ -9115,11 +9500,42 @@
           <a:lstStyle/>
           <a:p>
             <a:r>
-              <a:rPr lang="ru-RU" sz="2200" dirty="0">
+              <a:rPr lang="ru-RU" sz="2000" dirty="0">
                 <a:latin typeface="Times New Roman" panose="02020603050405020304" pitchFamily="18" charset="0"/>
                 <a:cs typeface="Times New Roman" panose="02020603050405020304" pitchFamily="18" charset="0"/>
               </a:rPr>
               <a:t>http://veronijo.beget.tech/</a:t>
+            </a:r>
+          </a:p>
+        </p:txBody>
+      </p:sp>
+      <p:sp>
+        <p:nvSpPr>
+          <p:cNvPr id="8" name="Прямоугольник 7"/>
+          <p:cNvSpPr/>
+          <p:nvPr/>
+        </p:nvSpPr>
+        <p:spPr>
+          <a:xfrm>
+            <a:off x="0" y="6362992"/>
+            <a:ext cx="4410759" cy="400110"/>
+          </a:xfrm>
+          <a:prstGeom prst="rect">
+            <a:avLst/>
+          </a:prstGeom>
+        </p:spPr>
+        <p:txBody>
+          <a:bodyPr wrap="none">
+            <a:spAutoFit/>
+          </a:bodyPr>
+          <a:lstStyle/>
+          <a:p>
+            <a:r>
+              <a:rPr lang="ru-RU" sz="2000" dirty="0">
+                <a:latin typeface="Times New Roman" panose="02020603050405020304" pitchFamily="18" charset="0"/>
+                <a:cs typeface="Times New Roman" panose="02020603050405020304" pitchFamily="18" charset="0"/>
+              </a:rPr>
+              <a:t>https://github.com/wbogatyrewa/EVoting</a:t>
             </a:r>
           </a:p>
         </p:txBody>
@@ -9173,8 +9589,8 @@
         </p:nvSpPr>
         <p:spPr>
           <a:xfrm>
-            <a:off x="838198" y="221673"/>
-            <a:ext cx="10515600" cy="895639"/>
+            <a:off x="0" y="221674"/>
+            <a:ext cx="9144000" cy="895639"/>
           </a:xfrm>
         </p:spPr>
         <p:txBody>
@@ -9185,16 +9601,12 @@
           <a:p>
             <a:pPr algn="ctr"/>
             <a:r>
-              <a:rPr lang="ru-RU" sz="3600" b="1" dirty="0" smtClean="0">
+              <a:rPr lang="ru-RU" sz="3600" b="1" dirty="0">
                 <a:latin typeface="Times New Roman" panose="02020603050405020304" pitchFamily="18" charset="0"/>
                 <a:cs typeface="Times New Roman" panose="02020603050405020304" pitchFamily="18" charset="0"/>
               </a:rPr>
               <a:t>ДИАГРАММА КОМПОНЕНТОВ</a:t>
             </a:r>
-            <a:endParaRPr lang="ru-RU" sz="3600" b="1" dirty="0">
-              <a:latin typeface="Times New Roman" panose="02020603050405020304" pitchFamily="18" charset="0"/>
-              <a:cs typeface="Times New Roman" panose="02020603050405020304" pitchFamily="18" charset="0"/>
-            </a:endParaRPr>
           </a:p>
         </p:txBody>
       </p:sp>
@@ -9223,8 +9635,8 @@
         </p:blipFill>
         <p:spPr bwMode="auto">
           <a:xfrm>
-            <a:off x="1648334" y="1333396"/>
-            <a:ext cx="8895327" cy="4610203"/>
+            <a:off x="657912" y="1387711"/>
+            <a:ext cx="7828171" cy="4057125"/>
           </a:xfrm>
           <a:prstGeom prst="rect">
             <a:avLst/>
@@ -9249,7 +9661,7 @@
         </p:nvSpPr>
         <p:spPr>
           <a:xfrm>
-            <a:off x="11288443" y="6334780"/>
+            <a:off x="8034304" y="6334781"/>
             <a:ext cx="903557" cy="430887"/>
           </a:xfrm>
           <a:prstGeom prst="rect">
@@ -9362,32 +9774,21 @@
                 <a:latin typeface="Times New Roman" panose="02020603050405020304" pitchFamily="18" charset="0"/>
                 <a:cs typeface="Times New Roman" panose="02020603050405020304" pitchFamily="18" charset="0"/>
               </a:rPr>
-              <a:t>8</a:t>
-            </a:r>
-            <a:r>
-              <a:rPr lang="ru-RU" sz="2200" dirty="0" smtClean="0">
-                <a:latin typeface="Times New Roman" panose="02020603050405020304" pitchFamily="18" charset="0"/>
-                <a:cs typeface="Times New Roman" panose="02020603050405020304" pitchFamily="18" charset="0"/>
-              </a:rPr>
-              <a:t>/18</a:t>
-            </a:r>
-            <a:endParaRPr lang="ru-RU" sz="2200" dirty="0">
-              <a:latin typeface="Times New Roman" panose="02020603050405020304" pitchFamily="18" charset="0"/>
-              <a:cs typeface="Times New Roman" panose="02020603050405020304" pitchFamily="18" charset="0"/>
-            </a:endParaRPr>
-          </a:p>
-        </p:txBody>
-      </p:sp>
-      <p:sp>
-        <p:nvSpPr>
-          <p:cNvPr id="6" name="Прямоугольник 5"/>
+              <a:t>8/18</a:t>
+            </a:r>
+          </a:p>
+        </p:txBody>
+      </p:sp>
+      <p:sp>
+        <p:nvSpPr>
+          <p:cNvPr id="7" name="Прямоугольник 6"/>
           <p:cNvSpPr/>
           <p:nvPr/>
         </p:nvSpPr>
         <p:spPr>
           <a:xfrm>
-            <a:off x="117062" y="6334780"/>
-            <a:ext cx="3100529" cy="430887"/>
+            <a:off x="0" y="5981495"/>
+            <a:ext cx="2826415" cy="400110"/>
           </a:xfrm>
           <a:prstGeom prst="rect">
             <a:avLst/>
@@ -9400,11 +9801,42 @@
           <a:lstStyle/>
           <a:p>
             <a:r>
-              <a:rPr lang="ru-RU" sz="2200" dirty="0">
+              <a:rPr lang="ru-RU" sz="2000" dirty="0">
                 <a:latin typeface="Times New Roman" panose="02020603050405020304" pitchFamily="18" charset="0"/>
                 <a:cs typeface="Times New Roman" panose="02020603050405020304" pitchFamily="18" charset="0"/>
               </a:rPr>
               <a:t>http://veronijo.beget.tech/</a:t>
+            </a:r>
+          </a:p>
+        </p:txBody>
+      </p:sp>
+      <p:sp>
+        <p:nvSpPr>
+          <p:cNvPr id="8" name="Прямоугольник 7"/>
+          <p:cNvSpPr/>
+          <p:nvPr/>
+        </p:nvSpPr>
+        <p:spPr>
+          <a:xfrm>
+            <a:off x="0" y="6362992"/>
+            <a:ext cx="4410759" cy="400110"/>
+          </a:xfrm>
+          <a:prstGeom prst="rect">
+            <a:avLst/>
+          </a:prstGeom>
+        </p:spPr>
+        <p:txBody>
+          <a:bodyPr wrap="none">
+            <a:spAutoFit/>
+          </a:bodyPr>
+          <a:lstStyle/>
+          <a:p>
+            <a:r>
+              <a:rPr lang="ru-RU" sz="2000" dirty="0">
+                <a:latin typeface="Times New Roman" panose="02020603050405020304" pitchFamily="18" charset="0"/>
+                <a:cs typeface="Times New Roman" panose="02020603050405020304" pitchFamily="18" charset="0"/>
+              </a:rPr>
+              <a:t>https://github.com/wbogatyrewa/EVoting</a:t>
             </a:r>
           </a:p>
         </p:txBody>
@@ -9458,8 +9890,8 @@
         </p:nvSpPr>
         <p:spPr>
           <a:xfrm>
-            <a:off x="838198" y="7593"/>
-            <a:ext cx="10515600" cy="895639"/>
+            <a:off x="0" y="7594"/>
+            <a:ext cx="9144000" cy="895639"/>
           </a:xfrm>
         </p:spPr>
         <p:txBody>
@@ -9470,16 +9902,12 @@
           <a:p>
             <a:pPr algn="ctr"/>
             <a:r>
-              <a:rPr lang="ru-RU" sz="3600" b="1" dirty="0" smtClean="0">
+              <a:rPr lang="ru-RU" sz="3600" b="1" dirty="0">
                 <a:latin typeface="Times New Roman" panose="02020603050405020304" pitchFamily="18" charset="0"/>
                 <a:cs typeface="Times New Roman" panose="02020603050405020304" pitchFamily="18" charset="0"/>
               </a:rPr>
               <a:t>ДИАГРАММА СМАРТ-КОНТРАКТОВ</a:t>
             </a:r>
-            <a:endParaRPr lang="ru-RU" sz="3600" b="1" dirty="0">
-              <a:latin typeface="Times New Roman" panose="02020603050405020304" pitchFamily="18" charset="0"/>
-              <a:cs typeface="Times New Roman" panose="02020603050405020304" pitchFamily="18" charset="0"/>
-            </a:endParaRPr>
           </a:p>
         </p:txBody>
       </p:sp>
@@ -9508,8 +9936,8 @@
         </p:blipFill>
         <p:spPr bwMode="auto">
           <a:xfrm>
-            <a:off x="2102857" y="900505"/>
-            <a:ext cx="7986282" cy="5434275"/>
+            <a:off x="892103" y="903233"/>
+            <a:ext cx="7359794" cy="5007981"/>
           </a:xfrm>
           <a:prstGeom prst="rect">
             <a:avLst/>
@@ -9534,7 +9962,7 @@
         </p:nvSpPr>
         <p:spPr>
           <a:xfrm>
-            <a:off x="11288443" y="6334780"/>
+            <a:off x="8129607" y="6334781"/>
             <a:ext cx="903557" cy="430887"/>
           </a:xfrm>
           <a:prstGeom prst="rect">
@@ -9647,32 +10075,21 @@
                 <a:latin typeface="Times New Roman" panose="02020603050405020304" pitchFamily="18" charset="0"/>
                 <a:cs typeface="Times New Roman" panose="02020603050405020304" pitchFamily="18" charset="0"/>
               </a:rPr>
-              <a:t>9</a:t>
-            </a:r>
-            <a:r>
-              <a:rPr lang="ru-RU" sz="2200" dirty="0" smtClean="0">
-                <a:latin typeface="Times New Roman" panose="02020603050405020304" pitchFamily="18" charset="0"/>
-                <a:cs typeface="Times New Roman" panose="02020603050405020304" pitchFamily="18" charset="0"/>
-              </a:rPr>
-              <a:t>/18</a:t>
-            </a:r>
-            <a:endParaRPr lang="ru-RU" sz="2200" dirty="0">
-              <a:latin typeface="Times New Roman" panose="02020603050405020304" pitchFamily="18" charset="0"/>
-              <a:cs typeface="Times New Roman" panose="02020603050405020304" pitchFamily="18" charset="0"/>
-            </a:endParaRPr>
-          </a:p>
-        </p:txBody>
-      </p:sp>
-      <p:sp>
-        <p:nvSpPr>
-          <p:cNvPr id="5" name="Прямоугольник 4"/>
+              <a:t>9/18</a:t>
+            </a:r>
+          </a:p>
+        </p:txBody>
+      </p:sp>
+      <p:sp>
+        <p:nvSpPr>
+          <p:cNvPr id="7" name="Прямоугольник 6"/>
           <p:cNvSpPr/>
           <p:nvPr/>
         </p:nvSpPr>
         <p:spPr>
           <a:xfrm>
-            <a:off x="117062" y="6334780"/>
-            <a:ext cx="3100529" cy="430887"/>
+            <a:off x="0" y="5981495"/>
+            <a:ext cx="2826415" cy="400110"/>
           </a:xfrm>
           <a:prstGeom prst="rect">
             <a:avLst/>
@@ -9685,11 +10102,42 @@
           <a:lstStyle/>
           <a:p>
             <a:r>
-              <a:rPr lang="ru-RU" sz="2200" dirty="0">
+              <a:rPr lang="ru-RU" sz="2000" dirty="0">
                 <a:latin typeface="Times New Roman" panose="02020603050405020304" pitchFamily="18" charset="0"/>
                 <a:cs typeface="Times New Roman" panose="02020603050405020304" pitchFamily="18" charset="0"/>
               </a:rPr>
               <a:t>http://veronijo.beget.tech/</a:t>
+            </a:r>
+          </a:p>
+        </p:txBody>
+      </p:sp>
+      <p:sp>
+        <p:nvSpPr>
+          <p:cNvPr id="8" name="Прямоугольник 7"/>
+          <p:cNvSpPr/>
+          <p:nvPr/>
+        </p:nvSpPr>
+        <p:spPr>
+          <a:xfrm>
+            <a:off x="0" y="6362992"/>
+            <a:ext cx="4410759" cy="400110"/>
+          </a:xfrm>
+          <a:prstGeom prst="rect">
+            <a:avLst/>
+          </a:prstGeom>
+        </p:spPr>
+        <p:txBody>
+          <a:bodyPr wrap="none">
+            <a:spAutoFit/>
+          </a:bodyPr>
+          <a:lstStyle/>
+          <a:p>
+            <a:r>
+              <a:rPr lang="ru-RU" sz="2000" dirty="0">
+                <a:latin typeface="Times New Roman" panose="02020603050405020304" pitchFamily="18" charset="0"/>
+                <a:cs typeface="Times New Roman" panose="02020603050405020304" pitchFamily="18" charset="0"/>
+              </a:rPr>
+              <a:t>https://github.com/wbogatyrewa/EVoting</a:t>
             </a:r>
           </a:p>
         </p:txBody>
@@ -9717,7 +10165,7 @@
 <file path=ppt/theme/theme1.xml><?xml version="1.0" encoding="utf-8"?>
 <a:theme xmlns:a="http://schemas.openxmlformats.org/drawingml/2006/main" name="Тема Office">
   <a:themeElements>
-    <a:clrScheme name="Стандартная">
+    <a:clrScheme name="Тема Office">
       <a:dk1>
         <a:sysClr val="windowText" lastClr="000000"/>
       </a:dk1>
@@ -9755,7 +10203,7 @@
         <a:srgbClr val="954F72"/>
       </a:folHlink>
     </a:clrScheme>
-    <a:fontScheme name="Стандартная">
+    <a:fontScheme name="Тема Office">
       <a:majorFont>
         <a:latin typeface="Calibri Light" panose="020F0302020204030204"/>
         <a:ea typeface=""/>
@@ -9827,7 +10275,7 @@
         <a:font script="Geor" typeface="Sylfaen"/>
       </a:minorFont>
     </a:fontScheme>
-    <a:fmtScheme name="Стандартная">
+    <a:fmtScheme name="Тема Office">
       <a:fillStyleLst>
         <a:solidFill>
           <a:schemeClr val="phClr"/>

</xml_diff>

<commit_message>
change main page img
</commit_message>
<xml_diff>
--- a/reports/2023_403_БогатыреваВО_slides.pptx
+++ b/reports/2023_403_БогатыреваВО_slides.pptx
@@ -214,7 +214,7 @@
           <a:p>
             <a:fld id="{7DEDA2BB-1C5C-4526-95E5-77A988EF9EA2}" type="datetimeFigureOut">
               <a:rPr lang="ru-RU" smtClean="0"/>
-              <a:t>23.05.2023</a:t>
+              <a:t>29.05.2023</a:t>
             </a:fld>
             <a:endParaRPr lang="ru-RU"/>
           </a:p>
@@ -971,7 +971,7 @@
           <a:p>
             <a:fld id="{9D1E7A46-1A4E-41C3-B23B-1269BF8B1FAC}" type="datetimeFigureOut">
               <a:rPr lang="ru-RU" smtClean="0"/>
-              <a:t>23.05.2023</a:t>
+              <a:t>29.05.2023</a:t>
             </a:fld>
             <a:endParaRPr lang="ru-RU"/>
           </a:p>
@@ -1141,7 +1141,7 @@
           <a:p>
             <a:fld id="{9D1E7A46-1A4E-41C3-B23B-1269BF8B1FAC}" type="datetimeFigureOut">
               <a:rPr lang="ru-RU" smtClean="0"/>
-              <a:t>23.05.2023</a:t>
+              <a:t>29.05.2023</a:t>
             </a:fld>
             <a:endParaRPr lang="ru-RU"/>
           </a:p>
@@ -1321,7 +1321,7 @@
           <a:p>
             <a:fld id="{9D1E7A46-1A4E-41C3-B23B-1269BF8B1FAC}" type="datetimeFigureOut">
               <a:rPr lang="ru-RU" smtClean="0"/>
-              <a:t>23.05.2023</a:t>
+              <a:t>29.05.2023</a:t>
             </a:fld>
             <a:endParaRPr lang="ru-RU"/>
           </a:p>
@@ -1491,7 +1491,7 @@
           <a:p>
             <a:fld id="{9D1E7A46-1A4E-41C3-B23B-1269BF8B1FAC}" type="datetimeFigureOut">
               <a:rPr lang="ru-RU" smtClean="0"/>
-              <a:t>23.05.2023</a:t>
+              <a:t>29.05.2023</a:t>
             </a:fld>
             <a:endParaRPr lang="ru-RU"/>
           </a:p>
@@ -1735,7 +1735,7 @@
           <a:p>
             <a:fld id="{9D1E7A46-1A4E-41C3-B23B-1269BF8B1FAC}" type="datetimeFigureOut">
               <a:rPr lang="ru-RU" smtClean="0"/>
-              <a:t>23.05.2023</a:t>
+              <a:t>29.05.2023</a:t>
             </a:fld>
             <a:endParaRPr lang="ru-RU"/>
           </a:p>
@@ -1967,7 +1967,7 @@
           <a:p>
             <a:fld id="{9D1E7A46-1A4E-41C3-B23B-1269BF8B1FAC}" type="datetimeFigureOut">
               <a:rPr lang="ru-RU" smtClean="0"/>
-              <a:t>23.05.2023</a:t>
+              <a:t>29.05.2023</a:t>
             </a:fld>
             <a:endParaRPr lang="ru-RU"/>
           </a:p>
@@ -2334,7 +2334,7 @@
           <a:p>
             <a:fld id="{9D1E7A46-1A4E-41C3-B23B-1269BF8B1FAC}" type="datetimeFigureOut">
               <a:rPr lang="ru-RU" smtClean="0"/>
-              <a:t>23.05.2023</a:t>
+              <a:t>29.05.2023</a:t>
             </a:fld>
             <a:endParaRPr lang="ru-RU"/>
           </a:p>
@@ -2452,7 +2452,7 @@
           <a:p>
             <a:fld id="{9D1E7A46-1A4E-41C3-B23B-1269BF8B1FAC}" type="datetimeFigureOut">
               <a:rPr lang="ru-RU" smtClean="0"/>
-              <a:t>23.05.2023</a:t>
+              <a:t>29.05.2023</a:t>
             </a:fld>
             <a:endParaRPr lang="ru-RU"/>
           </a:p>
@@ -2547,7 +2547,7 @@
           <a:p>
             <a:fld id="{9D1E7A46-1A4E-41C3-B23B-1269BF8B1FAC}" type="datetimeFigureOut">
               <a:rPr lang="ru-RU" smtClean="0"/>
-              <a:t>23.05.2023</a:t>
+              <a:t>29.05.2023</a:t>
             </a:fld>
             <a:endParaRPr lang="ru-RU"/>
           </a:p>
@@ -2824,7 +2824,7 @@
           <a:p>
             <a:fld id="{9D1E7A46-1A4E-41C3-B23B-1269BF8B1FAC}" type="datetimeFigureOut">
               <a:rPr lang="ru-RU" smtClean="0"/>
-              <a:t>23.05.2023</a:t>
+              <a:t>29.05.2023</a:t>
             </a:fld>
             <a:endParaRPr lang="ru-RU"/>
           </a:p>
@@ -3081,7 +3081,7 @@
           <a:p>
             <a:fld id="{9D1E7A46-1A4E-41C3-B23B-1269BF8B1FAC}" type="datetimeFigureOut">
               <a:rPr lang="ru-RU" smtClean="0"/>
-              <a:t>23.05.2023</a:t>
+              <a:t>29.05.2023</a:t>
             </a:fld>
             <a:endParaRPr lang="ru-RU"/>
           </a:p>
@@ -3294,7 +3294,7 @@
           <a:p>
             <a:fld id="{9D1E7A46-1A4E-41C3-B23B-1269BF8B1FAC}" type="datetimeFigureOut">
               <a:rPr lang="ru-RU" smtClean="0"/>
-              <a:t>23.05.2023</a:t>
+              <a:t>29.05.2023</a:t>
             </a:fld>
             <a:endParaRPr lang="ru-RU"/>
           </a:p>
@@ -4143,7 +4143,7 @@
           <p:cNvPr id="4" name="TextBox 5">
             <a:extLst>
               <a:ext uri="{FF2B5EF4-FFF2-40B4-BE49-F238E27FC236}">
-                <a16:creationId xmlns:lc="http://schemas.openxmlformats.org/drawingml/2006/lockedCanvas" xmlns="" xmlns:a16="http://schemas.microsoft.com/office/drawing/2014/main" id="{F7043567-4147-88C3-F094-05513D23DB95}"/>
+                <a16:creationId xmlns:a16="http://schemas.microsoft.com/office/drawing/2014/main" xmlns="" xmlns:lc="http://schemas.openxmlformats.org/drawingml/2006/lockedCanvas" id="{F7043567-4147-88C3-F094-05513D23DB95}"/>
               </a:ext>
             </a:extLst>
           </p:cNvPr>
@@ -4444,7 +4444,7 @@
           <p:cNvPr id="4" name="TextBox 5">
             <a:extLst>
               <a:ext uri="{FF2B5EF4-FFF2-40B4-BE49-F238E27FC236}">
-                <a16:creationId xmlns:lc="http://schemas.openxmlformats.org/drawingml/2006/lockedCanvas" xmlns="" xmlns:a16="http://schemas.microsoft.com/office/drawing/2014/main" id="{F7043567-4147-88C3-F094-05513D23DB95}"/>
+                <a16:creationId xmlns:a16="http://schemas.microsoft.com/office/drawing/2014/main" xmlns="" xmlns:lc="http://schemas.openxmlformats.org/drawingml/2006/lockedCanvas" id="{F7043567-4147-88C3-F094-05513D23DB95}"/>
               </a:ext>
             </a:extLst>
           </p:cNvPr>
@@ -5190,7 +5190,7 @@
           <p:cNvPr id="5" name="TextBox 5">
             <a:extLst>
               <a:ext uri="{FF2B5EF4-FFF2-40B4-BE49-F238E27FC236}">
-                <a16:creationId xmlns:lc="http://schemas.openxmlformats.org/drawingml/2006/lockedCanvas" xmlns="" xmlns:a16="http://schemas.microsoft.com/office/drawing/2014/main" id="{F7043567-4147-88C3-F094-05513D23DB95}"/>
+                <a16:creationId xmlns:a16="http://schemas.microsoft.com/office/drawing/2014/main" xmlns="" xmlns:lc="http://schemas.openxmlformats.org/drawingml/2006/lockedCanvas" id="{F7043567-4147-88C3-F094-05513D23DB95}"/>
               </a:ext>
             </a:extLst>
           </p:cNvPr>
@@ -5439,7 +5439,7 @@
         </p:nvSpPr>
         <p:spPr>
           <a:xfrm>
-            <a:off x="0" y="1"/>
+            <a:off x="-529" y="140222"/>
             <a:ext cx="9144000" cy="895639"/>
           </a:xfrm>
         </p:spPr>
@@ -5460,11 +5460,205 @@
           </a:p>
         </p:txBody>
       </p:sp>
+      <p:sp>
+        <p:nvSpPr>
+          <p:cNvPr id="5" name="TextBox 5">
+            <a:extLst>
+              <a:ext uri="{FF2B5EF4-FFF2-40B4-BE49-F238E27FC236}">
+                <a16:creationId xmlns:a16="http://schemas.microsoft.com/office/drawing/2014/main" xmlns="" xmlns:lc="http://schemas.openxmlformats.org/drawingml/2006/lockedCanvas" id="{F7043567-4147-88C3-F094-05513D23DB95}"/>
+              </a:ext>
+            </a:extLst>
+          </p:cNvPr>
+          <p:cNvSpPr txBox="1"/>
+          <p:nvPr/>
+        </p:nvSpPr>
+        <p:spPr>
+          <a:xfrm>
+            <a:off x="7924799" y="6334781"/>
+            <a:ext cx="1080656" cy="430887"/>
+          </a:xfrm>
+          <a:prstGeom prst="rect">
+            <a:avLst/>
+          </a:prstGeom>
+          <a:noFill/>
+        </p:spPr>
+        <p:txBody>
+          <a:bodyPr wrap="square" rtlCol="0">
+            <a:spAutoFit/>
+          </a:bodyPr>
+          <a:lstStyle>
+            <a:defPPr>
+              <a:defRPr lang="ru-RU"/>
+            </a:defPPr>
+            <a:lvl1pPr marL="0" algn="l" defTabSz="914400" rtl="0" eaLnBrk="1" latinLnBrk="0" hangingPunct="1">
+              <a:defRPr sz="1800" kern="1200">
+                <a:solidFill>
+                  <a:schemeClr val="tx1"/>
+                </a:solidFill>
+                <a:latin typeface="+mn-lt"/>
+                <a:ea typeface="+mn-ea"/>
+                <a:cs typeface="+mn-cs"/>
+              </a:defRPr>
+            </a:lvl1pPr>
+            <a:lvl2pPr marL="457200" algn="l" defTabSz="914400" rtl="0" eaLnBrk="1" latinLnBrk="0" hangingPunct="1">
+              <a:defRPr sz="1800" kern="1200">
+                <a:solidFill>
+                  <a:schemeClr val="tx1"/>
+                </a:solidFill>
+                <a:latin typeface="+mn-lt"/>
+                <a:ea typeface="+mn-ea"/>
+                <a:cs typeface="+mn-cs"/>
+              </a:defRPr>
+            </a:lvl2pPr>
+            <a:lvl3pPr marL="914400" algn="l" defTabSz="914400" rtl="0" eaLnBrk="1" latinLnBrk="0" hangingPunct="1">
+              <a:defRPr sz="1800" kern="1200">
+                <a:solidFill>
+                  <a:schemeClr val="tx1"/>
+                </a:solidFill>
+                <a:latin typeface="+mn-lt"/>
+                <a:ea typeface="+mn-ea"/>
+                <a:cs typeface="+mn-cs"/>
+              </a:defRPr>
+            </a:lvl3pPr>
+            <a:lvl4pPr marL="1371600" algn="l" defTabSz="914400" rtl="0" eaLnBrk="1" latinLnBrk="0" hangingPunct="1">
+              <a:defRPr sz="1800" kern="1200">
+                <a:solidFill>
+                  <a:schemeClr val="tx1"/>
+                </a:solidFill>
+                <a:latin typeface="+mn-lt"/>
+                <a:ea typeface="+mn-ea"/>
+                <a:cs typeface="+mn-cs"/>
+              </a:defRPr>
+            </a:lvl4pPr>
+            <a:lvl5pPr marL="1828800" algn="l" defTabSz="914400" rtl="0" eaLnBrk="1" latinLnBrk="0" hangingPunct="1">
+              <a:defRPr sz="1800" kern="1200">
+                <a:solidFill>
+                  <a:schemeClr val="tx1"/>
+                </a:solidFill>
+                <a:latin typeface="+mn-lt"/>
+                <a:ea typeface="+mn-ea"/>
+                <a:cs typeface="+mn-cs"/>
+              </a:defRPr>
+            </a:lvl5pPr>
+            <a:lvl6pPr marL="2286000" algn="l" defTabSz="914400" rtl="0" eaLnBrk="1" latinLnBrk="0" hangingPunct="1">
+              <a:defRPr sz="1800" kern="1200">
+                <a:solidFill>
+                  <a:schemeClr val="tx1"/>
+                </a:solidFill>
+                <a:latin typeface="+mn-lt"/>
+                <a:ea typeface="+mn-ea"/>
+                <a:cs typeface="+mn-cs"/>
+              </a:defRPr>
+            </a:lvl6pPr>
+            <a:lvl7pPr marL="2743200" algn="l" defTabSz="914400" rtl="0" eaLnBrk="1" latinLnBrk="0" hangingPunct="1">
+              <a:defRPr sz="1800" kern="1200">
+                <a:solidFill>
+                  <a:schemeClr val="tx1"/>
+                </a:solidFill>
+                <a:latin typeface="+mn-lt"/>
+                <a:ea typeface="+mn-ea"/>
+                <a:cs typeface="+mn-cs"/>
+              </a:defRPr>
+            </a:lvl7pPr>
+            <a:lvl8pPr marL="3200400" algn="l" defTabSz="914400" rtl="0" eaLnBrk="1" latinLnBrk="0" hangingPunct="1">
+              <a:defRPr sz="1800" kern="1200">
+                <a:solidFill>
+                  <a:schemeClr val="tx1"/>
+                </a:solidFill>
+                <a:latin typeface="+mn-lt"/>
+                <a:ea typeface="+mn-ea"/>
+                <a:cs typeface="+mn-cs"/>
+              </a:defRPr>
+            </a:lvl8pPr>
+            <a:lvl9pPr marL="3657600" algn="l" defTabSz="914400" rtl="0" eaLnBrk="1" latinLnBrk="0" hangingPunct="1">
+              <a:defRPr sz="1800" kern="1200">
+                <a:solidFill>
+                  <a:schemeClr val="tx1"/>
+                </a:solidFill>
+                <a:latin typeface="+mn-lt"/>
+                <a:ea typeface="+mn-ea"/>
+                <a:cs typeface="+mn-cs"/>
+              </a:defRPr>
+            </a:lvl9pPr>
+          </a:lstStyle>
+          <a:p>
+            <a:r>
+              <a:rPr lang="ru-RU" sz="2200" dirty="0">
+                <a:latin typeface="Times New Roman" panose="02020603050405020304" pitchFamily="18" charset="0"/>
+                <a:cs typeface="Times New Roman" panose="02020603050405020304" pitchFamily="18" charset="0"/>
+              </a:rPr>
+              <a:t>13/18</a:t>
+            </a:r>
+          </a:p>
+        </p:txBody>
+      </p:sp>
+      <p:sp>
+        <p:nvSpPr>
+          <p:cNvPr id="7" name="Прямоугольник 6"/>
+          <p:cNvSpPr/>
+          <p:nvPr/>
+        </p:nvSpPr>
+        <p:spPr>
+          <a:xfrm>
+            <a:off x="0" y="5981495"/>
+            <a:ext cx="2826415" cy="400110"/>
+          </a:xfrm>
+          <a:prstGeom prst="rect">
+            <a:avLst/>
+          </a:prstGeom>
+        </p:spPr>
+        <p:txBody>
+          <a:bodyPr wrap="none">
+            <a:spAutoFit/>
+          </a:bodyPr>
+          <a:lstStyle/>
+          <a:p>
+            <a:r>
+              <a:rPr lang="ru-RU" sz="2000" dirty="0">
+                <a:latin typeface="Times New Roman" panose="02020603050405020304" pitchFamily="18" charset="0"/>
+                <a:cs typeface="Times New Roman" panose="02020603050405020304" pitchFamily="18" charset="0"/>
+              </a:rPr>
+              <a:t>http://veronijo.beget.tech/</a:t>
+            </a:r>
+          </a:p>
+        </p:txBody>
+      </p:sp>
+      <p:sp>
+        <p:nvSpPr>
+          <p:cNvPr id="8" name="Прямоугольник 7"/>
+          <p:cNvSpPr/>
+          <p:nvPr/>
+        </p:nvSpPr>
+        <p:spPr>
+          <a:xfrm>
+            <a:off x="0" y="6362992"/>
+            <a:ext cx="4410759" cy="400110"/>
+          </a:xfrm>
+          <a:prstGeom prst="rect">
+            <a:avLst/>
+          </a:prstGeom>
+        </p:spPr>
+        <p:txBody>
+          <a:bodyPr wrap="none">
+            <a:spAutoFit/>
+          </a:bodyPr>
+          <a:lstStyle/>
+          <a:p>
+            <a:r>
+              <a:rPr lang="ru-RU" sz="2000" dirty="0">
+                <a:latin typeface="Times New Roman" panose="02020603050405020304" pitchFamily="18" charset="0"/>
+                <a:cs typeface="Times New Roman" panose="02020603050405020304" pitchFamily="18" charset="0"/>
+              </a:rPr>
+              <a:t>https://github.com/wbogatyrewa/EVoting</a:t>
+            </a:r>
+          </a:p>
+        </p:txBody>
+      </p:sp>
       <p:pic>
         <p:nvPicPr>
-          <p:cNvPr id="4" name="Объект 3"/>
+          <p:cNvPr id="9" name="Объект 8"/>
           <p:cNvPicPr>
-            <a:picLocks noGrp="1"/>
+            <a:picLocks noGrp="1" noChangeAspect="1"/>
           </p:cNvPicPr>
           <p:nvPr>
             <p:ph idx="1"/>
@@ -5478,8 +5672,8 @@
         </p:blipFill>
         <p:spPr>
           <a:xfrm>
-            <a:off x="286934" y="992623"/>
-            <a:ext cx="8581358" cy="4327524"/>
+            <a:off x="296140" y="1277137"/>
+            <a:ext cx="8550663" cy="4221806"/>
           </a:xfrm>
           <a:prstGeom prst="rect">
             <a:avLst/>
@@ -5491,200 +5685,6 @@
           </a:ln>
         </p:spPr>
       </p:pic>
-      <p:sp>
-        <p:nvSpPr>
-          <p:cNvPr id="5" name="TextBox 5">
-            <a:extLst>
-              <a:ext uri="{FF2B5EF4-FFF2-40B4-BE49-F238E27FC236}">
-                <a16:creationId xmlns:lc="http://schemas.openxmlformats.org/drawingml/2006/lockedCanvas" xmlns="" xmlns:a16="http://schemas.microsoft.com/office/drawing/2014/main" id="{F7043567-4147-88C3-F094-05513D23DB95}"/>
-              </a:ext>
-            </a:extLst>
-          </p:cNvPr>
-          <p:cNvSpPr txBox="1"/>
-          <p:nvPr/>
-        </p:nvSpPr>
-        <p:spPr>
-          <a:xfrm>
-            <a:off x="7924799" y="6334781"/>
-            <a:ext cx="1080656" cy="430887"/>
-          </a:xfrm>
-          <a:prstGeom prst="rect">
-            <a:avLst/>
-          </a:prstGeom>
-          <a:noFill/>
-        </p:spPr>
-        <p:txBody>
-          <a:bodyPr wrap="square" rtlCol="0">
-            <a:spAutoFit/>
-          </a:bodyPr>
-          <a:lstStyle>
-            <a:defPPr>
-              <a:defRPr lang="ru-RU"/>
-            </a:defPPr>
-            <a:lvl1pPr marL="0" algn="l" defTabSz="914400" rtl="0" eaLnBrk="1" latinLnBrk="0" hangingPunct="1">
-              <a:defRPr sz="1800" kern="1200">
-                <a:solidFill>
-                  <a:schemeClr val="tx1"/>
-                </a:solidFill>
-                <a:latin typeface="+mn-lt"/>
-                <a:ea typeface="+mn-ea"/>
-                <a:cs typeface="+mn-cs"/>
-              </a:defRPr>
-            </a:lvl1pPr>
-            <a:lvl2pPr marL="457200" algn="l" defTabSz="914400" rtl="0" eaLnBrk="1" latinLnBrk="0" hangingPunct="1">
-              <a:defRPr sz="1800" kern="1200">
-                <a:solidFill>
-                  <a:schemeClr val="tx1"/>
-                </a:solidFill>
-                <a:latin typeface="+mn-lt"/>
-                <a:ea typeface="+mn-ea"/>
-                <a:cs typeface="+mn-cs"/>
-              </a:defRPr>
-            </a:lvl2pPr>
-            <a:lvl3pPr marL="914400" algn="l" defTabSz="914400" rtl="0" eaLnBrk="1" latinLnBrk="0" hangingPunct="1">
-              <a:defRPr sz="1800" kern="1200">
-                <a:solidFill>
-                  <a:schemeClr val="tx1"/>
-                </a:solidFill>
-                <a:latin typeface="+mn-lt"/>
-                <a:ea typeface="+mn-ea"/>
-                <a:cs typeface="+mn-cs"/>
-              </a:defRPr>
-            </a:lvl3pPr>
-            <a:lvl4pPr marL="1371600" algn="l" defTabSz="914400" rtl="0" eaLnBrk="1" latinLnBrk="0" hangingPunct="1">
-              <a:defRPr sz="1800" kern="1200">
-                <a:solidFill>
-                  <a:schemeClr val="tx1"/>
-                </a:solidFill>
-                <a:latin typeface="+mn-lt"/>
-                <a:ea typeface="+mn-ea"/>
-                <a:cs typeface="+mn-cs"/>
-              </a:defRPr>
-            </a:lvl4pPr>
-            <a:lvl5pPr marL="1828800" algn="l" defTabSz="914400" rtl="0" eaLnBrk="1" latinLnBrk="0" hangingPunct="1">
-              <a:defRPr sz="1800" kern="1200">
-                <a:solidFill>
-                  <a:schemeClr val="tx1"/>
-                </a:solidFill>
-                <a:latin typeface="+mn-lt"/>
-                <a:ea typeface="+mn-ea"/>
-                <a:cs typeface="+mn-cs"/>
-              </a:defRPr>
-            </a:lvl5pPr>
-            <a:lvl6pPr marL="2286000" algn="l" defTabSz="914400" rtl="0" eaLnBrk="1" latinLnBrk="0" hangingPunct="1">
-              <a:defRPr sz="1800" kern="1200">
-                <a:solidFill>
-                  <a:schemeClr val="tx1"/>
-                </a:solidFill>
-                <a:latin typeface="+mn-lt"/>
-                <a:ea typeface="+mn-ea"/>
-                <a:cs typeface="+mn-cs"/>
-              </a:defRPr>
-            </a:lvl6pPr>
-            <a:lvl7pPr marL="2743200" algn="l" defTabSz="914400" rtl="0" eaLnBrk="1" latinLnBrk="0" hangingPunct="1">
-              <a:defRPr sz="1800" kern="1200">
-                <a:solidFill>
-                  <a:schemeClr val="tx1"/>
-                </a:solidFill>
-                <a:latin typeface="+mn-lt"/>
-                <a:ea typeface="+mn-ea"/>
-                <a:cs typeface="+mn-cs"/>
-              </a:defRPr>
-            </a:lvl7pPr>
-            <a:lvl8pPr marL="3200400" algn="l" defTabSz="914400" rtl="0" eaLnBrk="1" latinLnBrk="0" hangingPunct="1">
-              <a:defRPr sz="1800" kern="1200">
-                <a:solidFill>
-                  <a:schemeClr val="tx1"/>
-                </a:solidFill>
-                <a:latin typeface="+mn-lt"/>
-                <a:ea typeface="+mn-ea"/>
-                <a:cs typeface="+mn-cs"/>
-              </a:defRPr>
-            </a:lvl8pPr>
-            <a:lvl9pPr marL="3657600" algn="l" defTabSz="914400" rtl="0" eaLnBrk="1" latinLnBrk="0" hangingPunct="1">
-              <a:defRPr sz="1800" kern="1200">
-                <a:solidFill>
-                  <a:schemeClr val="tx1"/>
-                </a:solidFill>
-                <a:latin typeface="+mn-lt"/>
-                <a:ea typeface="+mn-ea"/>
-                <a:cs typeface="+mn-cs"/>
-              </a:defRPr>
-            </a:lvl9pPr>
-          </a:lstStyle>
-          <a:p>
-            <a:r>
-              <a:rPr lang="ru-RU" sz="2200" dirty="0">
-                <a:latin typeface="Times New Roman" panose="02020603050405020304" pitchFamily="18" charset="0"/>
-                <a:cs typeface="Times New Roman" panose="02020603050405020304" pitchFamily="18" charset="0"/>
-              </a:rPr>
-              <a:t>13/18</a:t>
-            </a:r>
-          </a:p>
-        </p:txBody>
-      </p:sp>
-      <p:sp>
-        <p:nvSpPr>
-          <p:cNvPr id="7" name="Прямоугольник 6"/>
-          <p:cNvSpPr/>
-          <p:nvPr/>
-        </p:nvSpPr>
-        <p:spPr>
-          <a:xfrm>
-            <a:off x="0" y="5981495"/>
-            <a:ext cx="2826415" cy="400110"/>
-          </a:xfrm>
-          <a:prstGeom prst="rect">
-            <a:avLst/>
-          </a:prstGeom>
-        </p:spPr>
-        <p:txBody>
-          <a:bodyPr wrap="none">
-            <a:spAutoFit/>
-          </a:bodyPr>
-          <a:lstStyle/>
-          <a:p>
-            <a:r>
-              <a:rPr lang="ru-RU" sz="2000" dirty="0">
-                <a:latin typeface="Times New Roman" panose="02020603050405020304" pitchFamily="18" charset="0"/>
-                <a:cs typeface="Times New Roman" panose="02020603050405020304" pitchFamily="18" charset="0"/>
-              </a:rPr>
-              <a:t>http://veronijo.beget.tech/</a:t>
-            </a:r>
-          </a:p>
-        </p:txBody>
-      </p:sp>
-      <p:sp>
-        <p:nvSpPr>
-          <p:cNvPr id="8" name="Прямоугольник 7"/>
-          <p:cNvSpPr/>
-          <p:nvPr/>
-        </p:nvSpPr>
-        <p:spPr>
-          <a:xfrm>
-            <a:off x="0" y="6362992"/>
-            <a:ext cx="4410759" cy="400110"/>
-          </a:xfrm>
-          <a:prstGeom prst="rect">
-            <a:avLst/>
-          </a:prstGeom>
-        </p:spPr>
-        <p:txBody>
-          <a:bodyPr wrap="none">
-            <a:spAutoFit/>
-          </a:bodyPr>
-          <a:lstStyle/>
-          <a:p>
-            <a:r>
-              <a:rPr lang="ru-RU" sz="2000" dirty="0">
-                <a:latin typeface="Times New Roman" panose="02020603050405020304" pitchFamily="18" charset="0"/>
-                <a:cs typeface="Times New Roman" panose="02020603050405020304" pitchFamily="18" charset="0"/>
-              </a:rPr>
-              <a:t>https://github.com/wbogatyrewa/EVoting</a:t>
-            </a:r>
-          </a:p>
-        </p:txBody>
-      </p:sp>
     </p:spTree>
     <p:extLst>
       <p:ext uri="{BB962C8B-B14F-4D97-AF65-F5344CB8AC3E}">
@@ -5834,7 +5834,7 @@
           <p:cNvPr id="7" name="TextBox 5">
             <a:extLst>
               <a:ext uri="{FF2B5EF4-FFF2-40B4-BE49-F238E27FC236}">
-                <a16:creationId xmlns:lc="http://schemas.openxmlformats.org/drawingml/2006/lockedCanvas" xmlns="" xmlns:a16="http://schemas.microsoft.com/office/drawing/2014/main" id="{F7043567-4147-88C3-F094-05513D23DB95}"/>
+                <a16:creationId xmlns:a16="http://schemas.microsoft.com/office/drawing/2014/main" xmlns="" xmlns:lc="http://schemas.openxmlformats.org/drawingml/2006/lockedCanvas" id="{F7043567-4147-88C3-F094-05513D23DB95}"/>
               </a:ext>
             </a:extLst>
           </p:cNvPr>
@@ -6129,7 +6129,7 @@
           <p:cNvPr id="4" name="TextBox 5">
             <a:extLst>
               <a:ext uri="{FF2B5EF4-FFF2-40B4-BE49-F238E27FC236}">
-                <a16:creationId xmlns:lc="http://schemas.openxmlformats.org/drawingml/2006/lockedCanvas" xmlns="" xmlns:a16="http://schemas.microsoft.com/office/drawing/2014/main" id="{F7043567-4147-88C3-F094-05513D23DB95}"/>
+                <a16:creationId xmlns:a16="http://schemas.microsoft.com/office/drawing/2014/main" xmlns="" xmlns:lc="http://schemas.openxmlformats.org/drawingml/2006/lockedCanvas" id="{F7043567-4147-88C3-F094-05513D23DB95}"/>
               </a:ext>
             </a:extLst>
           </p:cNvPr>
@@ -6424,7 +6424,7 @@
           <p:cNvPr id="4" name="TextBox 5">
             <a:extLst>
               <a:ext uri="{FF2B5EF4-FFF2-40B4-BE49-F238E27FC236}">
-                <a16:creationId xmlns:lc="http://schemas.openxmlformats.org/drawingml/2006/lockedCanvas" xmlns="" xmlns:a16="http://schemas.microsoft.com/office/drawing/2014/main" id="{F7043567-4147-88C3-F094-05513D23DB95}"/>
+                <a16:creationId xmlns:a16="http://schemas.microsoft.com/office/drawing/2014/main" xmlns="" xmlns:lc="http://schemas.openxmlformats.org/drawingml/2006/lockedCanvas" id="{F7043567-4147-88C3-F094-05513D23DB95}"/>
               </a:ext>
             </a:extLst>
           </p:cNvPr>
@@ -6818,7 +6818,7 @@
           <p:cNvPr id="4" name="TextBox 5">
             <a:extLst>
               <a:ext uri="{FF2B5EF4-FFF2-40B4-BE49-F238E27FC236}">
-                <a16:creationId xmlns:lc="http://schemas.openxmlformats.org/drawingml/2006/lockedCanvas" xmlns="" xmlns:a16="http://schemas.microsoft.com/office/drawing/2014/main" id="{F7043567-4147-88C3-F094-05513D23DB95}"/>
+                <a16:creationId xmlns:a16="http://schemas.microsoft.com/office/drawing/2014/main" xmlns="" xmlns:lc="http://schemas.openxmlformats.org/drawingml/2006/lockedCanvas" id="{F7043567-4147-88C3-F094-05513D23DB95}"/>
               </a:ext>
             </a:extLst>
           </p:cNvPr>
@@ -7223,7 +7223,7 @@
           <p:cNvPr id="4" name="TextBox 5">
             <a:extLst>
               <a:ext uri="{FF2B5EF4-FFF2-40B4-BE49-F238E27FC236}">
-                <a16:creationId xmlns:lc="http://schemas.openxmlformats.org/drawingml/2006/lockedCanvas" xmlns="" xmlns:a16="http://schemas.microsoft.com/office/drawing/2014/main" id="{F7043567-4147-88C3-F094-05513D23DB95}"/>
+                <a16:creationId xmlns:a16="http://schemas.microsoft.com/office/drawing/2014/main" xmlns="" xmlns:lc="http://schemas.openxmlformats.org/drawingml/2006/lockedCanvas" id="{F7043567-4147-88C3-F094-05513D23DB95}"/>
               </a:ext>
             </a:extLst>
           </p:cNvPr>
@@ -7600,7 +7600,7 @@
           <p:cNvPr id="5" name="TextBox 5">
             <a:extLst>
               <a:ext uri="{FF2B5EF4-FFF2-40B4-BE49-F238E27FC236}">
-                <a16:creationId xmlns:lc="http://schemas.openxmlformats.org/drawingml/2006/lockedCanvas" xmlns="" xmlns:a16="http://schemas.microsoft.com/office/drawing/2014/main" id="{F7043567-4147-88C3-F094-05513D23DB95}"/>
+                <a16:creationId xmlns:a16="http://schemas.microsoft.com/office/drawing/2014/main" xmlns="" xmlns:lc="http://schemas.openxmlformats.org/drawingml/2006/lockedCanvas" id="{F7043567-4147-88C3-F094-05513D23DB95}"/>
               </a:ext>
             </a:extLst>
           </p:cNvPr>
@@ -8159,7 +8159,7 @@
           <p:cNvPr id="4" name="TextBox 5">
             <a:extLst>
               <a:ext uri="{FF2B5EF4-FFF2-40B4-BE49-F238E27FC236}">
-                <a16:creationId xmlns:lc="http://schemas.openxmlformats.org/drawingml/2006/lockedCanvas" xmlns="" xmlns:a16="http://schemas.microsoft.com/office/drawing/2014/main" id="{F7043567-4147-88C3-F094-05513D23DB95}"/>
+                <a16:creationId xmlns:a16="http://schemas.microsoft.com/office/drawing/2014/main" xmlns="" xmlns:lc="http://schemas.openxmlformats.org/drawingml/2006/lockedCanvas" id="{F7043567-4147-88C3-F094-05513D23DB95}"/>
               </a:ext>
             </a:extLst>
           </p:cNvPr>
@@ -8452,7 +8452,7 @@
           <p:cNvPr id="8" name="TextBox 5">
             <a:extLst>
               <a:ext uri="{FF2B5EF4-FFF2-40B4-BE49-F238E27FC236}">
-                <a16:creationId xmlns:lc="http://schemas.openxmlformats.org/drawingml/2006/lockedCanvas" xmlns="" xmlns:a16="http://schemas.microsoft.com/office/drawing/2014/main" id="{F7043567-4147-88C3-F094-05513D23DB95}"/>
+                <a16:creationId xmlns:a16="http://schemas.microsoft.com/office/drawing/2014/main" xmlns="" xmlns:lc="http://schemas.openxmlformats.org/drawingml/2006/lockedCanvas" id="{F7043567-4147-88C3-F094-05513D23DB95}"/>
               </a:ext>
             </a:extLst>
           </p:cNvPr>
@@ -8747,7 +8747,7 @@
           <p:cNvPr id="6" name="TextBox 5">
             <a:extLst>
               <a:ext uri="{FF2B5EF4-FFF2-40B4-BE49-F238E27FC236}">
-                <a16:creationId xmlns:lc="http://schemas.openxmlformats.org/drawingml/2006/lockedCanvas" xmlns="" xmlns:a16="http://schemas.microsoft.com/office/drawing/2014/main" id="{F7043567-4147-88C3-F094-05513D23DB95}"/>
+                <a16:creationId xmlns:a16="http://schemas.microsoft.com/office/drawing/2014/main" xmlns="" xmlns:lc="http://schemas.openxmlformats.org/drawingml/2006/lockedCanvas" id="{F7043567-4147-88C3-F094-05513D23DB95}"/>
               </a:ext>
             </a:extLst>
           </p:cNvPr>
@@ -9050,7 +9050,7 @@
           <p:cNvPr id="6" name="TextBox 5">
             <a:extLst>
               <a:ext uri="{FF2B5EF4-FFF2-40B4-BE49-F238E27FC236}">
-                <a16:creationId xmlns:lc="http://schemas.openxmlformats.org/drawingml/2006/lockedCanvas" xmlns="" xmlns:a16="http://schemas.microsoft.com/office/drawing/2014/main" id="{F7043567-4147-88C3-F094-05513D23DB95}"/>
+                <a16:creationId xmlns:a16="http://schemas.microsoft.com/office/drawing/2014/main" xmlns="" xmlns:lc="http://schemas.openxmlformats.org/drawingml/2006/lockedCanvas" id="{F7043567-4147-88C3-F094-05513D23DB95}"/>
               </a:ext>
             </a:extLst>
           </p:cNvPr>
@@ -9351,7 +9351,7 @@
           <p:cNvPr id="5" name="TextBox 5">
             <a:extLst>
               <a:ext uri="{FF2B5EF4-FFF2-40B4-BE49-F238E27FC236}">
-                <a16:creationId xmlns:lc="http://schemas.openxmlformats.org/drawingml/2006/lockedCanvas" xmlns="" xmlns:a16="http://schemas.microsoft.com/office/drawing/2014/main" id="{F7043567-4147-88C3-F094-05513D23DB95}"/>
+                <a16:creationId xmlns:a16="http://schemas.microsoft.com/office/drawing/2014/main" xmlns="" xmlns:lc="http://schemas.openxmlformats.org/drawingml/2006/lockedCanvas" id="{F7043567-4147-88C3-F094-05513D23DB95}"/>
               </a:ext>
             </a:extLst>
           </p:cNvPr>
@@ -9652,7 +9652,7 @@
           <p:cNvPr id="4" name="TextBox 5">
             <a:extLst>
               <a:ext uri="{FF2B5EF4-FFF2-40B4-BE49-F238E27FC236}">
-                <a16:creationId xmlns:lc="http://schemas.openxmlformats.org/drawingml/2006/lockedCanvas" xmlns="" xmlns:a16="http://schemas.microsoft.com/office/drawing/2014/main" id="{F7043567-4147-88C3-F094-05513D23DB95}"/>
+                <a16:creationId xmlns:a16="http://schemas.microsoft.com/office/drawing/2014/main" xmlns="" xmlns:lc="http://schemas.openxmlformats.org/drawingml/2006/lockedCanvas" id="{F7043567-4147-88C3-F094-05513D23DB95}"/>
               </a:ext>
             </a:extLst>
           </p:cNvPr>
@@ -9953,7 +9953,7 @@
           <p:cNvPr id="4" name="TextBox 5">
             <a:extLst>
               <a:ext uri="{FF2B5EF4-FFF2-40B4-BE49-F238E27FC236}">
-                <a16:creationId xmlns:lc="http://schemas.openxmlformats.org/drawingml/2006/lockedCanvas" xmlns="" xmlns:a16="http://schemas.microsoft.com/office/drawing/2014/main" id="{F7043567-4147-88C3-F094-05513D23DB95}"/>
+                <a16:creationId xmlns:a16="http://schemas.microsoft.com/office/drawing/2014/main" xmlns="" xmlns:lc="http://schemas.openxmlformats.org/drawingml/2006/lockedCanvas" id="{F7043567-4147-88C3-F094-05513D23DB95}"/>
               </a:ext>
             </a:extLst>
           </p:cNvPr>

</xml_diff>

<commit_message>
add text to pptx
</commit_message>
<xml_diff>
--- a/reports/2023_403_БогатыреваВО_slides.pptx
+++ b/reports/2023_403_БогатыреваВО_slides.pptx
@@ -214,7 +214,7 @@
           <a:p>
             <a:fld id="{7DEDA2BB-1C5C-4526-95E5-77A988EF9EA2}" type="datetimeFigureOut">
               <a:rPr lang="ru-RU" smtClean="0"/>
-              <a:t>29.05.2023</a:t>
+              <a:t>30.05.2023</a:t>
             </a:fld>
             <a:endParaRPr lang="ru-RU"/>
           </a:p>
@@ -509,12 +509,930 @@
             <p:ph type="sldImg"/>
           </p:nvPr>
         </p:nvSpPr>
-        <p:spPr>
-          <a:xfrm>
-            <a:off x="1371600" y="1143000"/>
-            <a:ext cx="4114800" cy="3086100"/>
-          </a:xfrm>
-        </p:spPr>
+        <p:spPr/>
+      </p:sp>
+      <p:sp>
+        <p:nvSpPr>
+          <p:cNvPr id="3" name="Заметки 2"/>
+          <p:cNvSpPr>
+            <a:spLocks noGrp="1"/>
+          </p:cNvSpPr>
+          <p:nvPr>
+            <p:ph type="body" idx="1"/>
+          </p:nvPr>
+        </p:nvSpPr>
+        <p:spPr/>
+        <p:txBody>
+          <a:bodyPr/>
+          <a:lstStyle/>
+          <a:p>
+            <a:r>
+              <a:rPr lang="ru-RU" dirty="0" smtClean="0"/>
+              <a:t>Здравствуйте, уважаемая комиссия! На защиту выносится выпускная квалификационная</a:t>
+            </a:r>
+            <a:r>
+              <a:rPr lang="ru-RU" baseline="0" dirty="0" smtClean="0"/>
+              <a:t> </a:t>
+            </a:r>
+            <a:r>
+              <a:rPr lang="ru-RU" dirty="0" smtClean="0"/>
+              <a:t>работа по тема: Разработка системы</a:t>
+            </a:r>
+            <a:r>
+              <a:rPr lang="ru-RU" baseline="0" dirty="0" smtClean="0"/>
+              <a:t> </a:t>
+            </a:r>
+            <a:r>
+              <a:rPr lang="ru-RU" dirty="0" smtClean="0"/>
+              <a:t>электронного голосования на основе технологии блокчейн.</a:t>
+            </a:r>
+            <a:endParaRPr lang="ru-RU" dirty="0"/>
+          </a:p>
+        </p:txBody>
+      </p:sp>
+      <p:sp>
+        <p:nvSpPr>
+          <p:cNvPr id="4" name="Номер слайда 3"/>
+          <p:cNvSpPr>
+            <a:spLocks noGrp="1"/>
+          </p:cNvSpPr>
+          <p:nvPr>
+            <p:ph type="sldNum" sz="quarter" idx="10"/>
+          </p:nvPr>
+        </p:nvSpPr>
+        <p:spPr/>
+        <p:txBody>
+          <a:bodyPr/>
+          <a:lstStyle/>
+          <a:p>
+            <a:fld id="{BEC7A95C-97CA-431A-AE49-B22A2B1CD0AD}" type="slidenum">
+              <a:rPr lang="ru-RU" smtClean="0"/>
+              <a:t>1</a:t>
+            </a:fld>
+            <a:endParaRPr lang="ru-RU"/>
+          </a:p>
+        </p:txBody>
+      </p:sp>
+    </p:spTree>
+    <p:extLst>
+      <p:ext uri="{BB962C8B-B14F-4D97-AF65-F5344CB8AC3E}">
+        <p14:creationId xmlns:p14="http://schemas.microsoft.com/office/powerpoint/2010/main" val="1552465999"/>
+      </p:ext>
+    </p:extLst>
+  </p:cSld>
+  <p:clrMapOvr>
+    <a:masterClrMapping/>
+  </p:clrMapOvr>
+</p:notes>
+</file>
+
+<file path=ppt/notesSlides/notesSlide10.xml><?xml version="1.0" encoding="utf-8"?>
+<p:notes xmlns:a="http://schemas.openxmlformats.org/drawingml/2006/main" xmlns:r="http://schemas.openxmlformats.org/officeDocument/2006/relationships" xmlns:p="http://schemas.openxmlformats.org/presentationml/2006/main">
+  <p:cSld>
+    <p:spTree>
+      <p:nvGrpSpPr>
+        <p:cNvPr id="1" name=""/>
+        <p:cNvGrpSpPr/>
+        <p:nvPr/>
+      </p:nvGrpSpPr>
+      <p:grpSpPr>
+        <a:xfrm>
+          <a:off x="0" y="0"/>
+          <a:ext cx="0" cy="0"/>
+          <a:chOff x="0" y="0"/>
+          <a:chExt cx="0" cy="0"/>
+        </a:xfrm>
+      </p:grpSpPr>
+      <p:sp>
+        <p:nvSpPr>
+          <p:cNvPr id="2" name="Образ слайда 1"/>
+          <p:cNvSpPr>
+            <a:spLocks noGrp="1" noRot="1" noChangeAspect="1"/>
+          </p:cNvSpPr>
+          <p:nvPr>
+            <p:ph type="sldImg"/>
+          </p:nvPr>
+        </p:nvSpPr>
+        <p:spPr/>
+      </p:sp>
+      <p:sp>
+        <p:nvSpPr>
+          <p:cNvPr id="3" name="Заметки 2"/>
+          <p:cNvSpPr>
+            <a:spLocks noGrp="1"/>
+          </p:cNvSpPr>
+          <p:nvPr>
+            <p:ph type="body" idx="1"/>
+          </p:nvPr>
+        </p:nvSpPr>
+        <p:spPr/>
+        <p:txBody>
+          <a:bodyPr/>
+          <a:lstStyle/>
+          <a:p>
+            <a:r>
+              <a:rPr lang="ru-RU" sz="1200" kern="1200" dirty="0" smtClean="0">
+                <a:solidFill>
+                  <a:schemeClr val="tx1"/>
+                </a:solidFill>
+                <a:effectLst/>
+                <a:latin typeface="+mn-lt"/>
+                <a:ea typeface="+mn-ea"/>
+                <a:cs typeface="+mn-cs"/>
+              </a:rPr>
+              <a:t>Архитектура веб-интерфейса </a:t>
+            </a:r>
+            <a:r>
+              <a:rPr lang="en-US" sz="1200" kern="1200" dirty="0" smtClean="0">
+                <a:solidFill>
+                  <a:schemeClr val="tx1"/>
+                </a:solidFill>
+                <a:effectLst/>
+                <a:latin typeface="+mn-lt"/>
+                <a:ea typeface="+mn-ea"/>
+                <a:cs typeface="+mn-cs"/>
+              </a:rPr>
+              <a:t>EVoting </a:t>
+            </a:r>
+            <a:r>
+              <a:rPr lang="ru-RU" sz="1200" kern="1200" dirty="0" smtClean="0">
+                <a:solidFill>
+                  <a:schemeClr val="tx1"/>
+                </a:solidFill>
+                <a:effectLst/>
+                <a:latin typeface="+mn-lt"/>
+                <a:ea typeface="+mn-ea"/>
+                <a:cs typeface="+mn-cs"/>
+              </a:rPr>
+              <a:t>состоит из следующих компонентов.</a:t>
+            </a:r>
+          </a:p>
+          <a:p>
+            <a:r>
+              <a:rPr lang="ru-RU" sz="1200" kern="1200" dirty="0" smtClean="0">
+                <a:solidFill>
+                  <a:schemeClr val="tx1"/>
+                </a:solidFill>
+                <a:effectLst/>
+                <a:latin typeface="+mn-lt"/>
+                <a:ea typeface="+mn-ea"/>
+                <a:cs typeface="+mn-cs"/>
+              </a:rPr>
+              <a:t>Компонент отображения голосований, который получает данные о голосованиях с помощью веб-сервера и представляет их на главной странице веб-приложения.</a:t>
+            </a:r>
+          </a:p>
+          <a:p>
+            <a:r>
+              <a:rPr lang="ru-RU" sz="1200" kern="1200" dirty="0" smtClean="0">
+                <a:solidFill>
+                  <a:schemeClr val="tx1"/>
+                </a:solidFill>
+                <a:effectLst/>
+                <a:latin typeface="+mn-lt"/>
+                <a:ea typeface="+mn-ea"/>
+                <a:cs typeface="+mn-cs"/>
+              </a:rPr>
+              <a:t>Компонент подключения веб3-провайдера </a:t>
+            </a:r>
+            <a:r>
+              <a:rPr lang="en-US" sz="1200" kern="1200" dirty="0" err="1" smtClean="0">
+                <a:solidFill>
+                  <a:schemeClr val="tx1"/>
+                </a:solidFill>
+                <a:effectLst/>
+                <a:latin typeface="+mn-lt"/>
+                <a:ea typeface="+mn-ea"/>
+                <a:cs typeface="+mn-cs"/>
+              </a:rPr>
+              <a:t>MeaMask</a:t>
+            </a:r>
+            <a:r>
+              <a:rPr lang="ru-RU" sz="1200" kern="1200" dirty="0" smtClean="0">
+                <a:solidFill>
+                  <a:schemeClr val="tx1"/>
+                </a:solidFill>
+                <a:effectLst/>
+                <a:latin typeface="+mn-lt"/>
+                <a:ea typeface="+mn-ea"/>
+                <a:cs typeface="+mn-cs"/>
+              </a:rPr>
+              <a:t> необходимый для авторизации пользователя в системе.</a:t>
+            </a:r>
+          </a:p>
+          <a:p>
+            <a:r>
+              <a:rPr lang="ru-RU" sz="1200" kern="1200" dirty="0" smtClean="0">
+                <a:solidFill>
+                  <a:schemeClr val="tx1"/>
+                </a:solidFill>
+                <a:effectLst/>
+                <a:latin typeface="+mn-lt"/>
+                <a:ea typeface="+mn-ea"/>
+                <a:cs typeface="+mn-cs"/>
+              </a:rPr>
+              <a:t>Компонент голосования, в котором отображается информация о голосовании, его результаты, а также предоставляется возможность пользователю проголосовать, если данный пользователь </a:t>
+            </a:r>
+            <a:r>
+              <a:rPr lang="ru-RU" sz="1200" kern="1200" dirty="0" err="1" smtClean="0">
+                <a:solidFill>
+                  <a:schemeClr val="tx1"/>
+                </a:solidFill>
+                <a:effectLst/>
+                <a:latin typeface="+mn-lt"/>
+                <a:ea typeface="+mn-ea"/>
+                <a:cs typeface="+mn-cs"/>
+              </a:rPr>
+              <a:t>учавствует</a:t>
+            </a:r>
+            <a:r>
+              <a:rPr lang="ru-RU" sz="1200" kern="1200" dirty="0" smtClean="0">
+                <a:solidFill>
+                  <a:schemeClr val="tx1"/>
+                </a:solidFill>
+                <a:effectLst/>
+                <a:latin typeface="+mn-lt"/>
+                <a:ea typeface="+mn-ea"/>
+                <a:cs typeface="+mn-cs"/>
+              </a:rPr>
+              <a:t> в голосовании.</a:t>
+            </a:r>
+          </a:p>
+          <a:p>
+            <a:r>
+              <a:rPr lang="ru-RU" sz="1200" kern="1200" dirty="0" smtClean="0">
+                <a:solidFill>
+                  <a:schemeClr val="tx1"/>
+                </a:solidFill>
+                <a:effectLst/>
+                <a:latin typeface="+mn-lt"/>
+                <a:ea typeface="+mn-ea"/>
+                <a:cs typeface="+mn-cs"/>
+              </a:rPr>
+              <a:t>Компонент создания голосования, в котором пользователь может заполнить необходимые поля и создать голосование в блокчейне.</a:t>
+            </a:r>
+          </a:p>
+          <a:p>
+            <a:endParaRPr lang="ru-RU" dirty="0"/>
+          </a:p>
+        </p:txBody>
+      </p:sp>
+      <p:sp>
+        <p:nvSpPr>
+          <p:cNvPr id="4" name="Номер слайда 3"/>
+          <p:cNvSpPr>
+            <a:spLocks noGrp="1"/>
+          </p:cNvSpPr>
+          <p:nvPr>
+            <p:ph type="sldNum" sz="quarter" idx="10"/>
+          </p:nvPr>
+        </p:nvSpPr>
+        <p:spPr/>
+        <p:txBody>
+          <a:bodyPr/>
+          <a:lstStyle/>
+          <a:p>
+            <a:fld id="{BEC7A95C-97CA-431A-AE49-B22A2B1CD0AD}" type="slidenum">
+              <a:rPr lang="ru-RU" smtClean="0"/>
+              <a:t>10</a:t>
+            </a:fld>
+            <a:endParaRPr lang="ru-RU"/>
+          </a:p>
+        </p:txBody>
+      </p:sp>
+    </p:spTree>
+    <p:extLst>
+      <p:ext uri="{BB962C8B-B14F-4D97-AF65-F5344CB8AC3E}">
+        <p14:creationId xmlns:p14="http://schemas.microsoft.com/office/powerpoint/2010/main" val="2017272939"/>
+      </p:ext>
+    </p:extLst>
+  </p:cSld>
+  <p:clrMapOvr>
+    <a:masterClrMapping/>
+  </p:clrMapOvr>
+</p:notes>
+</file>
+
+<file path=ppt/notesSlides/notesSlide11.xml><?xml version="1.0" encoding="utf-8"?>
+<p:notes xmlns:a="http://schemas.openxmlformats.org/drawingml/2006/main" xmlns:r="http://schemas.openxmlformats.org/officeDocument/2006/relationships" xmlns:p="http://schemas.openxmlformats.org/presentationml/2006/main">
+  <p:cSld>
+    <p:spTree>
+      <p:nvGrpSpPr>
+        <p:cNvPr id="1" name=""/>
+        <p:cNvGrpSpPr/>
+        <p:nvPr/>
+      </p:nvGrpSpPr>
+      <p:grpSpPr>
+        <a:xfrm>
+          <a:off x="0" y="0"/>
+          <a:ext cx="0" cy="0"/>
+          <a:chOff x="0" y="0"/>
+          <a:chExt cx="0" cy="0"/>
+        </a:xfrm>
+      </p:grpSpPr>
+      <p:sp>
+        <p:nvSpPr>
+          <p:cNvPr id="2" name="Образ слайда 1"/>
+          <p:cNvSpPr>
+            <a:spLocks noGrp="1" noRot="1" noChangeAspect="1"/>
+          </p:cNvSpPr>
+          <p:nvPr>
+            <p:ph type="sldImg"/>
+          </p:nvPr>
+        </p:nvSpPr>
+        <p:spPr/>
+      </p:sp>
+      <p:sp>
+        <p:nvSpPr>
+          <p:cNvPr id="3" name="Заметки 2"/>
+          <p:cNvSpPr>
+            <a:spLocks noGrp="1"/>
+          </p:cNvSpPr>
+          <p:nvPr>
+            <p:ph type="body" idx="1"/>
+          </p:nvPr>
+        </p:nvSpPr>
+        <p:spPr/>
+        <p:txBody>
+          <a:bodyPr/>
+          <a:lstStyle/>
+          <a:p>
+            <a:r>
+              <a:rPr lang="ru-RU" sz="1200" kern="1200" dirty="0" smtClean="0">
+                <a:solidFill>
+                  <a:schemeClr val="tx1"/>
+                </a:solidFill>
+                <a:effectLst/>
+                <a:latin typeface="+mn-lt"/>
+                <a:ea typeface="+mn-ea"/>
+                <a:cs typeface="+mn-cs"/>
+              </a:rPr>
+              <a:t>В представленной диаграмме деятельности пользователь заполняет поля формы создания голосования: название, сроки голосования, варианты ответов и публичные идентификаторы избирателей, созданные в </a:t>
+            </a:r>
+            <a:r>
+              <a:rPr lang="en-US" sz="1200" kern="1200" dirty="0" smtClean="0">
+                <a:solidFill>
+                  <a:schemeClr val="tx1"/>
+                </a:solidFill>
+                <a:effectLst/>
+                <a:latin typeface="+mn-lt"/>
+                <a:ea typeface="+mn-ea"/>
+                <a:cs typeface="+mn-cs"/>
+              </a:rPr>
+              <a:t>MetaMask</a:t>
+            </a:r>
+            <a:r>
+              <a:rPr lang="ru-RU" sz="1200" kern="1200" dirty="0" smtClean="0">
+                <a:solidFill>
+                  <a:schemeClr val="tx1"/>
+                </a:solidFill>
+                <a:effectLst/>
+                <a:latin typeface="+mn-lt"/>
+                <a:ea typeface="+mn-ea"/>
+                <a:cs typeface="+mn-cs"/>
+              </a:rPr>
+              <a:t>. Затем пользователь нажимает кнопку «Создать голосование». После этого веб‑интерфейс формирует запрос для развертывания смарт-контракта голосования. Пользователю нужно подписать транзакцию создания смарт-контракта голосования с помощью </a:t>
+            </a:r>
+            <a:r>
+              <a:rPr lang="en-US" sz="1200" kern="1200" dirty="0" smtClean="0">
+                <a:solidFill>
+                  <a:schemeClr val="tx1"/>
+                </a:solidFill>
+                <a:effectLst/>
+                <a:latin typeface="+mn-lt"/>
+                <a:ea typeface="+mn-ea"/>
+                <a:cs typeface="+mn-cs"/>
+              </a:rPr>
+              <a:t>MetaMask</a:t>
+            </a:r>
+            <a:r>
+              <a:rPr lang="ru-RU" sz="1200" kern="1200" dirty="0" smtClean="0">
+                <a:solidFill>
+                  <a:schemeClr val="tx1"/>
+                </a:solidFill>
+                <a:effectLst/>
+                <a:latin typeface="+mn-lt"/>
+                <a:ea typeface="+mn-ea"/>
+                <a:cs typeface="+mn-cs"/>
+              </a:rPr>
+              <a:t>. </a:t>
+            </a:r>
+          </a:p>
+          <a:p>
+            <a:r>
+              <a:rPr lang="ru-RU" sz="1200" kern="1200" dirty="0" smtClean="0">
+                <a:solidFill>
+                  <a:schemeClr val="tx1"/>
+                </a:solidFill>
+                <a:effectLst/>
+                <a:latin typeface="+mn-lt"/>
+                <a:ea typeface="+mn-ea"/>
+                <a:cs typeface="+mn-cs"/>
+              </a:rPr>
+              <a:t>На веб-сервере системы выполняется развертывание смарт-контракта голосования в блокчейне. После развертывания смарт-контракт производит начисление токенов (голосов) на публичные идентификаторы участников голосования. После этого веб-сервер выполняет транзакцию добавления нового адреса только что созданного смарт-контракта голосования в блокчейн. В свою очередь, веб-интерфейс переводит пользователя на страницу со всеми голосованиями.</a:t>
+            </a:r>
+            <a:endParaRPr lang="ru-RU" dirty="0"/>
+          </a:p>
+        </p:txBody>
+      </p:sp>
+      <p:sp>
+        <p:nvSpPr>
+          <p:cNvPr id="4" name="Номер слайда 3"/>
+          <p:cNvSpPr>
+            <a:spLocks noGrp="1"/>
+          </p:cNvSpPr>
+          <p:nvPr>
+            <p:ph type="sldNum" sz="quarter" idx="10"/>
+          </p:nvPr>
+        </p:nvSpPr>
+        <p:spPr/>
+        <p:txBody>
+          <a:bodyPr/>
+          <a:lstStyle/>
+          <a:p>
+            <a:fld id="{BEC7A95C-97CA-431A-AE49-B22A2B1CD0AD}" type="slidenum">
+              <a:rPr lang="ru-RU" smtClean="0"/>
+              <a:t>11</a:t>
+            </a:fld>
+            <a:endParaRPr lang="ru-RU"/>
+          </a:p>
+        </p:txBody>
+      </p:sp>
+    </p:spTree>
+    <p:extLst>
+      <p:ext uri="{BB962C8B-B14F-4D97-AF65-F5344CB8AC3E}">
+        <p14:creationId xmlns:p14="http://schemas.microsoft.com/office/powerpoint/2010/main" val="1383776166"/>
+      </p:ext>
+    </p:extLst>
+  </p:cSld>
+  <p:clrMapOvr>
+    <a:masterClrMapping/>
+  </p:clrMapOvr>
+</p:notes>
+</file>
+
+<file path=ppt/notesSlides/notesSlide12.xml><?xml version="1.0" encoding="utf-8"?>
+<p:notes xmlns:a="http://schemas.openxmlformats.org/drawingml/2006/main" xmlns:r="http://schemas.openxmlformats.org/officeDocument/2006/relationships" xmlns:p="http://schemas.openxmlformats.org/presentationml/2006/main">
+  <p:cSld>
+    <p:spTree>
+      <p:nvGrpSpPr>
+        <p:cNvPr id="1" name=""/>
+        <p:cNvGrpSpPr/>
+        <p:nvPr/>
+      </p:nvGrpSpPr>
+      <p:grpSpPr>
+        <a:xfrm>
+          <a:off x="0" y="0"/>
+          <a:ext cx="0" cy="0"/>
+          <a:chOff x="0" y="0"/>
+          <a:chExt cx="0" cy="0"/>
+        </a:xfrm>
+      </p:grpSpPr>
+      <p:sp>
+        <p:nvSpPr>
+          <p:cNvPr id="2" name="Образ слайда 1"/>
+          <p:cNvSpPr>
+            <a:spLocks noGrp="1" noRot="1" noChangeAspect="1"/>
+          </p:cNvSpPr>
+          <p:nvPr>
+            <p:ph type="sldImg"/>
+          </p:nvPr>
+        </p:nvSpPr>
+        <p:spPr/>
+      </p:sp>
+      <p:sp>
+        <p:nvSpPr>
+          <p:cNvPr id="3" name="Заметки 2"/>
+          <p:cNvSpPr>
+            <a:spLocks noGrp="1"/>
+          </p:cNvSpPr>
+          <p:nvPr>
+            <p:ph type="body" idx="1"/>
+          </p:nvPr>
+        </p:nvSpPr>
+        <p:spPr/>
+        <p:txBody>
+          <a:bodyPr/>
+          <a:lstStyle/>
+          <a:p>
+            <a:r>
+              <a:rPr lang="ru-RU" dirty="0" smtClean="0"/>
+              <a:t>На слайде представлены средства</a:t>
+            </a:r>
+            <a:r>
+              <a:rPr lang="ru-RU" baseline="0" dirty="0" smtClean="0"/>
+              <a:t> реализации системы.</a:t>
+            </a:r>
+            <a:endParaRPr lang="ru-RU" dirty="0"/>
+          </a:p>
+        </p:txBody>
+      </p:sp>
+      <p:sp>
+        <p:nvSpPr>
+          <p:cNvPr id="4" name="Номер слайда 3"/>
+          <p:cNvSpPr>
+            <a:spLocks noGrp="1"/>
+          </p:cNvSpPr>
+          <p:nvPr>
+            <p:ph type="sldNum" sz="quarter" idx="10"/>
+          </p:nvPr>
+        </p:nvSpPr>
+        <p:spPr/>
+        <p:txBody>
+          <a:bodyPr/>
+          <a:lstStyle/>
+          <a:p>
+            <a:fld id="{BEC7A95C-97CA-431A-AE49-B22A2B1CD0AD}" type="slidenum">
+              <a:rPr lang="ru-RU" smtClean="0"/>
+              <a:t>12</a:t>
+            </a:fld>
+            <a:endParaRPr lang="ru-RU"/>
+          </a:p>
+        </p:txBody>
+      </p:sp>
+    </p:spTree>
+    <p:extLst>
+      <p:ext uri="{BB962C8B-B14F-4D97-AF65-F5344CB8AC3E}">
+        <p14:creationId xmlns:p14="http://schemas.microsoft.com/office/powerpoint/2010/main" val="1352105269"/>
+      </p:ext>
+    </p:extLst>
+  </p:cSld>
+  <p:clrMapOvr>
+    <a:masterClrMapping/>
+  </p:clrMapOvr>
+</p:notes>
+</file>
+
+<file path=ppt/notesSlides/notesSlide13.xml><?xml version="1.0" encoding="utf-8"?>
+<p:notes xmlns:a="http://schemas.openxmlformats.org/drawingml/2006/main" xmlns:r="http://schemas.openxmlformats.org/officeDocument/2006/relationships" xmlns:p="http://schemas.openxmlformats.org/presentationml/2006/main">
+  <p:cSld>
+    <p:spTree>
+      <p:nvGrpSpPr>
+        <p:cNvPr id="1" name=""/>
+        <p:cNvGrpSpPr/>
+        <p:nvPr/>
+      </p:nvGrpSpPr>
+      <p:grpSpPr>
+        <a:xfrm>
+          <a:off x="0" y="0"/>
+          <a:ext cx="0" cy="0"/>
+          <a:chOff x="0" y="0"/>
+          <a:chExt cx="0" cy="0"/>
+        </a:xfrm>
+      </p:grpSpPr>
+      <p:sp>
+        <p:nvSpPr>
+          <p:cNvPr id="2" name="Образ слайда 1"/>
+          <p:cNvSpPr>
+            <a:spLocks noGrp="1" noRot="1" noChangeAspect="1"/>
+          </p:cNvSpPr>
+          <p:nvPr>
+            <p:ph type="sldImg"/>
+          </p:nvPr>
+        </p:nvSpPr>
+        <p:spPr/>
+      </p:sp>
+      <p:sp>
+        <p:nvSpPr>
+          <p:cNvPr id="3" name="Заметки 2"/>
+          <p:cNvSpPr>
+            <a:spLocks noGrp="1"/>
+          </p:cNvSpPr>
+          <p:nvPr>
+            <p:ph type="body" idx="1"/>
+          </p:nvPr>
+        </p:nvSpPr>
+        <p:spPr/>
+        <p:txBody>
+          <a:bodyPr/>
+          <a:lstStyle/>
+          <a:p>
+            <a:r>
+              <a:rPr lang="ru-RU" dirty="0" smtClean="0"/>
+              <a:t>На главной странице</a:t>
+            </a:r>
+            <a:r>
+              <a:rPr lang="ru-RU" baseline="0" dirty="0" smtClean="0"/>
+              <a:t> разработанного приложения отображается список карточек голосований, которые можно отфильтровать по статусу и названию. </a:t>
+            </a:r>
+            <a:r>
+              <a:rPr lang="ru-RU" sz="1200" kern="1200" dirty="0" smtClean="0">
+                <a:solidFill>
+                  <a:schemeClr val="tx1"/>
+                </a:solidFill>
+                <a:effectLst/>
+                <a:latin typeface="+mn-lt"/>
+                <a:ea typeface="+mn-ea"/>
+                <a:cs typeface="+mn-cs"/>
+              </a:rPr>
+              <a:t>Компонент также позволяет авторизованному пользователю создать новое голосование, нажав кнопку для перехода на страницу создания голосования.</a:t>
+            </a:r>
+            <a:endParaRPr lang="ru-RU" dirty="0"/>
+          </a:p>
+        </p:txBody>
+      </p:sp>
+      <p:sp>
+        <p:nvSpPr>
+          <p:cNvPr id="4" name="Номер слайда 3"/>
+          <p:cNvSpPr>
+            <a:spLocks noGrp="1"/>
+          </p:cNvSpPr>
+          <p:nvPr>
+            <p:ph type="sldNum" sz="quarter" idx="10"/>
+          </p:nvPr>
+        </p:nvSpPr>
+        <p:spPr/>
+        <p:txBody>
+          <a:bodyPr/>
+          <a:lstStyle/>
+          <a:p>
+            <a:fld id="{BEC7A95C-97CA-431A-AE49-B22A2B1CD0AD}" type="slidenum">
+              <a:rPr lang="ru-RU" smtClean="0"/>
+              <a:t>13</a:t>
+            </a:fld>
+            <a:endParaRPr lang="ru-RU"/>
+          </a:p>
+        </p:txBody>
+      </p:sp>
+    </p:spTree>
+    <p:extLst>
+      <p:ext uri="{BB962C8B-B14F-4D97-AF65-F5344CB8AC3E}">
+        <p14:creationId xmlns:p14="http://schemas.microsoft.com/office/powerpoint/2010/main" val="3676423845"/>
+      </p:ext>
+    </p:extLst>
+  </p:cSld>
+  <p:clrMapOvr>
+    <a:masterClrMapping/>
+  </p:clrMapOvr>
+</p:notes>
+</file>
+
+<file path=ppt/notesSlides/notesSlide14.xml><?xml version="1.0" encoding="utf-8"?>
+<p:notes xmlns:a="http://schemas.openxmlformats.org/drawingml/2006/main" xmlns:r="http://schemas.openxmlformats.org/officeDocument/2006/relationships" xmlns:p="http://schemas.openxmlformats.org/presentationml/2006/main">
+  <p:cSld>
+    <p:spTree>
+      <p:nvGrpSpPr>
+        <p:cNvPr id="1" name=""/>
+        <p:cNvGrpSpPr/>
+        <p:nvPr/>
+      </p:nvGrpSpPr>
+      <p:grpSpPr>
+        <a:xfrm>
+          <a:off x="0" y="0"/>
+          <a:ext cx="0" cy="0"/>
+          <a:chOff x="0" y="0"/>
+          <a:chExt cx="0" cy="0"/>
+        </a:xfrm>
+      </p:grpSpPr>
+      <p:sp>
+        <p:nvSpPr>
+          <p:cNvPr id="2" name="Образ слайда 1"/>
+          <p:cNvSpPr>
+            <a:spLocks noGrp="1" noRot="1" noChangeAspect="1"/>
+          </p:cNvSpPr>
+          <p:nvPr>
+            <p:ph type="sldImg"/>
+          </p:nvPr>
+        </p:nvSpPr>
+        <p:spPr/>
+      </p:sp>
+      <p:sp>
+        <p:nvSpPr>
+          <p:cNvPr id="3" name="Заметки 2"/>
+          <p:cNvSpPr>
+            <a:spLocks noGrp="1"/>
+          </p:cNvSpPr>
+          <p:nvPr>
+            <p:ph type="body" idx="1"/>
+          </p:nvPr>
+        </p:nvSpPr>
+        <p:spPr/>
+        <p:txBody>
+          <a:bodyPr/>
+          <a:lstStyle/>
+          <a:p>
+            <a:r>
+              <a:rPr lang="ru-RU" sz="1200" kern="1200" dirty="0" smtClean="0">
+                <a:solidFill>
+                  <a:schemeClr val="tx1"/>
+                </a:solidFill>
+                <a:effectLst/>
+                <a:latin typeface="+mn-lt"/>
+                <a:ea typeface="+mn-ea"/>
+                <a:cs typeface="+mn-cs"/>
+              </a:rPr>
+              <a:t>Для авторизации</a:t>
+            </a:r>
+            <a:r>
+              <a:rPr lang="ru-RU" sz="1200" kern="1200" baseline="0" dirty="0" smtClean="0">
+                <a:solidFill>
+                  <a:schemeClr val="tx1"/>
+                </a:solidFill>
+                <a:effectLst/>
+                <a:latin typeface="+mn-lt"/>
+                <a:ea typeface="+mn-ea"/>
+                <a:cs typeface="+mn-cs"/>
+              </a:rPr>
+              <a:t> </a:t>
+            </a:r>
+            <a:r>
+              <a:rPr lang="ru-RU" sz="1200" kern="1200" dirty="0" smtClean="0">
+                <a:solidFill>
+                  <a:schemeClr val="tx1"/>
+                </a:solidFill>
+                <a:effectLst/>
+                <a:latin typeface="+mn-lt"/>
+                <a:ea typeface="+mn-ea"/>
+                <a:cs typeface="+mn-cs"/>
+              </a:rPr>
+              <a:t>пользователю нужно выбрать аккаунт в </a:t>
+            </a:r>
+            <a:r>
+              <a:rPr lang="en-US" sz="1200" kern="1200" dirty="0" smtClean="0">
+                <a:solidFill>
+                  <a:schemeClr val="tx1"/>
+                </a:solidFill>
+                <a:effectLst/>
+                <a:latin typeface="+mn-lt"/>
+                <a:ea typeface="+mn-ea"/>
+                <a:cs typeface="+mn-cs"/>
+              </a:rPr>
+              <a:t>MetaMask</a:t>
+            </a:r>
+            <a:r>
+              <a:rPr lang="ru-RU" sz="1200" kern="1200" dirty="0" smtClean="0">
+                <a:solidFill>
+                  <a:schemeClr val="tx1"/>
+                </a:solidFill>
+                <a:effectLst/>
+                <a:latin typeface="+mn-lt"/>
+                <a:ea typeface="+mn-ea"/>
+                <a:cs typeface="+mn-cs"/>
+              </a:rPr>
+              <a:t>, а затем нажать кнопку «Подключиться».</a:t>
+            </a:r>
+          </a:p>
+        </p:txBody>
+      </p:sp>
+      <p:sp>
+        <p:nvSpPr>
+          <p:cNvPr id="4" name="Номер слайда 3"/>
+          <p:cNvSpPr>
+            <a:spLocks noGrp="1"/>
+          </p:cNvSpPr>
+          <p:nvPr>
+            <p:ph type="sldNum" sz="quarter" idx="10"/>
+          </p:nvPr>
+        </p:nvSpPr>
+        <p:spPr/>
+        <p:txBody>
+          <a:bodyPr/>
+          <a:lstStyle/>
+          <a:p>
+            <a:fld id="{BEC7A95C-97CA-431A-AE49-B22A2B1CD0AD}" type="slidenum">
+              <a:rPr lang="ru-RU" smtClean="0"/>
+              <a:t>14</a:t>
+            </a:fld>
+            <a:endParaRPr lang="ru-RU"/>
+          </a:p>
+        </p:txBody>
+      </p:sp>
+    </p:spTree>
+    <p:extLst>
+      <p:ext uri="{BB962C8B-B14F-4D97-AF65-F5344CB8AC3E}">
+        <p14:creationId xmlns:p14="http://schemas.microsoft.com/office/powerpoint/2010/main" val="1294022964"/>
+      </p:ext>
+    </p:extLst>
+  </p:cSld>
+  <p:clrMapOvr>
+    <a:masterClrMapping/>
+  </p:clrMapOvr>
+</p:notes>
+</file>
+
+<file path=ppt/notesSlides/notesSlide15.xml><?xml version="1.0" encoding="utf-8"?>
+<p:notes xmlns:a="http://schemas.openxmlformats.org/drawingml/2006/main" xmlns:r="http://schemas.openxmlformats.org/officeDocument/2006/relationships" xmlns:p="http://schemas.openxmlformats.org/presentationml/2006/main">
+  <p:cSld>
+    <p:spTree>
+      <p:nvGrpSpPr>
+        <p:cNvPr id="1" name=""/>
+        <p:cNvGrpSpPr/>
+        <p:nvPr/>
+      </p:nvGrpSpPr>
+      <p:grpSpPr>
+        <a:xfrm>
+          <a:off x="0" y="0"/>
+          <a:ext cx="0" cy="0"/>
+          <a:chOff x="0" y="0"/>
+          <a:chExt cx="0" cy="0"/>
+        </a:xfrm>
+      </p:grpSpPr>
+      <p:sp>
+        <p:nvSpPr>
+          <p:cNvPr id="2" name="Образ слайда 1"/>
+          <p:cNvSpPr>
+            <a:spLocks noGrp="1" noRot="1" noChangeAspect="1"/>
+          </p:cNvSpPr>
+          <p:nvPr>
+            <p:ph type="sldImg"/>
+          </p:nvPr>
+        </p:nvSpPr>
+        <p:spPr/>
+      </p:sp>
+      <p:sp>
+        <p:nvSpPr>
+          <p:cNvPr id="3" name="Заметки 2"/>
+          <p:cNvSpPr>
+            <a:spLocks noGrp="1"/>
+          </p:cNvSpPr>
+          <p:nvPr>
+            <p:ph type="body" idx="1"/>
+          </p:nvPr>
+        </p:nvSpPr>
+        <p:spPr/>
+        <p:txBody>
+          <a:bodyPr/>
+          <a:lstStyle/>
+          <a:p>
+            <a:r>
+              <a:rPr lang="ru-RU" sz="1200" kern="1200" dirty="0" smtClean="0">
+                <a:solidFill>
+                  <a:schemeClr val="tx1"/>
+                </a:solidFill>
+                <a:effectLst/>
+                <a:latin typeface="+mn-lt"/>
+                <a:ea typeface="+mn-ea"/>
+                <a:cs typeface="+mn-cs"/>
+              </a:rPr>
+              <a:t>Форма на странице «Создание голосования» включает поля ввода для названия голосования, даты и времени начала и окончания голосования, списка участников и списка вариантов ответов.</a:t>
+            </a:r>
+            <a:endParaRPr lang="ru-RU" dirty="0"/>
+          </a:p>
+        </p:txBody>
+      </p:sp>
+      <p:sp>
+        <p:nvSpPr>
+          <p:cNvPr id="4" name="Номер слайда 3"/>
+          <p:cNvSpPr>
+            <a:spLocks noGrp="1"/>
+          </p:cNvSpPr>
+          <p:nvPr>
+            <p:ph type="sldNum" sz="quarter" idx="10"/>
+          </p:nvPr>
+        </p:nvSpPr>
+        <p:spPr/>
+        <p:txBody>
+          <a:bodyPr/>
+          <a:lstStyle/>
+          <a:p>
+            <a:fld id="{BEC7A95C-97CA-431A-AE49-B22A2B1CD0AD}" type="slidenum">
+              <a:rPr lang="ru-RU" smtClean="0"/>
+              <a:t>15</a:t>
+            </a:fld>
+            <a:endParaRPr lang="ru-RU"/>
+          </a:p>
+        </p:txBody>
+      </p:sp>
+    </p:spTree>
+    <p:extLst>
+      <p:ext uri="{BB962C8B-B14F-4D97-AF65-F5344CB8AC3E}">
+        <p14:creationId xmlns:p14="http://schemas.microsoft.com/office/powerpoint/2010/main" val="2305915203"/>
+      </p:ext>
+    </p:extLst>
+  </p:cSld>
+  <p:clrMapOvr>
+    <a:masterClrMapping/>
+  </p:clrMapOvr>
+</p:notes>
+</file>
+
+<file path=ppt/notesSlides/notesSlide16.xml><?xml version="1.0" encoding="utf-8"?>
+<p:notes xmlns:a="http://schemas.openxmlformats.org/drawingml/2006/main" xmlns:r="http://schemas.openxmlformats.org/officeDocument/2006/relationships" xmlns:p="http://schemas.openxmlformats.org/presentationml/2006/main">
+  <p:cSld>
+    <p:spTree>
+      <p:nvGrpSpPr>
+        <p:cNvPr id="1" name=""/>
+        <p:cNvGrpSpPr/>
+        <p:nvPr/>
+      </p:nvGrpSpPr>
+      <p:grpSpPr>
+        <a:xfrm>
+          <a:off x="0" y="0"/>
+          <a:ext cx="0" cy="0"/>
+          <a:chOff x="0" y="0"/>
+          <a:chExt cx="0" cy="0"/>
+        </a:xfrm>
+      </p:grpSpPr>
+      <p:sp>
+        <p:nvSpPr>
+          <p:cNvPr id="2" name="Образ слайда 1"/>
+          <p:cNvSpPr>
+            <a:spLocks noGrp="1" noRot="1" noChangeAspect="1"/>
+          </p:cNvSpPr>
+          <p:nvPr>
+            <p:ph type="sldImg"/>
+          </p:nvPr>
+        </p:nvSpPr>
+        <p:spPr/>
       </p:sp>
       <p:sp>
         <p:nvSpPr>
@@ -549,173 +1467,23 @@
               <a:defRPr/>
             </a:pPr>
             <a:r>
+              <a:rPr lang="ru-RU" sz="1200" kern="1200" dirty="0" smtClean="0">
+                <a:solidFill>
+                  <a:schemeClr val="tx1"/>
+                </a:solidFill>
+                <a:effectLst/>
+                <a:latin typeface="+mn-lt"/>
+                <a:ea typeface="+mn-ea"/>
+                <a:cs typeface="+mn-cs"/>
+              </a:rPr>
+              <a:t>Компонент проведения голосования отображает данные о голосовании: его название, сроки и статус, варианты ответа и позволяет пользователю голосовать. В данном компоненте также отслеживается, проголосовал ли пользователь или нет, и отключает возможность нажать на кнопку голосования, если пользователь уже проголосовал или если голосование в данный момент не началось.</a:t>
+            </a:r>
+          </a:p>
+          <a:p>
+            <a:r>
               <a:rPr lang="ru-RU" dirty="0" smtClean="0"/>
-              <a:t>Блокчейн – это </a:t>
-            </a:r>
-            <a:r>
-              <a:rPr lang="ru-RU" sz="1200" kern="1200" dirty="0" smtClean="0">
-                <a:solidFill>
-                  <a:schemeClr val="tx1"/>
-                </a:solidFill>
-                <a:effectLst/>
-                <a:latin typeface="+mn-lt"/>
-                <a:ea typeface="+mn-ea"/>
-                <a:cs typeface="+mn-cs"/>
-              </a:rPr>
-              <a:t>цифровой реестр, где все совершенные транзакции хранятся в списке блоков. Все блоки соединяются в цепочку.</a:t>
-            </a:r>
-            <a:r>
-              <a:rPr lang="ru-RU" sz="1200" kern="1200" baseline="0" dirty="0" smtClean="0">
-                <a:solidFill>
-                  <a:schemeClr val="tx1"/>
-                </a:solidFill>
-                <a:effectLst/>
-                <a:latin typeface="+mn-lt"/>
-                <a:ea typeface="+mn-ea"/>
-                <a:cs typeface="+mn-cs"/>
-              </a:rPr>
-              <a:t> </a:t>
-            </a:r>
-          </a:p>
-          <a:p>
-            <a:r>
-              <a:rPr lang="ru-RU" sz="1200" kern="1200" baseline="0" dirty="0" smtClean="0">
-                <a:solidFill>
-                  <a:schemeClr val="tx1"/>
-                </a:solidFill>
-                <a:effectLst/>
-                <a:latin typeface="+mn-lt"/>
-                <a:ea typeface="+mn-ea"/>
-                <a:cs typeface="+mn-cs"/>
-              </a:rPr>
-              <a:t>Для данной системы был выбран блокчейн </a:t>
-            </a:r>
-            <a:r>
-              <a:rPr lang="ru-RU" sz="1200" kern="1200" baseline="0" dirty="0" err="1" smtClean="0">
-                <a:solidFill>
-                  <a:schemeClr val="tx1"/>
-                </a:solidFill>
-                <a:effectLst/>
-                <a:latin typeface="+mn-lt"/>
-                <a:ea typeface="+mn-ea"/>
-                <a:cs typeface="+mn-cs"/>
-              </a:rPr>
-              <a:t>Эфириум</a:t>
-            </a:r>
-            <a:r>
-              <a:rPr lang="ru-RU" sz="1200" kern="1200" baseline="0" dirty="0" smtClean="0">
-                <a:solidFill>
-                  <a:schemeClr val="tx1"/>
-                </a:solidFill>
-                <a:effectLst/>
-                <a:latin typeface="+mn-lt"/>
-                <a:ea typeface="+mn-ea"/>
-                <a:cs typeface="+mn-cs"/>
-              </a:rPr>
-              <a:t>, так как он поддерживает создание децентрализованных приложений и смарт-контрактов. </a:t>
-            </a:r>
-          </a:p>
-          <a:p>
-            <a:r>
-              <a:rPr lang="ru-RU" sz="1200" kern="1200" baseline="0" dirty="0" smtClean="0">
-                <a:solidFill>
-                  <a:schemeClr val="tx1"/>
-                </a:solidFill>
-                <a:effectLst/>
-                <a:latin typeface="+mn-lt"/>
-                <a:ea typeface="+mn-ea"/>
-                <a:cs typeface="+mn-cs"/>
-              </a:rPr>
-              <a:t>Смарт-контрактом является программа, </a:t>
-            </a:r>
-            <a:r>
-              <a:rPr lang="ru-RU" sz="1200" b="0" i="0" kern="1200" dirty="0" smtClean="0">
-                <a:solidFill>
-                  <a:schemeClr val="tx1"/>
-                </a:solidFill>
-                <a:effectLst/>
-                <a:latin typeface="+mn-lt"/>
-                <a:ea typeface="+mn-ea"/>
-                <a:cs typeface="+mn-cs"/>
-              </a:rPr>
-              <a:t>которая хранится в блокчейне и исполняется при выполнении</a:t>
-            </a:r>
-            <a:r>
-              <a:rPr lang="ru-RU" sz="1200" b="0" i="0" kern="1200" baseline="0" dirty="0" smtClean="0">
-                <a:solidFill>
-                  <a:schemeClr val="tx1"/>
-                </a:solidFill>
-                <a:effectLst/>
-                <a:latin typeface="+mn-lt"/>
-                <a:ea typeface="+mn-ea"/>
-                <a:cs typeface="+mn-cs"/>
-              </a:rPr>
-              <a:t> определенных условий</a:t>
-            </a:r>
-            <a:r>
-              <a:rPr lang="ru-RU" sz="1200" b="0" i="0" kern="1200" dirty="0" smtClean="0">
-                <a:solidFill>
-                  <a:schemeClr val="tx1"/>
-                </a:solidFill>
-                <a:effectLst/>
-                <a:latin typeface="+mn-lt"/>
-                <a:ea typeface="+mn-ea"/>
-                <a:cs typeface="+mn-cs"/>
-              </a:rPr>
-              <a:t>.</a:t>
-            </a:r>
-            <a:endParaRPr lang="ru-RU" dirty="0" smtClean="0"/>
-          </a:p>
-          <a:p>
-            <a:endParaRPr lang="ru-RU" sz="1200" kern="1200" baseline="0" dirty="0" smtClean="0">
-              <a:solidFill>
-                <a:schemeClr val="tx1"/>
-              </a:solidFill>
-              <a:effectLst/>
-              <a:latin typeface="+mn-lt"/>
-              <a:ea typeface="+mn-ea"/>
-              <a:cs typeface="+mn-cs"/>
-            </a:endParaRPr>
-          </a:p>
-          <a:p>
-            <a:r>
-              <a:rPr lang="ru-RU" sz="1200" kern="1200" baseline="0" dirty="0" smtClean="0">
-                <a:solidFill>
-                  <a:schemeClr val="tx1"/>
-                </a:solidFill>
-                <a:effectLst/>
-                <a:latin typeface="+mn-lt"/>
-                <a:ea typeface="+mn-ea"/>
-                <a:cs typeface="+mn-cs"/>
-              </a:rPr>
-              <a:t>Узлы блокчейн-сети используют алгоритмы консенсуса для согласования содержимого блоков и транзакций, а также алгоритмы </a:t>
-            </a:r>
-            <a:r>
-              <a:rPr lang="ru-RU" sz="1200" kern="1200" baseline="0" dirty="0" err="1" smtClean="0">
-                <a:solidFill>
-                  <a:schemeClr val="tx1"/>
-                </a:solidFill>
-                <a:effectLst/>
-                <a:latin typeface="+mn-lt"/>
-                <a:ea typeface="+mn-ea"/>
-                <a:cs typeface="+mn-cs"/>
-              </a:rPr>
-              <a:t>хэширования</a:t>
-            </a:r>
-            <a:r>
-              <a:rPr lang="ru-RU" sz="1200" kern="1200" baseline="0" dirty="0" smtClean="0">
-                <a:solidFill>
-                  <a:schemeClr val="tx1"/>
-                </a:solidFill>
-                <a:effectLst/>
-                <a:latin typeface="+mn-lt"/>
-                <a:ea typeface="+mn-ea"/>
-                <a:cs typeface="+mn-cs"/>
-              </a:rPr>
-              <a:t> и публичные/приватные ключи для обеспечения целостности транзакции. </a:t>
-            </a:r>
-          </a:p>
-          <a:p>
+              <a:t>На этой странице также отображаются результаты голосования.</a:t>
+            </a:r>
             <a:endParaRPr lang="ru-RU" dirty="0"/>
           </a:p>
         </p:txBody>
@@ -737,7 +1505,7 @@
           <a:p>
             <a:fld id="{BEC7A95C-97CA-431A-AE49-B22A2B1CD0AD}" type="slidenum">
               <a:rPr lang="ru-RU" smtClean="0"/>
-              <a:t>4</a:t>
+              <a:t>16</a:t>
             </a:fld>
             <a:endParaRPr lang="ru-RU"/>
           </a:p>
@@ -746,7 +1514,313 @@
     </p:spTree>
     <p:extLst>
       <p:ext uri="{BB962C8B-B14F-4D97-AF65-F5344CB8AC3E}">
-        <p14:creationId xmlns:p14="http://schemas.microsoft.com/office/powerpoint/2010/main" val="3610655931"/>
+        <p14:creationId xmlns:p14="http://schemas.microsoft.com/office/powerpoint/2010/main" val="4045906646"/>
+      </p:ext>
+    </p:extLst>
+  </p:cSld>
+  <p:clrMapOvr>
+    <a:masterClrMapping/>
+  </p:clrMapOvr>
+</p:notes>
+</file>
+
+<file path=ppt/notesSlides/notesSlide17.xml><?xml version="1.0" encoding="utf-8"?>
+<p:notes xmlns:a="http://schemas.openxmlformats.org/drawingml/2006/main" xmlns:r="http://schemas.openxmlformats.org/officeDocument/2006/relationships" xmlns:p="http://schemas.openxmlformats.org/presentationml/2006/main">
+  <p:cSld>
+    <p:spTree>
+      <p:nvGrpSpPr>
+        <p:cNvPr id="1" name=""/>
+        <p:cNvGrpSpPr/>
+        <p:nvPr/>
+      </p:nvGrpSpPr>
+      <p:grpSpPr>
+        <a:xfrm>
+          <a:off x="0" y="0"/>
+          <a:ext cx="0" cy="0"/>
+          <a:chOff x="0" y="0"/>
+          <a:chExt cx="0" cy="0"/>
+        </a:xfrm>
+      </p:grpSpPr>
+      <p:sp>
+        <p:nvSpPr>
+          <p:cNvPr id="2" name="Образ слайда 1"/>
+          <p:cNvSpPr>
+            <a:spLocks noGrp="1" noRot="1" noChangeAspect="1"/>
+          </p:cNvSpPr>
+          <p:nvPr>
+            <p:ph type="sldImg"/>
+          </p:nvPr>
+        </p:nvSpPr>
+        <p:spPr/>
+      </p:sp>
+      <p:sp>
+        <p:nvSpPr>
+          <p:cNvPr id="3" name="Заметки 2"/>
+          <p:cNvSpPr>
+            <a:spLocks noGrp="1"/>
+          </p:cNvSpPr>
+          <p:nvPr>
+            <p:ph type="body" idx="1"/>
+          </p:nvPr>
+        </p:nvSpPr>
+        <p:spPr/>
+        <p:txBody>
+          <a:bodyPr/>
+          <a:lstStyle/>
+          <a:p>
+            <a:pPr marL="0" marR="0" lvl="0" indent="0" algn="l" defTabSz="914400" rtl="0" eaLnBrk="1" fontAlgn="auto" latinLnBrk="0" hangingPunct="1">
+              <a:lnSpc>
+                <a:spcPct val="100000"/>
+              </a:lnSpc>
+              <a:spcBef>
+                <a:spcPts val="0"/>
+              </a:spcBef>
+              <a:spcAft>
+                <a:spcPts val="0"/>
+              </a:spcAft>
+              <a:buClrTx/>
+              <a:buSzTx/>
+              <a:buFontTx/>
+              <a:buNone/>
+              <a:tabLst/>
+              <a:defRPr/>
+            </a:pPr>
+            <a:r>
+              <a:rPr lang="ru-RU" dirty="0" smtClean="0"/>
+              <a:t>Было проведено функциональное тестирование.</a:t>
+            </a:r>
+            <a:r>
+              <a:rPr lang="ru-RU" baseline="0" dirty="0" smtClean="0"/>
+              <a:t> Оно состояло из 17 тестов. Все тесты пройдены успешно.</a:t>
+            </a:r>
+            <a:endParaRPr lang="ru-RU" dirty="0" smtClean="0"/>
+          </a:p>
+          <a:p>
+            <a:endParaRPr lang="ru-RU" dirty="0"/>
+          </a:p>
+        </p:txBody>
+      </p:sp>
+      <p:sp>
+        <p:nvSpPr>
+          <p:cNvPr id="4" name="Номер слайда 3"/>
+          <p:cNvSpPr>
+            <a:spLocks noGrp="1"/>
+          </p:cNvSpPr>
+          <p:nvPr>
+            <p:ph type="sldNum" sz="quarter" idx="10"/>
+          </p:nvPr>
+        </p:nvSpPr>
+        <p:spPr/>
+        <p:txBody>
+          <a:bodyPr/>
+          <a:lstStyle/>
+          <a:p>
+            <a:fld id="{BEC7A95C-97CA-431A-AE49-B22A2B1CD0AD}" type="slidenum">
+              <a:rPr lang="ru-RU" smtClean="0"/>
+              <a:t>17</a:t>
+            </a:fld>
+            <a:endParaRPr lang="ru-RU"/>
+          </a:p>
+        </p:txBody>
+      </p:sp>
+    </p:spTree>
+    <p:extLst>
+      <p:ext uri="{BB962C8B-B14F-4D97-AF65-F5344CB8AC3E}">
+        <p14:creationId xmlns:p14="http://schemas.microsoft.com/office/powerpoint/2010/main" val="3984722938"/>
+      </p:ext>
+    </p:extLst>
+  </p:cSld>
+  <p:clrMapOvr>
+    <a:masterClrMapping/>
+  </p:clrMapOvr>
+</p:notes>
+</file>
+
+<file path=ppt/notesSlides/notesSlide18.xml><?xml version="1.0" encoding="utf-8"?>
+<p:notes xmlns:a="http://schemas.openxmlformats.org/drawingml/2006/main" xmlns:r="http://schemas.openxmlformats.org/officeDocument/2006/relationships" xmlns:p="http://schemas.openxmlformats.org/presentationml/2006/main">
+  <p:cSld>
+    <p:spTree>
+      <p:nvGrpSpPr>
+        <p:cNvPr id="1" name=""/>
+        <p:cNvGrpSpPr/>
+        <p:nvPr/>
+      </p:nvGrpSpPr>
+      <p:grpSpPr>
+        <a:xfrm>
+          <a:off x="0" y="0"/>
+          <a:ext cx="0" cy="0"/>
+          <a:chOff x="0" y="0"/>
+          <a:chExt cx="0" cy="0"/>
+        </a:xfrm>
+      </p:grpSpPr>
+      <p:sp>
+        <p:nvSpPr>
+          <p:cNvPr id="2" name="Образ слайда 1"/>
+          <p:cNvSpPr>
+            <a:spLocks noGrp="1" noRot="1" noChangeAspect="1"/>
+          </p:cNvSpPr>
+          <p:nvPr>
+            <p:ph type="sldImg"/>
+          </p:nvPr>
+        </p:nvSpPr>
+        <p:spPr/>
+      </p:sp>
+      <p:sp>
+        <p:nvSpPr>
+          <p:cNvPr id="3" name="Заметки 2"/>
+          <p:cNvSpPr>
+            <a:spLocks noGrp="1"/>
+          </p:cNvSpPr>
+          <p:nvPr>
+            <p:ph type="body" idx="1"/>
+          </p:nvPr>
+        </p:nvSpPr>
+        <p:spPr/>
+        <p:txBody>
+          <a:bodyPr/>
+          <a:lstStyle/>
+          <a:p>
+            <a:pPr marL="0" indent="0">
+              <a:lnSpc>
+                <a:spcPct val="120000"/>
+              </a:lnSpc>
+              <a:buFont typeface="+mj-lt"/>
+              <a:buNone/>
+            </a:pPr>
+            <a:r>
+              <a:rPr lang="ru-RU" dirty="0" smtClean="0"/>
+              <a:t>В результате данной работы был </a:t>
+            </a:r>
+          </a:p>
+          <a:p>
+            <a:pPr marL="0" indent="0">
+              <a:lnSpc>
+                <a:spcPct val="120000"/>
+              </a:lnSpc>
+              <a:buFont typeface="+mj-lt"/>
+              <a:buNone/>
+            </a:pPr>
+            <a:r>
+              <a:rPr lang="ru-RU" smtClean="0">
+                <a:latin typeface="+mn-lt"/>
+                <a:cs typeface="+mn-cs"/>
+              </a:rPr>
+              <a:t>В</a:t>
+            </a:r>
+            <a:r>
+              <a:rPr lang="ru-RU" smtClean="0">
+                <a:latin typeface="Times New Roman" panose="02020603050405020304" pitchFamily="18" charset="0"/>
+                <a:cs typeface="Times New Roman" panose="02020603050405020304" pitchFamily="18" charset="0"/>
+              </a:rPr>
+              <a:t>ыполнен </a:t>
+            </a:r>
+            <a:r>
+              <a:rPr lang="ru-RU" dirty="0" smtClean="0">
+                <a:latin typeface="Times New Roman" panose="02020603050405020304" pitchFamily="18" charset="0"/>
+                <a:cs typeface="Times New Roman" panose="02020603050405020304" pitchFamily="18" charset="0"/>
+              </a:rPr>
+              <a:t>обзор литературы и существующих аналогов</a:t>
+            </a:r>
+          </a:p>
+          <a:p>
+            <a:pPr marL="0" indent="0">
+              <a:lnSpc>
+                <a:spcPct val="120000"/>
+              </a:lnSpc>
+              <a:buFont typeface="+mj-lt"/>
+              <a:buNone/>
+            </a:pPr>
+            <a:r>
+              <a:rPr lang="ru-RU" dirty="0" smtClean="0">
+                <a:latin typeface="Times New Roman" panose="02020603050405020304" pitchFamily="18" charset="0"/>
+                <a:cs typeface="Times New Roman" panose="02020603050405020304" pitchFamily="18" charset="0"/>
+              </a:rPr>
+              <a:t>Спроектированы смарт-контракты для электронного голосования на основе технологии блокчейн</a:t>
+            </a:r>
+          </a:p>
+          <a:p>
+            <a:pPr marL="0" indent="0">
+              <a:lnSpc>
+                <a:spcPct val="120000"/>
+              </a:lnSpc>
+              <a:buFont typeface="+mj-lt"/>
+              <a:buNone/>
+            </a:pPr>
+            <a:r>
+              <a:rPr lang="ru-RU" dirty="0" smtClean="0">
+                <a:latin typeface="Times New Roman" panose="02020603050405020304" pitchFamily="18" charset="0"/>
+                <a:cs typeface="Times New Roman" panose="02020603050405020304" pitchFamily="18" charset="0"/>
+              </a:rPr>
+              <a:t>Спроектировано веб-приложение для электронного голосования на основе технологии блокчейн</a:t>
+            </a:r>
+          </a:p>
+          <a:p>
+            <a:pPr marL="0" indent="0">
+              <a:lnSpc>
+                <a:spcPct val="120000"/>
+              </a:lnSpc>
+              <a:buFont typeface="+mj-lt"/>
+              <a:buNone/>
+            </a:pPr>
+            <a:r>
+              <a:rPr lang="ru-RU" dirty="0" smtClean="0">
+                <a:latin typeface="Times New Roman" panose="02020603050405020304" pitchFamily="18" charset="0"/>
+                <a:cs typeface="Times New Roman" panose="02020603050405020304" pitchFamily="18" charset="0"/>
+              </a:rPr>
+              <a:t>Реализованы смарт-контракты и веб-приложение</a:t>
+            </a:r>
+          </a:p>
+          <a:p>
+            <a:pPr marL="0" indent="0">
+              <a:lnSpc>
+                <a:spcPct val="120000"/>
+              </a:lnSpc>
+              <a:buFont typeface="+mj-lt"/>
+              <a:buNone/>
+            </a:pPr>
+            <a:r>
+              <a:rPr lang="ru-RU" dirty="0" smtClean="0">
+                <a:latin typeface="Times New Roman" panose="02020603050405020304" pitchFamily="18" charset="0"/>
+                <a:cs typeface="Times New Roman" panose="02020603050405020304" pitchFamily="18" charset="0"/>
+              </a:rPr>
+              <a:t>Проведено тестирование работы приложения</a:t>
+            </a:r>
+          </a:p>
+          <a:p>
+            <a:endParaRPr lang="ru-RU" dirty="0" smtClean="0"/>
+          </a:p>
+          <a:p>
+            <a:endParaRPr lang="ru-RU" dirty="0"/>
+          </a:p>
+        </p:txBody>
+      </p:sp>
+      <p:sp>
+        <p:nvSpPr>
+          <p:cNvPr id="4" name="Номер слайда 3"/>
+          <p:cNvSpPr>
+            <a:spLocks noGrp="1"/>
+          </p:cNvSpPr>
+          <p:nvPr>
+            <p:ph type="sldNum" sz="quarter" idx="10"/>
+          </p:nvPr>
+        </p:nvSpPr>
+        <p:spPr/>
+        <p:txBody>
+          <a:bodyPr/>
+          <a:lstStyle/>
+          <a:p>
+            <a:fld id="{BEC7A95C-97CA-431A-AE49-B22A2B1CD0AD}" type="slidenum">
+              <a:rPr lang="ru-RU" smtClean="0"/>
+              <a:t>18</a:t>
+            </a:fld>
+            <a:endParaRPr lang="ru-RU"/>
+          </a:p>
+        </p:txBody>
+      </p:sp>
+    </p:spTree>
+    <p:extLst>
+      <p:ext uri="{BB962C8B-B14F-4D97-AF65-F5344CB8AC3E}">
+        <p14:creationId xmlns:p14="http://schemas.microsoft.com/office/powerpoint/2010/main" val="1611155878"/>
       </p:ext>
     </p:extLst>
   </p:cSld>
@@ -800,6 +1874,10 @@
           <a:bodyPr/>
           <a:lstStyle/>
           <a:p>
+            <a:r>
+              <a:rPr lang="ru-RU" dirty="0" smtClean="0"/>
+              <a:t>Электронное голосование актуально, так как традиционные системы голосования часто дают сбои, многие страны мира переходят на блокчейн-голосование, а также электронное голосование решает проблему явки избирателей.</a:t>
+            </a:r>
             <a:endParaRPr lang="ru-RU" dirty="0"/>
           </a:p>
         </p:txBody>
@@ -821,7 +1899,7 @@
           <a:p>
             <a:fld id="{BEC7A95C-97CA-431A-AE49-B22A2B1CD0AD}" type="slidenum">
               <a:rPr lang="ru-RU" smtClean="0"/>
-              <a:t>12</a:t>
+              <a:t>2</a:t>
             </a:fld>
             <a:endParaRPr lang="ru-RU"/>
           </a:p>
@@ -830,7 +1908,1538 @@
     </p:spTree>
     <p:extLst>
       <p:ext uri="{BB962C8B-B14F-4D97-AF65-F5344CB8AC3E}">
-        <p14:creationId xmlns:p14="http://schemas.microsoft.com/office/powerpoint/2010/main" val="1352105269"/>
+        <p14:creationId xmlns:p14="http://schemas.microsoft.com/office/powerpoint/2010/main" val="3923826091"/>
+      </p:ext>
+    </p:extLst>
+  </p:cSld>
+  <p:clrMapOvr>
+    <a:masterClrMapping/>
+  </p:clrMapOvr>
+</p:notes>
+</file>
+
+<file path=ppt/notesSlides/notesSlide3.xml><?xml version="1.0" encoding="utf-8"?>
+<p:notes xmlns:a="http://schemas.openxmlformats.org/drawingml/2006/main" xmlns:r="http://schemas.openxmlformats.org/officeDocument/2006/relationships" xmlns:p="http://schemas.openxmlformats.org/presentationml/2006/main">
+  <p:cSld>
+    <p:spTree>
+      <p:nvGrpSpPr>
+        <p:cNvPr id="1" name=""/>
+        <p:cNvGrpSpPr/>
+        <p:nvPr/>
+      </p:nvGrpSpPr>
+      <p:grpSpPr>
+        <a:xfrm>
+          <a:off x="0" y="0"/>
+          <a:ext cx="0" cy="0"/>
+          <a:chOff x="0" y="0"/>
+          <a:chExt cx="0" cy="0"/>
+        </a:xfrm>
+      </p:grpSpPr>
+      <p:sp>
+        <p:nvSpPr>
+          <p:cNvPr id="2" name="Образ слайда 1"/>
+          <p:cNvSpPr>
+            <a:spLocks noGrp="1" noRot="1" noChangeAspect="1"/>
+          </p:cNvSpPr>
+          <p:nvPr>
+            <p:ph type="sldImg"/>
+          </p:nvPr>
+        </p:nvSpPr>
+        <p:spPr/>
+      </p:sp>
+      <p:sp>
+        <p:nvSpPr>
+          <p:cNvPr id="3" name="Заметки 2"/>
+          <p:cNvSpPr>
+            <a:spLocks noGrp="1"/>
+          </p:cNvSpPr>
+          <p:nvPr>
+            <p:ph type="body" idx="1"/>
+          </p:nvPr>
+        </p:nvSpPr>
+        <p:spPr/>
+        <p:txBody>
+          <a:bodyPr/>
+          <a:lstStyle/>
+          <a:p>
+            <a:r>
+              <a:rPr lang="ru-RU" dirty="0" smtClean="0"/>
+              <a:t>Целью данной</a:t>
+            </a:r>
+            <a:r>
+              <a:rPr lang="ru-RU" baseline="0" dirty="0" smtClean="0"/>
+              <a:t> работы является разработка системы электронного голосования на основе технологии блокчейн.</a:t>
+            </a:r>
+          </a:p>
+          <a:p>
+            <a:r>
+              <a:rPr lang="ru-RU" baseline="0" dirty="0" smtClean="0"/>
+              <a:t>В рамках данной работы были поставлены следующие задачи.</a:t>
+            </a:r>
+          </a:p>
+          <a:p>
+            <a:pPr marL="0" indent="0">
+              <a:lnSpc>
+                <a:spcPct val="120000"/>
+              </a:lnSpc>
+              <a:buFont typeface="+mj-lt"/>
+              <a:buNone/>
+            </a:pPr>
+            <a:r>
+              <a:rPr lang="ru-RU" dirty="0" smtClean="0">
+                <a:latin typeface="Times New Roman" panose="02020603050405020304" pitchFamily="18" charset="0"/>
+                <a:cs typeface="Times New Roman" panose="02020603050405020304" pitchFamily="18" charset="0"/>
+              </a:rPr>
+              <a:t>Выполнить обзор литературы и существующих аналогов</a:t>
+            </a:r>
+          </a:p>
+          <a:p>
+            <a:pPr marL="0" indent="0">
+              <a:lnSpc>
+                <a:spcPct val="120000"/>
+              </a:lnSpc>
+              <a:buFont typeface="+mj-lt"/>
+              <a:buNone/>
+            </a:pPr>
+            <a:r>
+              <a:rPr lang="ru-RU" dirty="0" smtClean="0">
+                <a:latin typeface="Times New Roman" panose="02020603050405020304" pitchFamily="18" charset="0"/>
+                <a:cs typeface="Times New Roman" panose="02020603050405020304" pitchFamily="18" charset="0"/>
+              </a:rPr>
+              <a:t>Спроектировать смарт-контракты для электронного голосования на основе технологии блокчейн</a:t>
+            </a:r>
+          </a:p>
+          <a:p>
+            <a:pPr marL="0" indent="0">
+              <a:lnSpc>
+                <a:spcPct val="120000"/>
+              </a:lnSpc>
+              <a:buFont typeface="+mj-lt"/>
+              <a:buNone/>
+            </a:pPr>
+            <a:r>
+              <a:rPr lang="ru-RU" dirty="0" smtClean="0">
+                <a:latin typeface="Times New Roman" panose="02020603050405020304" pitchFamily="18" charset="0"/>
+                <a:cs typeface="Times New Roman" panose="02020603050405020304" pitchFamily="18" charset="0"/>
+              </a:rPr>
+              <a:t>Спроектировать веб-приложение для электронного голосования на основе технологии блокчейн</a:t>
+            </a:r>
+          </a:p>
+          <a:p>
+            <a:pPr marL="0" indent="0">
+              <a:lnSpc>
+                <a:spcPct val="120000"/>
+              </a:lnSpc>
+              <a:buFont typeface="+mj-lt"/>
+              <a:buNone/>
+            </a:pPr>
+            <a:r>
+              <a:rPr lang="ru-RU" dirty="0" smtClean="0">
+                <a:latin typeface="Times New Roman" panose="02020603050405020304" pitchFamily="18" charset="0"/>
+                <a:cs typeface="Times New Roman" panose="02020603050405020304" pitchFamily="18" charset="0"/>
+              </a:rPr>
+              <a:t>Реализовать смарт-контракты и веб-приложение</a:t>
+            </a:r>
+          </a:p>
+          <a:p>
+            <a:pPr marL="0" indent="0">
+              <a:lnSpc>
+                <a:spcPct val="120000"/>
+              </a:lnSpc>
+              <a:buFont typeface="+mj-lt"/>
+              <a:buNone/>
+            </a:pPr>
+            <a:r>
+              <a:rPr lang="ru-RU" dirty="0" smtClean="0">
+                <a:latin typeface="Times New Roman" panose="02020603050405020304" pitchFamily="18" charset="0"/>
+                <a:cs typeface="Times New Roman" panose="02020603050405020304" pitchFamily="18" charset="0"/>
+              </a:rPr>
+              <a:t>Провести тестирование работы приложения.</a:t>
+            </a:r>
+          </a:p>
+          <a:p>
+            <a:pPr marL="0" indent="0">
+              <a:lnSpc>
+                <a:spcPct val="120000"/>
+              </a:lnSpc>
+              <a:buFont typeface="+mj-lt"/>
+              <a:buNone/>
+            </a:pPr>
+            <a:endParaRPr lang="ru-RU" dirty="0" smtClean="0">
+              <a:latin typeface="Times New Roman" panose="02020603050405020304" pitchFamily="18" charset="0"/>
+              <a:cs typeface="Times New Roman" panose="02020603050405020304" pitchFamily="18" charset="0"/>
+            </a:endParaRPr>
+          </a:p>
+          <a:p>
+            <a:endParaRPr lang="ru-RU" dirty="0"/>
+          </a:p>
+        </p:txBody>
+      </p:sp>
+      <p:sp>
+        <p:nvSpPr>
+          <p:cNvPr id="4" name="Номер слайда 3"/>
+          <p:cNvSpPr>
+            <a:spLocks noGrp="1"/>
+          </p:cNvSpPr>
+          <p:nvPr>
+            <p:ph type="sldNum" sz="quarter" idx="10"/>
+          </p:nvPr>
+        </p:nvSpPr>
+        <p:spPr/>
+        <p:txBody>
+          <a:bodyPr/>
+          <a:lstStyle/>
+          <a:p>
+            <a:fld id="{BEC7A95C-97CA-431A-AE49-B22A2B1CD0AD}" type="slidenum">
+              <a:rPr lang="ru-RU" smtClean="0"/>
+              <a:t>3</a:t>
+            </a:fld>
+            <a:endParaRPr lang="ru-RU"/>
+          </a:p>
+        </p:txBody>
+      </p:sp>
+    </p:spTree>
+    <p:extLst>
+      <p:ext uri="{BB962C8B-B14F-4D97-AF65-F5344CB8AC3E}">
+        <p14:creationId xmlns:p14="http://schemas.microsoft.com/office/powerpoint/2010/main" val="4038201148"/>
+      </p:ext>
+    </p:extLst>
+  </p:cSld>
+  <p:clrMapOvr>
+    <a:masterClrMapping/>
+  </p:clrMapOvr>
+</p:notes>
+</file>
+
+<file path=ppt/notesSlides/notesSlide4.xml><?xml version="1.0" encoding="utf-8"?>
+<p:notes xmlns:a="http://schemas.openxmlformats.org/drawingml/2006/main" xmlns:r="http://schemas.openxmlformats.org/officeDocument/2006/relationships" xmlns:p="http://schemas.openxmlformats.org/presentationml/2006/main">
+  <p:cSld>
+    <p:spTree>
+      <p:nvGrpSpPr>
+        <p:cNvPr id="1" name=""/>
+        <p:cNvGrpSpPr/>
+        <p:nvPr/>
+      </p:nvGrpSpPr>
+      <p:grpSpPr>
+        <a:xfrm>
+          <a:off x="0" y="0"/>
+          <a:ext cx="0" cy="0"/>
+          <a:chOff x="0" y="0"/>
+          <a:chExt cx="0" cy="0"/>
+        </a:xfrm>
+      </p:grpSpPr>
+      <p:sp>
+        <p:nvSpPr>
+          <p:cNvPr id="2" name="Образ слайда 1"/>
+          <p:cNvSpPr>
+            <a:spLocks noGrp="1" noRot="1" noChangeAspect="1"/>
+          </p:cNvSpPr>
+          <p:nvPr>
+            <p:ph type="sldImg"/>
+          </p:nvPr>
+        </p:nvSpPr>
+        <p:spPr>
+          <a:xfrm>
+            <a:off x="1371600" y="1143000"/>
+            <a:ext cx="4114800" cy="3086100"/>
+          </a:xfrm>
+        </p:spPr>
+      </p:sp>
+      <p:sp>
+        <p:nvSpPr>
+          <p:cNvPr id="3" name="Заметки 2"/>
+          <p:cNvSpPr>
+            <a:spLocks noGrp="1"/>
+          </p:cNvSpPr>
+          <p:nvPr>
+            <p:ph type="body" idx="1"/>
+          </p:nvPr>
+        </p:nvSpPr>
+        <p:spPr/>
+        <p:txBody>
+          <a:bodyPr/>
+          <a:lstStyle/>
+          <a:p>
+            <a:pPr marL="0" marR="0" lvl="0" indent="0" algn="l" defTabSz="914400" rtl="0" eaLnBrk="1" fontAlgn="auto" latinLnBrk="0" hangingPunct="1">
+              <a:lnSpc>
+                <a:spcPct val="100000"/>
+              </a:lnSpc>
+              <a:spcBef>
+                <a:spcPts val="0"/>
+              </a:spcBef>
+              <a:spcAft>
+                <a:spcPts val="0"/>
+              </a:spcAft>
+              <a:buClrTx/>
+              <a:buSzTx/>
+              <a:buFontTx/>
+              <a:buNone/>
+              <a:tabLst/>
+              <a:defRPr/>
+            </a:pPr>
+            <a:r>
+              <a:rPr lang="ru-RU" dirty="0" smtClean="0"/>
+              <a:t>Блокчейн – это </a:t>
+            </a:r>
+            <a:r>
+              <a:rPr lang="ru-RU" sz="1200" kern="1200" dirty="0" smtClean="0">
+                <a:solidFill>
+                  <a:schemeClr val="tx1"/>
+                </a:solidFill>
+                <a:effectLst/>
+                <a:latin typeface="+mn-lt"/>
+                <a:ea typeface="+mn-ea"/>
+                <a:cs typeface="+mn-cs"/>
+              </a:rPr>
+              <a:t>цифровой реестр, где все совершенные транзакции хранятся в списке блоков. Все блоки соединяются в цепочку.</a:t>
+            </a:r>
+            <a:r>
+              <a:rPr lang="ru-RU" sz="1200" kern="1200" baseline="0" dirty="0" smtClean="0">
+                <a:solidFill>
+                  <a:schemeClr val="tx1"/>
+                </a:solidFill>
+                <a:effectLst/>
+                <a:latin typeface="+mn-lt"/>
+                <a:ea typeface="+mn-ea"/>
+                <a:cs typeface="+mn-cs"/>
+              </a:rPr>
+              <a:t> </a:t>
+            </a:r>
+          </a:p>
+          <a:p>
+            <a:r>
+              <a:rPr lang="ru-RU" sz="1200" kern="1200" baseline="0" dirty="0" smtClean="0">
+                <a:solidFill>
+                  <a:schemeClr val="tx1"/>
+                </a:solidFill>
+                <a:effectLst/>
+                <a:latin typeface="+mn-lt"/>
+                <a:ea typeface="+mn-ea"/>
+                <a:cs typeface="+mn-cs"/>
+              </a:rPr>
+              <a:t>Для </a:t>
+            </a:r>
+            <a:r>
+              <a:rPr lang="ru-RU" sz="1200" kern="1200" baseline="0" dirty="0" smtClean="0">
+                <a:solidFill>
+                  <a:schemeClr val="tx1"/>
+                </a:solidFill>
+                <a:effectLst/>
+                <a:latin typeface="+mn-lt"/>
+                <a:ea typeface="+mn-ea"/>
+                <a:cs typeface="+mn-cs"/>
+              </a:rPr>
+              <a:t>разрабатываемой системы </a:t>
+            </a:r>
+            <a:r>
+              <a:rPr lang="ru-RU" sz="1200" kern="1200" baseline="0" dirty="0" smtClean="0">
+                <a:solidFill>
+                  <a:schemeClr val="tx1"/>
+                </a:solidFill>
+                <a:effectLst/>
+                <a:latin typeface="+mn-lt"/>
+                <a:ea typeface="+mn-ea"/>
+                <a:cs typeface="+mn-cs"/>
+              </a:rPr>
+              <a:t>был выбран блокчейн </a:t>
+            </a:r>
+            <a:r>
+              <a:rPr lang="ru-RU" sz="1200" kern="1200" baseline="0" dirty="0" err="1" smtClean="0">
+                <a:solidFill>
+                  <a:schemeClr val="tx1"/>
+                </a:solidFill>
+                <a:effectLst/>
+                <a:latin typeface="+mn-lt"/>
+                <a:ea typeface="+mn-ea"/>
+                <a:cs typeface="+mn-cs"/>
+              </a:rPr>
+              <a:t>Эфириум</a:t>
+            </a:r>
+            <a:r>
+              <a:rPr lang="ru-RU" sz="1200" kern="1200" baseline="0" dirty="0" smtClean="0">
+                <a:solidFill>
+                  <a:schemeClr val="tx1"/>
+                </a:solidFill>
+                <a:effectLst/>
+                <a:latin typeface="+mn-lt"/>
+                <a:ea typeface="+mn-ea"/>
+                <a:cs typeface="+mn-cs"/>
+              </a:rPr>
+              <a:t>, так как он поддерживает создание децентрализованных приложений и смарт-контрактов. </a:t>
+            </a:r>
+          </a:p>
+          <a:p>
+            <a:r>
+              <a:rPr lang="ru-RU" sz="1200" kern="1200" baseline="0" dirty="0" smtClean="0">
+                <a:solidFill>
+                  <a:schemeClr val="tx1"/>
+                </a:solidFill>
+                <a:effectLst/>
+                <a:latin typeface="+mn-lt"/>
+                <a:ea typeface="+mn-ea"/>
+                <a:cs typeface="+mn-cs"/>
+              </a:rPr>
+              <a:t>Смарт-контрактом является программа, </a:t>
+            </a:r>
+            <a:r>
+              <a:rPr lang="ru-RU" sz="1200" b="0" i="0" kern="1200" dirty="0" smtClean="0">
+                <a:solidFill>
+                  <a:schemeClr val="tx1"/>
+                </a:solidFill>
+                <a:effectLst/>
+                <a:latin typeface="+mn-lt"/>
+                <a:ea typeface="+mn-ea"/>
+                <a:cs typeface="+mn-cs"/>
+              </a:rPr>
+              <a:t>которая хранится в блокчейне и исполняется при выполнении</a:t>
+            </a:r>
+            <a:r>
+              <a:rPr lang="ru-RU" sz="1200" b="0" i="0" kern="1200" baseline="0" dirty="0" smtClean="0">
+                <a:solidFill>
+                  <a:schemeClr val="tx1"/>
+                </a:solidFill>
+                <a:effectLst/>
+                <a:latin typeface="+mn-lt"/>
+                <a:ea typeface="+mn-ea"/>
+                <a:cs typeface="+mn-cs"/>
+              </a:rPr>
+              <a:t> определенных условий</a:t>
+            </a:r>
+            <a:r>
+              <a:rPr lang="ru-RU" sz="1200" b="0" i="0" kern="1200" dirty="0" smtClean="0">
+                <a:solidFill>
+                  <a:schemeClr val="tx1"/>
+                </a:solidFill>
+                <a:effectLst/>
+                <a:latin typeface="+mn-lt"/>
+                <a:ea typeface="+mn-ea"/>
+                <a:cs typeface="+mn-cs"/>
+              </a:rPr>
+              <a:t>.</a:t>
+            </a:r>
+            <a:endParaRPr lang="ru-RU" dirty="0" smtClean="0"/>
+          </a:p>
+          <a:p>
+            <a:endParaRPr lang="ru-RU" sz="1200" kern="1200" baseline="0" dirty="0" smtClean="0">
+              <a:solidFill>
+                <a:schemeClr val="tx1"/>
+              </a:solidFill>
+              <a:effectLst/>
+              <a:latin typeface="+mn-lt"/>
+              <a:ea typeface="+mn-ea"/>
+              <a:cs typeface="+mn-cs"/>
+            </a:endParaRPr>
+          </a:p>
+          <a:p>
+            <a:r>
+              <a:rPr lang="ru-RU" sz="1200" kern="1200" baseline="0" dirty="0" smtClean="0">
+                <a:solidFill>
+                  <a:schemeClr val="tx1"/>
+                </a:solidFill>
+                <a:effectLst/>
+                <a:latin typeface="+mn-lt"/>
+                <a:ea typeface="+mn-ea"/>
+                <a:cs typeface="+mn-cs"/>
+              </a:rPr>
+              <a:t>Узлы блокчейн-сети используют алгоритмы консенсуса для согласования содержимого блоков и транзакций, а также алгоритмы </a:t>
+            </a:r>
+            <a:r>
+              <a:rPr lang="ru-RU" sz="1200" kern="1200" baseline="0" dirty="0" err="1" smtClean="0">
+                <a:solidFill>
+                  <a:schemeClr val="tx1"/>
+                </a:solidFill>
+                <a:effectLst/>
+                <a:latin typeface="+mn-lt"/>
+                <a:ea typeface="+mn-ea"/>
+                <a:cs typeface="+mn-cs"/>
+              </a:rPr>
+              <a:t>хэширования</a:t>
+            </a:r>
+            <a:r>
+              <a:rPr lang="ru-RU" sz="1200" kern="1200" baseline="0" dirty="0" smtClean="0">
+                <a:solidFill>
+                  <a:schemeClr val="tx1"/>
+                </a:solidFill>
+                <a:effectLst/>
+                <a:latin typeface="+mn-lt"/>
+                <a:ea typeface="+mn-ea"/>
+                <a:cs typeface="+mn-cs"/>
+              </a:rPr>
+              <a:t> и публичные/приватные ключи для обеспечения целостности транзакции. </a:t>
+            </a:r>
+          </a:p>
+          <a:p>
+            <a:endParaRPr lang="ru-RU" dirty="0"/>
+          </a:p>
+        </p:txBody>
+      </p:sp>
+      <p:sp>
+        <p:nvSpPr>
+          <p:cNvPr id="4" name="Номер слайда 3"/>
+          <p:cNvSpPr>
+            <a:spLocks noGrp="1"/>
+          </p:cNvSpPr>
+          <p:nvPr>
+            <p:ph type="sldNum" sz="quarter" idx="10"/>
+          </p:nvPr>
+        </p:nvSpPr>
+        <p:spPr/>
+        <p:txBody>
+          <a:bodyPr/>
+          <a:lstStyle/>
+          <a:p>
+            <a:fld id="{BEC7A95C-97CA-431A-AE49-B22A2B1CD0AD}" type="slidenum">
+              <a:rPr lang="ru-RU" smtClean="0"/>
+              <a:t>4</a:t>
+            </a:fld>
+            <a:endParaRPr lang="ru-RU"/>
+          </a:p>
+        </p:txBody>
+      </p:sp>
+    </p:spTree>
+    <p:extLst>
+      <p:ext uri="{BB962C8B-B14F-4D97-AF65-F5344CB8AC3E}">
+        <p14:creationId xmlns:p14="http://schemas.microsoft.com/office/powerpoint/2010/main" val="3610655931"/>
+      </p:ext>
+    </p:extLst>
+  </p:cSld>
+  <p:clrMapOvr>
+    <a:masterClrMapping/>
+  </p:clrMapOvr>
+</p:notes>
+</file>
+
+<file path=ppt/notesSlides/notesSlide5.xml><?xml version="1.0" encoding="utf-8"?>
+<p:notes xmlns:a="http://schemas.openxmlformats.org/drawingml/2006/main" xmlns:r="http://schemas.openxmlformats.org/officeDocument/2006/relationships" xmlns:p="http://schemas.openxmlformats.org/presentationml/2006/main">
+  <p:cSld>
+    <p:spTree>
+      <p:nvGrpSpPr>
+        <p:cNvPr id="1" name=""/>
+        <p:cNvGrpSpPr/>
+        <p:nvPr/>
+      </p:nvGrpSpPr>
+      <p:grpSpPr>
+        <a:xfrm>
+          <a:off x="0" y="0"/>
+          <a:ext cx="0" cy="0"/>
+          <a:chOff x="0" y="0"/>
+          <a:chExt cx="0" cy="0"/>
+        </a:xfrm>
+      </p:grpSpPr>
+      <p:sp>
+        <p:nvSpPr>
+          <p:cNvPr id="2" name="Образ слайда 1"/>
+          <p:cNvSpPr>
+            <a:spLocks noGrp="1" noRot="1" noChangeAspect="1"/>
+          </p:cNvSpPr>
+          <p:nvPr>
+            <p:ph type="sldImg"/>
+          </p:nvPr>
+        </p:nvSpPr>
+        <p:spPr/>
+      </p:sp>
+      <p:sp>
+        <p:nvSpPr>
+          <p:cNvPr id="3" name="Заметки 2"/>
+          <p:cNvSpPr>
+            <a:spLocks noGrp="1"/>
+          </p:cNvSpPr>
+          <p:nvPr>
+            <p:ph type="body" idx="1"/>
+          </p:nvPr>
+        </p:nvSpPr>
+        <p:spPr/>
+        <p:txBody>
+          <a:bodyPr/>
+          <a:lstStyle/>
+          <a:p>
+            <a:r>
+              <a:rPr lang="ru-RU" dirty="0" smtClean="0"/>
+              <a:t>Рассмотрим аналоги к разрабатываемой системе. Polys – система блокчейн-голосований, созданная на базе лаборатории Касперского. На слайде представлена панель администратора голосования, также существуют панели для избирателя и наблюдателя.</a:t>
+            </a:r>
+            <a:endParaRPr lang="ru-RU" dirty="0"/>
+          </a:p>
+        </p:txBody>
+      </p:sp>
+      <p:sp>
+        <p:nvSpPr>
+          <p:cNvPr id="4" name="Номер слайда 3"/>
+          <p:cNvSpPr>
+            <a:spLocks noGrp="1"/>
+          </p:cNvSpPr>
+          <p:nvPr>
+            <p:ph type="sldNum" sz="quarter" idx="10"/>
+          </p:nvPr>
+        </p:nvSpPr>
+        <p:spPr/>
+        <p:txBody>
+          <a:bodyPr/>
+          <a:lstStyle/>
+          <a:p>
+            <a:fld id="{BEC7A95C-97CA-431A-AE49-B22A2B1CD0AD}" type="slidenum">
+              <a:rPr lang="ru-RU" smtClean="0"/>
+              <a:t>5</a:t>
+            </a:fld>
+            <a:endParaRPr lang="ru-RU"/>
+          </a:p>
+        </p:txBody>
+      </p:sp>
+    </p:spTree>
+    <p:extLst>
+      <p:ext uri="{BB962C8B-B14F-4D97-AF65-F5344CB8AC3E}">
+        <p14:creationId xmlns:p14="http://schemas.microsoft.com/office/powerpoint/2010/main" val="2928895022"/>
+      </p:ext>
+    </p:extLst>
+  </p:cSld>
+  <p:clrMapOvr>
+    <a:masterClrMapping/>
+  </p:clrMapOvr>
+</p:notes>
+</file>
+
+<file path=ppt/notesSlides/notesSlide6.xml><?xml version="1.0" encoding="utf-8"?>
+<p:notes xmlns:a="http://schemas.openxmlformats.org/drawingml/2006/main" xmlns:r="http://schemas.openxmlformats.org/officeDocument/2006/relationships" xmlns:p="http://schemas.openxmlformats.org/presentationml/2006/main">
+  <p:cSld>
+    <p:spTree>
+      <p:nvGrpSpPr>
+        <p:cNvPr id="1" name=""/>
+        <p:cNvGrpSpPr/>
+        <p:nvPr/>
+      </p:nvGrpSpPr>
+      <p:grpSpPr>
+        <a:xfrm>
+          <a:off x="0" y="0"/>
+          <a:ext cx="0" cy="0"/>
+          <a:chOff x="0" y="0"/>
+          <a:chExt cx="0" cy="0"/>
+        </a:xfrm>
+      </p:grpSpPr>
+      <p:sp>
+        <p:nvSpPr>
+          <p:cNvPr id="2" name="Образ слайда 1"/>
+          <p:cNvSpPr>
+            <a:spLocks noGrp="1" noRot="1" noChangeAspect="1"/>
+          </p:cNvSpPr>
+          <p:nvPr>
+            <p:ph type="sldImg"/>
+          </p:nvPr>
+        </p:nvSpPr>
+        <p:spPr/>
+      </p:sp>
+      <p:sp>
+        <p:nvSpPr>
+          <p:cNvPr id="3" name="Заметки 2"/>
+          <p:cNvSpPr>
+            <a:spLocks noGrp="1"/>
+          </p:cNvSpPr>
+          <p:nvPr>
+            <p:ph type="body" idx="1"/>
+          </p:nvPr>
+        </p:nvSpPr>
+        <p:spPr/>
+        <p:txBody>
+          <a:bodyPr/>
+          <a:lstStyle/>
+          <a:p>
+            <a:r>
+              <a:rPr lang="en-US" sz="1200" kern="1200" dirty="0" smtClean="0">
+                <a:solidFill>
+                  <a:schemeClr val="tx1"/>
+                </a:solidFill>
+                <a:effectLst/>
+                <a:latin typeface="+mn-lt"/>
+                <a:ea typeface="+mn-ea"/>
+                <a:cs typeface="+mn-cs"/>
+              </a:rPr>
+              <a:t>WE</a:t>
+            </a:r>
+            <a:r>
+              <a:rPr lang="ru-RU" sz="1200" kern="1200" dirty="0" smtClean="0">
+                <a:solidFill>
+                  <a:schemeClr val="tx1"/>
+                </a:solidFill>
+                <a:effectLst/>
+                <a:latin typeface="+mn-lt"/>
+                <a:ea typeface="+mn-ea"/>
+                <a:cs typeface="+mn-cs"/>
+              </a:rPr>
+              <a:t>.</a:t>
+            </a:r>
+            <a:r>
+              <a:rPr lang="en-US" sz="1200" kern="1200" dirty="0" smtClean="0">
+                <a:solidFill>
+                  <a:schemeClr val="tx1"/>
+                </a:solidFill>
+                <a:effectLst/>
+                <a:latin typeface="+mn-lt"/>
+                <a:ea typeface="+mn-ea"/>
+                <a:cs typeface="+mn-cs"/>
+              </a:rPr>
+              <a:t>Vote</a:t>
+            </a:r>
+            <a:r>
+              <a:rPr lang="ru-RU" sz="1200" kern="1200" dirty="0" smtClean="0">
+                <a:solidFill>
+                  <a:schemeClr val="tx1"/>
+                </a:solidFill>
+                <a:effectLst/>
+                <a:latin typeface="+mn-lt"/>
+                <a:ea typeface="+mn-ea"/>
+                <a:cs typeface="+mn-cs"/>
+              </a:rPr>
+              <a:t> – сервис блокчейн-голосований, который основан на блокчейн-сети </a:t>
+            </a:r>
+            <a:r>
+              <a:rPr lang="ru-RU" sz="1200" kern="1200" dirty="0" err="1" smtClean="0">
+                <a:solidFill>
+                  <a:schemeClr val="tx1"/>
+                </a:solidFill>
+                <a:effectLst/>
+                <a:latin typeface="+mn-lt"/>
+                <a:ea typeface="+mn-ea"/>
+                <a:cs typeface="+mn-cs"/>
+              </a:rPr>
+              <a:t>Waves</a:t>
+            </a:r>
+            <a:r>
+              <a:rPr lang="ru-RU" sz="1200" kern="1200" dirty="0" smtClean="0">
+                <a:solidFill>
+                  <a:schemeClr val="tx1"/>
+                </a:solidFill>
+                <a:effectLst/>
+                <a:latin typeface="+mn-lt"/>
+                <a:ea typeface="+mn-ea"/>
+                <a:cs typeface="+mn-cs"/>
+              </a:rPr>
+              <a:t> </a:t>
+            </a:r>
+            <a:r>
+              <a:rPr lang="ru-RU" sz="1200" kern="1200" dirty="0" err="1" smtClean="0">
+                <a:solidFill>
+                  <a:schemeClr val="tx1"/>
+                </a:solidFill>
+                <a:effectLst/>
+                <a:latin typeface="+mn-lt"/>
+                <a:ea typeface="+mn-ea"/>
+                <a:cs typeface="+mn-cs"/>
+              </a:rPr>
+              <a:t>Enterprise</a:t>
+            </a:r>
+            <a:r>
+              <a:rPr lang="ru-RU" sz="1200" kern="1200" dirty="0" smtClean="0">
+                <a:solidFill>
+                  <a:schemeClr val="tx1"/>
+                </a:solidFill>
+                <a:effectLst/>
+                <a:latin typeface="+mn-lt"/>
+                <a:ea typeface="+mn-ea"/>
+                <a:cs typeface="+mn-cs"/>
+              </a:rPr>
+              <a:t>. На слайде изображена главная страница, на которой отображаются все голосования пользователя.</a:t>
+            </a:r>
+            <a:endParaRPr lang="ru-RU" dirty="0"/>
+          </a:p>
+        </p:txBody>
+      </p:sp>
+      <p:sp>
+        <p:nvSpPr>
+          <p:cNvPr id="4" name="Номер слайда 3"/>
+          <p:cNvSpPr>
+            <a:spLocks noGrp="1"/>
+          </p:cNvSpPr>
+          <p:nvPr>
+            <p:ph type="sldNum" sz="quarter" idx="10"/>
+          </p:nvPr>
+        </p:nvSpPr>
+        <p:spPr/>
+        <p:txBody>
+          <a:bodyPr/>
+          <a:lstStyle/>
+          <a:p>
+            <a:fld id="{BEC7A95C-97CA-431A-AE49-B22A2B1CD0AD}" type="slidenum">
+              <a:rPr lang="ru-RU" smtClean="0"/>
+              <a:t>6</a:t>
+            </a:fld>
+            <a:endParaRPr lang="ru-RU"/>
+          </a:p>
+        </p:txBody>
+      </p:sp>
+    </p:spTree>
+    <p:extLst>
+      <p:ext uri="{BB962C8B-B14F-4D97-AF65-F5344CB8AC3E}">
+        <p14:creationId xmlns:p14="http://schemas.microsoft.com/office/powerpoint/2010/main" val="1115018580"/>
+      </p:ext>
+    </p:extLst>
+  </p:cSld>
+  <p:clrMapOvr>
+    <a:masterClrMapping/>
+  </p:clrMapOvr>
+</p:notes>
+</file>
+
+<file path=ppt/notesSlides/notesSlide7.xml><?xml version="1.0" encoding="utf-8"?>
+<p:notes xmlns:a="http://schemas.openxmlformats.org/drawingml/2006/main" xmlns:r="http://schemas.openxmlformats.org/officeDocument/2006/relationships" xmlns:p="http://schemas.openxmlformats.org/presentationml/2006/main">
+  <p:cSld>
+    <p:spTree>
+      <p:nvGrpSpPr>
+        <p:cNvPr id="1" name=""/>
+        <p:cNvGrpSpPr/>
+        <p:nvPr/>
+      </p:nvGrpSpPr>
+      <p:grpSpPr>
+        <a:xfrm>
+          <a:off x="0" y="0"/>
+          <a:ext cx="0" cy="0"/>
+          <a:chOff x="0" y="0"/>
+          <a:chExt cx="0" cy="0"/>
+        </a:xfrm>
+      </p:grpSpPr>
+      <p:sp>
+        <p:nvSpPr>
+          <p:cNvPr id="2" name="Образ слайда 1"/>
+          <p:cNvSpPr>
+            <a:spLocks noGrp="1" noRot="1" noChangeAspect="1"/>
+          </p:cNvSpPr>
+          <p:nvPr>
+            <p:ph type="sldImg"/>
+          </p:nvPr>
+        </p:nvSpPr>
+        <p:spPr/>
+      </p:sp>
+      <p:sp>
+        <p:nvSpPr>
+          <p:cNvPr id="3" name="Заметки 2"/>
+          <p:cNvSpPr>
+            <a:spLocks noGrp="1"/>
+          </p:cNvSpPr>
+          <p:nvPr>
+            <p:ph type="body" idx="1"/>
+          </p:nvPr>
+        </p:nvSpPr>
+        <p:spPr/>
+        <p:txBody>
+          <a:bodyPr/>
+          <a:lstStyle/>
+          <a:p>
+            <a:r>
+              <a:rPr lang="ru-RU" dirty="0" smtClean="0"/>
+              <a:t>В ходе проектирования было выделено 2 актера. </a:t>
+            </a:r>
+          </a:p>
+          <a:p>
+            <a:r>
+              <a:rPr lang="ru-RU" dirty="0" smtClean="0"/>
+              <a:t>Гость</a:t>
+            </a:r>
+            <a:r>
+              <a:rPr lang="ru-RU" baseline="0" dirty="0" smtClean="0"/>
+              <a:t> </a:t>
+            </a:r>
+            <a:r>
+              <a:rPr lang="ru-RU" dirty="0" smtClean="0"/>
+              <a:t>может</a:t>
+            </a:r>
+            <a:r>
+              <a:rPr lang="ru-RU" baseline="0" dirty="0" smtClean="0"/>
+              <a:t> авторизоваться в системе с помощью </a:t>
+            </a:r>
+            <a:r>
+              <a:rPr lang="ru-RU" baseline="0" dirty="0" err="1" smtClean="0"/>
+              <a:t>браузерного</a:t>
+            </a:r>
+            <a:r>
+              <a:rPr lang="ru-RU" baseline="0" dirty="0" smtClean="0"/>
+              <a:t> расширения </a:t>
+            </a:r>
+            <a:r>
+              <a:rPr lang="en-US" baseline="0" dirty="0" smtClean="0"/>
+              <a:t>MetaMask</a:t>
+            </a:r>
+            <a:endParaRPr lang="ru-RU" baseline="0" dirty="0" smtClean="0"/>
+          </a:p>
+          <a:p>
+            <a:r>
+              <a:rPr lang="ru-RU" baseline="0" dirty="0" smtClean="0"/>
+              <a:t>Гость и Авторизованный пользователь могут просмотреть список всех голосований, найти голосование по названию, отфильтровать их и просмотреть подробности голосования.</a:t>
+            </a:r>
+          </a:p>
+          <a:p>
+            <a:r>
+              <a:rPr lang="ru-RU" baseline="0" dirty="0" smtClean="0"/>
+              <a:t>Авторизованный пользователь дополнительно может создать голосование </a:t>
+            </a:r>
+            <a:r>
+              <a:rPr lang="ru-RU" baseline="0" dirty="0" err="1" smtClean="0"/>
+              <a:t>роголосовать</a:t>
+            </a:r>
+            <a:r>
+              <a:rPr lang="ru-RU" baseline="0" dirty="0" smtClean="0"/>
+              <a:t> и после этого просмотреть транзакцию своего голоса в блокчейн обозревателе </a:t>
+            </a:r>
+            <a:r>
+              <a:rPr lang="en-US" baseline="0" dirty="0" smtClean="0"/>
+              <a:t>Etherscan</a:t>
+            </a:r>
+            <a:r>
+              <a:rPr lang="ru-RU" baseline="0" dirty="0" smtClean="0"/>
+              <a:t>.</a:t>
+            </a:r>
+            <a:endParaRPr lang="en-US" baseline="0" dirty="0" smtClean="0"/>
+          </a:p>
+        </p:txBody>
+      </p:sp>
+      <p:sp>
+        <p:nvSpPr>
+          <p:cNvPr id="4" name="Номер слайда 3"/>
+          <p:cNvSpPr>
+            <a:spLocks noGrp="1"/>
+          </p:cNvSpPr>
+          <p:nvPr>
+            <p:ph type="sldNum" sz="quarter" idx="10"/>
+          </p:nvPr>
+        </p:nvSpPr>
+        <p:spPr/>
+        <p:txBody>
+          <a:bodyPr/>
+          <a:lstStyle/>
+          <a:p>
+            <a:fld id="{BEC7A95C-97CA-431A-AE49-B22A2B1CD0AD}" type="slidenum">
+              <a:rPr lang="ru-RU" smtClean="0"/>
+              <a:t>7</a:t>
+            </a:fld>
+            <a:endParaRPr lang="ru-RU"/>
+          </a:p>
+        </p:txBody>
+      </p:sp>
+    </p:spTree>
+    <p:extLst>
+      <p:ext uri="{BB962C8B-B14F-4D97-AF65-F5344CB8AC3E}">
+        <p14:creationId xmlns:p14="http://schemas.microsoft.com/office/powerpoint/2010/main" val="1058383467"/>
+      </p:ext>
+    </p:extLst>
+  </p:cSld>
+  <p:clrMapOvr>
+    <a:masterClrMapping/>
+  </p:clrMapOvr>
+</p:notes>
+</file>
+
+<file path=ppt/notesSlides/notesSlide8.xml><?xml version="1.0" encoding="utf-8"?>
+<p:notes xmlns:a="http://schemas.openxmlformats.org/drawingml/2006/main" xmlns:r="http://schemas.openxmlformats.org/officeDocument/2006/relationships" xmlns:p="http://schemas.openxmlformats.org/presentationml/2006/main">
+  <p:cSld>
+    <p:spTree>
+      <p:nvGrpSpPr>
+        <p:cNvPr id="1" name=""/>
+        <p:cNvGrpSpPr/>
+        <p:nvPr/>
+      </p:nvGrpSpPr>
+      <p:grpSpPr>
+        <a:xfrm>
+          <a:off x="0" y="0"/>
+          <a:ext cx="0" cy="0"/>
+          <a:chOff x="0" y="0"/>
+          <a:chExt cx="0" cy="0"/>
+        </a:xfrm>
+      </p:grpSpPr>
+      <p:sp>
+        <p:nvSpPr>
+          <p:cNvPr id="2" name="Образ слайда 1"/>
+          <p:cNvSpPr>
+            <a:spLocks noGrp="1" noRot="1" noChangeAspect="1"/>
+          </p:cNvSpPr>
+          <p:nvPr>
+            <p:ph type="sldImg"/>
+          </p:nvPr>
+        </p:nvSpPr>
+        <p:spPr/>
+      </p:sp>
+      <p:sp>
+        <p:nvSpPr>
+          <p:cNvPr id="3" name="Заметки 2"/>
+          <p:cNvSpPr>
+            <a:spLocks noGrp="1"/>
+          </p:cNvSpPr>
+          <p:nvPr>
+            <p:ph type="body" idx="1"/>
+          </p:nvPr>
+        </p:nvSpPr>
+        <p:spPr/>
+        <p:txBody>
+          <a:bodyPr/>
+          <a:lstStyle/>
+          <a:p>
+            <a:r>
+              <a:rPr lang="ru-RU" dirty="0" smtClean="0"/>
+              <a:t>Данная диаграмма состоит из следующих компонентов. </a:t>
+            </a:r>
+          </a:p>
+          <a:p>
+            <a:r>
+              <a:rPr lang="ru-RU" sz="1200" kern="1200" dirty="0" smtClean="0">
+                <a:solidFill>
+                  <a:schemeClr val="tx1"/>
+                </a:solidFill>
+                <a:effectLst/>
+                <a:latin typeface="+mn-lt"/>
+                <a:ea typeface="+mn-ea"/>
+                <a:cs typeface="+mn-cs"/>
+              </a:rPr>
+              <a:t>Веб-интерфейс определяет логику пользовательского интерфейса и взаимодействует с блокчейном  с помощью веб3 провайдера </a:t>
+            </a:r>
+            <a:r>
+              <a:rPr lang="en-US" sz="1200" kern="1200" dirty="0" smtClean="0">
+                <a:solidFill>
+                  <a:schemeClr val="tx1"/>
+                </a:solidFill>
+                <a:effectLst/>
+                <a:latin typeface="+mn-lt"/>
+                <a:ea typeface="+mn-ea"/>
+                <a:cs typeface="+mn-cs"/>
+              </a:rPr>
+              <a:t>MetaMask</a:t>
+            </a:r>
+            <a:r>
+              <a:rPr lang="ru-RU" sz="1200" kern="1200" dirty="0" smtClean="0">
+                <a:solidFill>
+                  <a:schemeClr val="tx1"/>
+                </a:solidFill>
+                <a:effectLst/>
+                <a:latin typeface="+mn-lt"/>
+                <a:ea typeface="+mn-ea"/>
+                <a:cs typeface="+mn-cs"/>
+              </a:rPr>
+              <a:t>. В веб-интерфейсе системы авторизация пользователя осуществляется через </a:t>
+            </a:r>
+            <a:r>
+              <a:rPr lang="en-US" sz="1200" kern="1200" dirty="0" smtClean="0">
+                <a:solidFill>
+                  <a:schemeClr val="tx1"/>
+                </a:solidFill>
+                <a:effectLst/>
+                <a:latin typeface="+mn-lt"/>
+                <a:ea typeface="+mn-ea"/>
+                <a:cs typeface="+mn-cs"/>
+              </a:rPr>
+              <a:t>MetaMask</a:t>
+            </a:r>
+            <a:r>
+              <a:rPr lang="ru-RU" sz="1200" kern="1200" dirty="0" smtClean="0">
+                <a:solidFill>
+                  <a:schemeClr val="tx1"/>
+                </a:solidFill>
+                <a:effectLst/>
+                <a:latin typeface="+mn-lt"/>
+                <a:ea typeface="+mn-ea"/>
+                <a:cs typeface="+mn-cs"/>
+              </a:rPr>
+              <a:t>, так как </a:t>
+            </a:r>
+            <a:r>
+              <a:rPr lang="en-US" sz="1200" kern="1200" dirty="0" smtClean="0">
+                <a:solidFill>
+                  <a:schemeClr val="tx1"/>
+                </a:solidFill>
+                <a:effectLst/>
+                <a:latin typeface="+mn-lt"/>
+                <a:ea typeface="+mn-ea"/>
+                <a:cs typeface="+mn-cs"/>
+              </a:rPr>
+              <a:t>MetaMask </a:t>
+            </a:r>
+            <a:r>
+              <a:rPr lang="ru-RU" sz="1200" kern="1200" dirty="0" smtClean="0">
+                <a:solidFill>
+                  <a:schemeClr val="tx1"/>
+                </a:solidFill>
+                <a:effectLst/>
+                <a:latin typeface="+mn-lt"/>
+                <a:ea typeface="+mn-ea"/>
+                <a:cs typeface="+mn-cs"/>
+              </a:rPr>
+              <a:t>является </a:t>
+            </a:r>
+            <a:r>
+              <a:rPr lang="ru-RU" sz="1200" kern="1200" dirty="0" err="1" smtClean="0">
+                <a:solidFill>
+                  <a:schemeClr val="tx1"/>
+                </a:solidFill>
+                <a:effectLst/>
+                <a:latin typeface="+mn-lt"/>
+                <a:ea typeface="+mn-ea"/>
+                <a:cs typeface="+mn-cs"/>
+              </a:rPr>
+              <a:t>браузерным</a:t>
+            </a:r>
+            <a:r>
+              <a:rPr lang="ru-RU" sz="1200" kern="1200" dirty="0" smtClean="0">
+                <a:solidFill>
+                  <a:schemeClr val="tx1"/>
+                </a:solidFill>
+                <a:effectLst/>
+                <a:latin typeface="+mn-lt"/>
+                <a:ea typeface="+mn-ea"/>
+                <a:cs typeface="+mn-cs"/>
+              </a:rPr>
+              <a:t> расширением.</a:t>
+            </a:r>
+          </a:p>
+          <a:p>
+            <a:r>
+              <a:rPr lang="ru-RU" sz="1200" kern="1200" dirty="0" smtClean="0">
+                <a:solidFill>
+                  <a:schemeClr val="tx1"/>
+                </a:solidFill>
+                <a:effectLst/>
+                <a:latin typeface="+mn-lt"/>
+                <a:ea typeface="+mn-ea"/>
+                <a:cs typeface="+mn-cs"/>
+              </a:rPr>
+              <a:t>Веб3 провайдер </a:t>
+            </a:r>
+            <a:r>
+              <a:rPr lang="en-US" sz="1200" kern="1200" dirty="0" smtClean="0">
+                <a:solidFill>
+                  <a:schemeClr val="tx1"/>
+                </a:solidFill>
+                <a:effectLst/>
+                <a:latin typeface="+mn-lt"/>
+                <a:ea typeface="+mn-ea"/>
+                <a:cs typeface="+mn-cs"/>
+              </a:rPr>
+              <a:t>MetaMask </a:t>
+            </a:r>
+            <a:r>
+              <a:rPr lang="ru-RU" sz="1200" kern="1200" dirty="0" smtClean="0">
+                <a:solidFill>
+                  <a:schemeClr val="tx1"/>
+                </a:solidFill>
+                <a:effectLst/>
+                <a:latin typeface="+mn-lt"/>
+                <a:ea typeface="+mn-ea"/>
+                <a:cs typeface="+mn-cs"/>
+              </a:rPr>
+              <a:t>– узел сети, к которому подключается веб-интерфейс для авторизации и взаимодействия с блокчейном.</a:t>
+            </a:r>
+          </a:p>
+          <a:p>
+            <a:r>
+              <a:rPr lang="ru-RU" sz="1200" kern="1200" dirty="0" smtClean="0">
+                <a:solidFill>
+                  <a:schemeClr val="tx1"/>
+                </a:solidFill>
+                <a:effectLst/>
+                <a:latin typeface="+mn-lt"/>
+                <a:ea typeface="+mn-ea"/>
+                <a:cs typeface="+mn-cs"/>
+              </a:rPr>
+              <a:t>Веб-сервер обрабатывает логику приложения, определенную в смарт-контрактах. Также на веб-сервере собирает данные о голосованиях из блокчейна и записывает в него данные о </a:t>
+            </a:r>
+            <a:r>
+              <a:rPr lang="ru-RU" sz="1200" kern="1200" dirty="0" err="1" smtClean="0">
+                <a:solidFill>
+                  <a:schemeClr val="tx1"/>
+                </a:solidFill>
+                <a:effectLst/>
+                <a:latin typeface="+mn-lt"/>
+                <a:ea typeface="+mn-ea"/>
+                <a:cs typeface="+mn-cs"/>
+              </a:rPr>
+              <a:t>созданых</a:t>
+            </a:r>
+            <a:r>
+              <a:rPr lang="ru-RU" sz="1200" kern="1200" dirty="0" smtClean="0">
+                <a:solidFill>
+                  <a:schemeClr val="tx1"/>
+                </a:solidFill>
+                <a:effectLst/>
+                <a:latin typeface="+mn-lt"/>
+                <a:ea typeface="+mn-ea"/>
+                <a:cs typeface="+mn-cs"/>
+              </a:rPr>
+              <a:t> голосованиях. Для данного взаимодействия необходим «серверный» веб3 провайдер </a:t>
+            </a:r>
+            <a:r>
+              <a:rPr lang="en-US" sz="1200" kern="1200" dirty="0" smtClean="0">
+                <a:solidFill>
+                  <a:schemeClr val="tx1"/>
+                </a:solidFill>
+                <a:effectLst/>
+                <a:latin typeface="+mn-lt"/>
+                <a:ea typeface="+mn-ea"/>
+                <a:cs typeface="+mn-cs"/>
+              </a:rPr>
+              <a:t>Alchemy.</a:t>
+            </a:r>
+            <a:endParaRPr lang="ru-RU" sz="1200" kern="1200" dirty="0" smtClean="0">
+              <a:solidFill>
+                <a:schemeClr val="tx1"/>
+              </a:solidFill>
+              <a:effectLst/>
+              <a:latin typeface="+mn-lt"/>
+              <a:ea typeface="+mn-ea"/>
+              <a:cs typeface="+mn-cs"/>
+            </a:endParaRPr>
+          </a:p>
+          <a:p>
+            <a:r>
+              <a:rPr lang="ru-RU" sz="1200" kern="1200" dirty="0" smtClean="0">
+                <a:solidFill>
+                  <a:schemeClr val="tx1"/>
+                </a:solidFill>
+                <a:effectLst/>
+                <a:latin typeface="+mn-lt"/>
+                <a:ea typeface="+mn-ea"/>
+                <a:cs typeface="+mn-cs"/>
+              </a:rPr>
+              <a:t>Веб3 провайдер </a:t>
+            </a:r>
+            <a:r>
+              <a:rPr lang="en-US" sz="1200" kern="1200" dirty="0" smtClean="0">
+                <a:solidFill>
+                  <a:schemeClr val="tx1"/>
+                </a:solidFill>
+                <a:effectLst/>
+                <a:latin typeface="+mn-lt"/>
+                <a:ea typeface="+mn-ea"/>
+                <a:cs typeface="+mn-cs"/>
+              </a:rPr>
+              <a:t>Alchemy</a:t>
+            </a:r>
+            <a:r>
+              <a:rPr lang="ru-RU" sz="1200" kern="1200" dirty="0" smtClean="0">
+                <a:solidFill>
+                  <a:schemeClr val="tx1"/>
+                </a:solidFill>
+                <a:effectLst/>
+                <a:latin typeface="+mn-lt"/>
+                <a:ea typeface="+mn-ea"/>
+                <a:cs typeface="+mn-cs"/>
+              </a:rPr>
+              <a:t> – узел сети, к которому подключается веб-сервер для взаимодействия с блокчейном и смарт-контрактами.</a:t>
+            </a:r>
+            <a:endParaRPr lang="ru-RU" dirty="0" smtClean="0"/>
+          </a:p>
+          <a:p>
+            <a:r>
+              <a:rPr lang="ru-RU" dirty="0" smtClean="0"/>
+              <a:t>Блокчейн</a:t>
+            </a:r>
+            <a:r>
+              <a:rPr lang="ru-RU" baseline="0" dirty="0" smtClean="0"/>
+              <a:t> </a:t>
+            </a:r>
+            <a:r>
+              <a:rPr lang="en-US" baseline="0" dirty="0" smtClean="0"/>
+              <a:t>Ethereum</a:t>
+            </a:r>
+            <a:r>
+              <a:rPr lang="ru-RU" baseline="0" dirty="0" smtClean="0"/>
+              <a:t>, в котором хранятся смарт-контракты голосования.</a:t>
+            </a:r>
+          </a:p>
+          <a:p>
+            <a:endParaRPr lang="ru-RU" dirty="0"/>
+          </a:p>
+        </p:txBody>
+      </p:sp>
+      <p:sp>
+        <p:nvSpPr>
+          <p:cNvPr id="4" name="Номер слайда 3"/>
+          <p:cNvSpPr>
+            <a:spLocks noGrp="1"/>
+          </p:cNvSpPr>
+          <p:nvPr>
+            <p:ph type="sldNum" sz="quarter" idx="10"/>
+          </p:nvPr>
+        </p:nvSpPr>
+        <p:spPr/>
+        <p:txBody>
+          <a:bodyPr/>
+          <a:lstStyle/>
+          <a:p>
+            <a:fld id="{BEC7A95C-97CA-431A-AE49-B22A2B1CD0AD}" type="slidenum">
+              <a:rPr lang="ru-RU" smtClean="0"/>
+              <a:t>8</a:t>
+            </a:fld>
+            <a:endParaRPr lang="ru-RU"/>
+          </a:p>
+        </p:txBody>
+      </p:sp>
+    </p:spTree>
+    <p:extLst>
+      <p:ext uri="{BB962C8B-B14F-4D97-AF65-F5344CB8AC3E}">
+        <p14:creationId xmlns:p14="http://schemas.microsoft.com/office/powerpoint/2010/main" val="92007959"/>
+      </p:ext>
+    </p:extLst>
+  </p:cSld>
+  <p:clrMapOvr>
+    <a:masterClrMapping/>
+  </p:clrMapOvr>
+</p:notes>
+</file>
+
+<file path=ppt/notesSlides/notesSlide9.xml><?xml version="1.0" encoding="utf-8"?>
+<p:notes xmlns:a="http://schemas.openxmlformats.org/drawingml/2006/main" xmlns:r="http://schemas.openxmlformats.org/officeDocument/2006/relationships" xmlns:p="http://schemas.openxmlformats.org/presentationml/2006/main">
+  <p:cSld>
+    <p:spTree>
+      <p:nvGrpSpPr>
+        <p:cNvPr id="1" name=""/>
+        <p:cNvGrpSpPr/>
+        <p:nvPr/>
+      </p:nvGrpSpPr>
+      <p:grpSpPr>
+        <a:xfrm>
+          <a:off x="0" y="0"/>
+          <a:ext cx="0" cy="0"/>
+          <a:chOff x="0" y="0"/>
+          <a:chExt cx="0" cy="0"/>
+        </a:xfrm>
+      </p:grpSpPr>
+      <p:sp>
+        <p:nvSpPr>
+          <p:cNvPr id="2" name="Образ слайда 1"/>
+          <p:cNvSpPr>
+            <a:spLocks noGrp="1" noRot="1" noChangeAspect="1"/>
+          </p:cNvSpPr>
+          <p:nvPr>
+            <p:ph type="sldImg"/>
+          </p:nvPr>
+        </p:nvSpPr>
+        <p:spPr/>
+      </p:sp>
+      <p:sp>
+        <p:nvSpPr>
+          <p:cNvPr id="3" name="Заметки 2"/>
+          <p:cNvSpPr>
+            <a:spLocks noGrp="1"/>
+          </p:cNvSpPr>
+          <p:nvPr>
+            <p:ph type="body" idx="1"/>
+          </p:nvPr>
+        </p:nvSpPr>
+        <p:spPr/>
+        <p:txBody>
+          <a:bodyPr/>
+          <a:lstStyle/>
+          <a:p>
+            <a:r>
+              <a:rPr lang="ru-RU" dirty="0" smtClean="0"/>
+              <a:t>Диаграмма</a:t>
+            </a:r>
+            <a:r>
+              <a:rPr lang="ru-RU" baseline="0" dirty="0" smtClean="0"/>
+              <a:t> смарт-контрактов, которые хранятся в блокчейне состоит из следующих частей.</a:t>
+            </a:r>
+          </a:p>
+          <a:p>
+            <a:r>
+              <a:rPr lang="ru-RU" sz="1200" kern="1200" dirty="0" smtClean="0">
+                <a:solidFill>
+                  <a:schemeClr val="tx1"/>
+                </a:solidFill>
+                <a:effectLst/>
+                <a:latin typeface="+mn-lt"/>
+                <a:ea typeface="+mn-ea"/>
+                <a:cs typeface="+mn-cs"/>
+              </a:rPr>
+              <a:t>В управляющем смарт-контракте </a:t>
+            </a:r>
+            <a:r>
+              <a:rPr lang="en-US" sz="1200" kern="1200" dirty="0" err="1" smtClean="0">
+                <a:solidFill>
+                  <a:schemeClr val="tx1"/>
+                </a:solidFill>
+                <a:effectLst/>
+                <a:latin typeface="+mn-lt"/>
+                <a:ea typeface="+mn-ea"/>
+                <a:cs typeface="+mn-cs"/>
+              </a:rPr>
+              <a:t>EVotingManager</a:t>
+            </a:r>
+            <a:r>
+              <a:rPr lang="ru-RU" sz="1200" kern="1200" dirty="0" smtClean="0">
+                <a:solidFill>
+                  <a:schemeClr val="tx1"/>
+                </a:solidFill>
+                <a:effectLst/>
+                <a:latin typeface="+mn-lt"/>
+                <a:ea typeface="+mn-ea"/>
+                <a:cs typeface="+mn-cs"/>
+              </a:rPr>
+              <a:t> хранятся публичные ключи всех созданных смарт-контрактов голосований.</a:t>
+            </a:r>
+          </a:p>
+          <a:p>
+            <a:pPr marL="0" marR="0" lvl="0" indent="0" algn="l" defTabSz="914400" rtl="0" eaLnBrk="1" fontAlgn="auto" latinLnBrk="0" hangingPunct="1">
+              <a:lnSpc>
+                <a:spcPct val="100000"/>
+              </a:lnSpc>
+              <a:spcBef>
+                <a:spcPts val="0"/>
+              </a:spcBef>
+              <a:spcAft>
+                <a:spcPts val="0"/>
+              </a:spcAft>
+              <a:buClrTx/>
+              <a:buSzTx/>
+              <a:buFontTx/>
+              <a:buNone/>
+              <a:tabLst/>
+              <a:defRPr/>
+            </a:pPr>
+            <a:r>
+              <a:rPr lang="ru-RU" sz="1200" kern="1200" dirty="0" smtClean="0">
+                <a:solidFill>
+                  <a:schemeClr val="tx1"/>
+                </a:solidFill>
+                <a:effectLst/>
+                <a:latin typeface="+mn-lt"/>
+                <a:ea typeface="+mn-ea"/>
+                <a:cs typeface="+mn-cs"/>
+              </a:rPr>
+              <a:t>Программная логика каждого голосования находится в смарт-контракте для голосования </a:t>
+            </a:r>
+            <a:r>
+              <a:rPr lang="en-US" sz="1200" kern="1200" dirty="0" smtClean="0">
+                <a:solidFill>
+                  <a:schemeClr val="tx1"/>
+                </a:solidFill>
+                <a:effectLst/>
+                <a:latin typeface="+mn-lt"/>
+                <a:ea typeface="+mn-ea"/>
+                <a:cs typeface="+mn-cs"/>
+              </a:rPr>
+              <a:t>EVoting</a:t>
+            </a:r>
+            <a:r>
+              <a:rPr lang="ru-RU" sz="1200" kern="1200" dirty="0" smtClean="0">
+                <a:solidFill>
+                  <a:schemeClr val="tx1"/>
+                </a:solidFill>
+                <a:effectLst/>
+                <a:latin typeface="+mn-lt"/>
+                <a:ea typeface="+mn-ea"/>
+                <a:cs typeface="+mn-cs"/>
+              </a:rPr>
+              <a:t>. Данный смарт-контракт содержит поля, определяющие голосование: его название, дату и время начала и окончания, список публичных ключей избирателей, список вариантов ответов. За начисление голоса конкретному выбору избирателя отвечает метод </a:t>
+            </a:r>
+            <a:r>
+              <a:rPr lang="en-US" sz="1200" kern="1200" dirty="0" smtClean="0">
+                <a:solidFill>
+                  <a:schemeClr val="tx1"/>
+                </a:solidFill>
+                <a:effectLst/>
+                <a:latin typeface="+mn-lt"/>
+                <a:ea typeface="+mn-ea"/>
+                <a:cs typeface="+mn-cs"/>
+              </a:rPr>
+              <a:t>vote</a:t>
+            </a:r>
+            <a:r>
+              <a:rPr lang="ru-RU" sz="1200" kern="1200" dirty="0" smtClean="0">
+                <a:solidFill>
+                  <a:schemeClr val="tx1"/>
+                </a:solidFill>
+                <a:effectLst/>
+                <a:latin typeface="+mn-lt"/>
+                <a:ea typeface="+mn-ea"/>
+                <a:cs typeface="+mn-cs"/>
+              </a:rPr>
+              <a:t>. Для подсчета голосов представлен метод </a:t>
+            </a:r>
+            <a:r>
+              <a:rPr lang="en-US" sz="1200" kern="1200" dirty="0" err="1" smtClean="0">
+                <a:solidFill>
+                  <a:schemeClr val="tx1"/>
+                </a:solidFill>
+                <a:effectLst/>
+                <a:latin typeface="+mn-lt"/>
+                <a:ea typeface="+mn-ea"/>
+                <a:cs typeface="+mn-cs"/>
+              </a:rPr>
+              <a:t>totalVotesFor</a:t>
+            </a:r>
+            <a:r>
+              <a:rPr lang="ru-RU" sz="1200" kern="1200" dirty="0" smtClean="0">
+                <a:solidFill>
+                  <a:schemeClr val="tx1"/>
+                </a:solidFill>
+                <a:effectLst/>
+                <a:latin typeface="+mn-lt"/>
+                <a:ea typeface="+mn-ea"/>
+                <a:cs typeface="+mn-cs"/>
+              </a:rPr>
+              <a:t>.</a:t>
+            </a:r>
+          </a:p>
+          <a:p>
+            <a:r>
+              <a:rPr lang="ru-RU" sz="1200" kern="1200" dirty="0" smtClean="0">
+                <a:solidFill>
+                  <a:schemeClr val="tx1"/>
+                </a:solidFill>
+                <a:effectLst/>
+                <a:latin typeface="+mn-lt"/>
+                <a:ea typeface="+mn-ea"/>
+                <a:cs typeface="+mn-cs"/>
+              </a:rPr>
+              <a:t>В голосованиях используется токен </a:t>
+            </a:r>
+            <a:r>
+              <a:rPr lang="en-US" sz="1200" kern="1200" dirty="0" err="1" smtClean="0">
+                <a:solidFill>
+                  <a:schemeClr val="tx1"/>
+                </a:solidFill>
+                <a:effectLst/>
+                <a:latin typeface="+mn-lt"/>
+                <a:ea typeface="+mn-ea"/>
+                <a:cs typeface="+mn-cs"/>
+              </a:rPr>
+              <a:t>EVotingToken</a:t>
+            </a:r>
+            <a:r>
+              <a:rPr lang="ru-RU" sz="1200" kern="1200" dirty="0" smtClean="0">
+                <a:solidFill>
+                  <a:schemeClr val="tx1"/>
+                </a:solidFill>
+                <a:effectLst/>
+                <a:latin typeface="+mn-lt"/>
+                <a:ea typeface="+mn-ea"/>
+                <a:cs typeface="+mn-cs"/>
+              </a:rPr>
+              <a:t>, который отвечает за начисление токена избирателю на адрес кошелька и перевод этого токена на адрес кошелька кандидата. </a:t>
+            </a:r>
+            <a:endParaRPr lang="ru-RU" dirty="0"/>
+          </a:p>
+        </p:txBody>
+      </p:sp>
+      <p:sp>
+        <p:nvSpPr>
+          <p:cNvPr id="4" name="Номер слайда 3"/>
+          <p:cNvSpPr>
+            <a:spLocks noGrp="1"/>
+          </p:cNvSpPr>
+          <p:nvPr>
+            <p:ph type="sldNum" sz="quarter" idx="10"/>
+          </p:nvPr>
+        </p:nvSpPr>
+        <p:spPr/>
+        <p:txBody>
+          <a:bodyPr/>
+          <a:lstStyle/>
+          <a:p>
+            <a:fld id="{BEC7A95C-97CA-431A-AE49-B22A2B1CD0AD}" type="slidenum">
+              <a:rPr lang="ru-RU" smtClean="0"/>
+              <a:t>9</a:t>
+            </a:fld>
+            <a:endParaRPr lang="ru-RU"/>
+          </a:p>
+        </p:txBody>
+      </p:sp>
+    </p:spTree>
+    <p:extLst>
+      <p:ext uri="{BB962C8B-B14F-4D97-AF65-F5344CB8AC3E}">
+        <p14:creationId xmlns:p14="http://schemas.microsoft.com/office/powerpoint/2010/main" val="656319083"/>
       </p:ext>
     </p:extLst>
   </p:cSld>
@@ -971,7 +3580,7 @@
           <a:p>
             <a:fld id="{9D1E7A46-1A4E-41C3-B23B-1269BF8B1FAC}" type="datetimeFigureOut">
               <a:rPr lang="ru-RU" smtClean="0"/>
-              <a:t>29.05.2023</a:t>
+              <a:t>30.05.2023</a:t>
             </a:fld>
             <a:endParaRPr lang="ru-RU"/>
           </a:p>
@@ -1141,7 +3750,7 @@
           <a:p>
             <a:fld id="{9D1E7A46-1A4E-41C3-B23B-1269BF8B1FAC}" type="datetimeFigureOut">
               <a:rPr lang="ru-RU" smtClean="0"/>
-              <a:t>29.05.2023</a:t>
+              <a:t>30.05.2023</a:t>
             </a:fld>
             <a:endParaRPr lang="ru-RU"/>
           </a:p>
@@ -1321,7 +3930,7 @@
           <a:p>
             <a:fld id="{9D1E7A46-1A4E-41C3-B23B-1269BF8B1FAC}" type="datetimeFigureOut">
               <a:rPr lang="ru-RU" smtClean="0"/>
-              <a:t>29.05.2023</a:t>
+              <a:t>30.05.2023</a:t>
             </a:fld>
             <a:endParaRPr lang="ru-RU"/>
           </a:p>
@@ -1491,7 +4100,7 @@
           <a:p>
             <a:fld id="{9D1E7A46-1A4E-41C3-B23B-1269BF8B1FAC}" type="datetimeFigureOut">
               <a:rPr lang="ru-RU" smtClean="0"/>
-              <a:t>29.05.2023</a:t>
+              <a:t>30.05.2023</a:t>
             </a:fld>
             <a:endParaRPr lang="ru-RU"/>
           </a:p>
@@ -1735,7 +4344,7 @@
           <a:p>
             <a:fld id="{9D1E7A46-1A4E-41C3-B23B-1269BF8B1FAC}" type="datetimeFigureOut">
               <a:rPr lang="ru-RU" smtClean="0"/>
-              <a:t>29.05.2023</a:t>
+              <a:t>30.05.2023</a:t>
             </a:fld>
             <a:endParaRPr lang="ru-RU"/>
           </a:p>
@@ -1967,7 +4576,7 @@
           <a:p>
             <a:fld id="{9D1E7A46-1A4E-41C3-B23B-1269BF8B1FAC}" type="datetimeFigureOut">
               <a:rPr lang="ru-RU" smtClean="0"/>
-              <a:t>29.05.2023</a:t>
+              <a:t>30.05.2023</a:t>
             </a:fld>
             <a:endParaRPr lang="ru-RU"/>
           </a:p>
@@ -2334,7 +4943,7 @@
           <a:p>
             <a:fld id="{9D1E7A46-1A4E-41C3-B23B-1269BF8B1FAC}" type="datetimeFigureOut">
               <a:rPr lang="ru-RU" smtClean="0"/>
-              <a:t>29.05.2023</a:t>
+              <a:t>30.05.2023</a:t>
             </a:fld>
             <a:endParaRPr lang="ru-RU"/>
           </a:p>
@@ -2452,7 +5061,7 @@
           <a:p>
             <a:fld id="{9D1E7A46-1A4E-41C3-B23B-1269BF8B1FAC}" type="datetimeFigureOut">
               <a:rPr lang="ru-RU" smtClean="0"/>
-              <a:t>29.05.2023</a:t>
+              <a:t>30.05.2023</a:t>
             </a:fld>
             <a:endParaRPr lang="ru-RU"/>
           </a:p>
@@ -2547,7 +5156,7 @@
           <a:p>
             <a:fld id="{9D1E7A46-1A4E-41C3-B23B-1269BF8B1FAC}" type="datetimeFigureOut">
               <a:rPr lang="ru-RU" smtClean="0"/>
-              <a:t>29.05.2023</a:t>
+              <a:t>30.05.2023</a:t>
             </a:fld>
             <a:endParaRPr lang="ru-RU"/>
           </a:p>
@@ -2824,7 +5433,7 @@
           <a:p>
             <a:fld id="{9D1E7A46-1A4E-41C3-B23B-1269BF8B1FAC}" type="datetimeFigureOut">
               <a:rPr lang="ru-RU" smtClean="0"/>
-              <a:t>29.05.2023</a:t>
+              <a:t>30.05.2023</a:t>
             </a:fld>
             <a:endParaRPr lang="ru-RU"/>
           </a:p>
@@ -3081,7 +5690,7 @@
           <a:p>
             <a:fld id="{9D1E7A46-1A4E-41C3-B23B-1269BF8B1FAC}" type="datetimeFigureOut">
               <a:rPr lang="ru-RU" smtClean="0"/>
-              <a:t>29.05.2023</a:t>
+              <a:t>30.05.2023</a:t>
             </a:fld>
             <a:endParaRPr lang="ru-RU"/>
           </a:p>
@@ -3294,7 +5903,7 @@
           <a:p>
             <a:fld id="{9D1E7A46-1A4E-41C3-B23B-1269BF8B1FAC}" type="datetimeFigureOut">
               <a:rPr lang="ru-RU" smtClean="0"/>
-              <a:t>29.05.2023</a:t>
+              <a:t>30.05.2023</a:t>
             </a:fld>
             <a:endParaRPr lang="ru-RU"/>
           </a:p>
@@ -4112,7 +6721,7 @@
           </p:nvPr>
         </p:nvPicPr>
         <p:blipFill>
-          <a:blip r:embed="rId2">
+          <a:blip r:embed="rId3">
             <a:extLst>
               <a:ext uri="{28A0092B-C50C-407E-A947-70E740481C1C}">
                 <a14:useLocalDpi xmlns:a14="http://schemas.microsoft.com/office/drawing/2010/main" val="0"/>
@@ -4143,7 +6752,7 @@
           <p:cNvPr id="4" name="TextBox 5">
             <a:extLst>
               <a:ext uri="{FF2B5EF4-FFF2-40B4-BE49-F238E27FC236}">
-                <a16:creationId xmlns:a16="http://schemas.microsoft.com/office/drawing/2014/main" xmlns="" xmlns:lc="http://schemas.openxmlformats.org/drawingml/2006/lockedCanvas" id="{F7043567-4147-88C3-F094-05513D23DB95}"/>
+                <a16:creationId xmlns:lc="http://schemas.openxmlformats.org/drawingml/2006/lockedCanvas" xmlns="" xmlns:a16="http://schemas.microsoft.com/office/drawing/2014/main" id="{F7043567-4147-88C3-F094-05513D23DB95}"/>
               </a:ext>
             </a:extLst>
           </p:cNvPr>
@@ -4413,7 +7022,7 @@
           </p:nvPr>
         </p:nvPicPr>
         <p:blipFill>
-          <a:blip r:embed="rId2">
+          <a:blip r:embed="rId3">
             <a:extLst>
               <a:ext uri="{28A0092B-C50C-407E-A947-70E740481C1C}">
                 <a14:useLocalDpi xmlns:a14="http://schemas.microsoft.com/office/drawing/2010/main" val="0"/>
@@ -4444,7 +7053,7 @@
           <p:cNvPr id="4" name="TextBox 5">
             <a:extLst>
               <a:ext uri="{FF2B5EF4-FFF2-40B4-BE49-F238E27FC236}">
-                <a16:creationId xmlns:a16="http://schemas.microsoft.com/office/drawing/2014/main" xmlns="" xmlns:lc="http://schemas.openxmlformats.org/drawingml/2006/lockedCanvas" id="{F7043567-4147-88C3-F094-05513D23DB95}"/>
+                <a16:creationId xmlns:lc="http://schemas.openxmlformats.org/drawingml/2006/lockedCanvas" xmlns="" xmlns:a16="http://schemas.microsoft.com/office/drawing/2014/main" id="{F7043567-4147-88C3-F094-05513D23DB95}"/>
               </a:ext>
             </a:extLst>
           </p:cNvPr>
@@ -5190,7 +7799,7 @@
           <p:cNvPr id="5" name="TextBox 5">
             <a:extLst>
               <a:ext uri="{FF2B5EF4-FFF2-40B4-BE49-F238E27FC236}">
-                <a16:creationId xmlns:a16="http://schemas.microsoft.com/office/drawing/2014/main" xmlns="" xmlns:lc="http://schemas.openxmlformats.org/drawingml/2006/lockedCanvas" id="{F7043567-4147-88C3-F094-05513D23DB95}"/>
+                <a16:creationId xmlns:lc="http://schemas.openxmlformats.org/drawingml/2006/lockedCanvas" xmlns="" xmlns:a16="http://schemas.microsoft.com/office/drawing/2014/main" id="{F7043567-4147-88C3-F094-05513D23DB95}"/>
               </a:ext>
             </a:extLst>
           </p:cNvPr>
@@ -5465,7 +8074,7 @@
           <p:cNvPr id="5" name="TextBox 5">
             <a:extLst>
               <a:ext uri="{FF2B5EF4-FFF2-40B4-BE49-F238E27FC236}">
-                <a16:creationId xmlns:a16="http://schemas.microsoft.com/office/drawing/2014/main" xmlns="" xmlns:lc="http://schemas.openxmlformats.org/drawingml/2006/lockedCanvas" id="{F7043567-4147-88C3-F094-05513D23DB95}"/>
+                <a16:creationId xmlns:lc="http://schemas.openxmlformats.org/drawingml/2006/lockedCanvas" xmlns="" xmlns:a16="http://schemas.microsoft.com/office/drawing/2014/main" id="{F7043567-4147-88C3-F094-05513D23DB95}"/>
               </a:ext>
             </a:extLst>
           </p:cNvPr>
@@ -5665,7 +8274,7 @@
           </p:nvPr>
         </p:nvPicPr>
         <p:blipFill>
-          <a:blip r:embed="rId2"/>
+          <a:blip r:embed="rId3"/>
           <a:stretch>
             <a:fillRect/>
           </a:stretch>
@@ -5766,7 +8375,7 @@
           </p:nvPr>
         </p:nvPicPr>
         <p:blipFill>
-          <a:blip r:embed="rId2">
+          <a:blip r:embed="rId3">
             <a:extLst>
               <a:ext uri="{28A0092B-C50C-407E-A947-70E740481C1C}">
                 <a14:useLocalDpi xmlns:a14="http://schemas.microsoft.com/office/drawing/2010/main" val="0"/>
@@ -5801,7 +8410,7 @@
           <p:nvPr/>
         </p:nvPicPr>
         <p:blipFill>
-          <a:blip r:embed="rId3">
+          <a:blip r:embed="rId4">
             <a:extLst>
               <a:ext uri="{28A0092B-C50C-407E-A947-70E740481C1C}">
                 <a14:useLocalDpi xmlns:a14="http://schemas.microsoft.com/office/drawing/2010/main" val="0"/>
@@ -5834,7 +8443,7 @@
           <p:cNvPr id="7" name="TextBox 5">
             <a:extLst>
               <a:ext uri="{FF2B5EF4-FFF2-40B4-BE49-F238E27FC236}">
-                <a16:creationId xmlns:a16="http://schemas.microsoft.com/office/drawing/2014/main" xmlns="" xmlns:lc="http://schemas.openxmlformats.org/drawingml/2006/lockedCanvas" id="{F7043567-4147-88C3-F094-05513D23DB95}"/>
+                <a16:creationId xmlns:lc="http://schemas.openxmlformats.org/drawingml/2006/lockedCanvas" xmlns="" xmlns:a16="http://schemas.microsoft.com/office/drawing/2014/main" id="{F7043567-4147-88C3-F094-05513D23DB95}"/>
               </a:ext>
             </a:extLst>
           </p:cNvPr>
@@ -6104,7 +8713,7 @@
           </p:nvPr>
         </p:nvPicPr>
         <p:blipFill>
-          <a:blip r:embed="rId2"/>
+          <a:blip r:embed="rId3"/>
           <a:stretch>
             <a:fillRect/>
           </a:stretch>
@@ -6129,7 +8738,7 @@
           <p:cNvPr id="4" name="TextBox 5">
             <a:extLst>
               <a:ext uri="{FF2B5EF4-FFF2-40B4-BE49-F238E27FC236}">
-                <a16:creationId xmlns:a16="http://schemas.microsoft.com/office/drawing/2014/main" xmlns="" xmlns:lc="http://schemas.openxmlformats.org/drawingml/2006/lockedCanvas" id="{F7043567-4147-88C3-F094-05513D23DB95}"/>
+                <a16:creationId xmlns:lc="http://schemas.openxmlformats.org/drawingml/2006/lockedCanvas" xmlns="" xmlns:a16="http://schemas.microsoft.com/office/drawing/2014/main" id="{F7043567-4147-88C3-F094-05513D23DB95}"/>
               </a:ext>
             </a:extLst>
           </p:cNvPr>
@@ -6399,7 +9008,7 @@
           </p:nvPr>
         </p:nvPicPr>
         <p:blipFill>
-          <a:blip r:embed="rId2"/>
+          <a:blip r:embed="rId3"/>
           <a:stretch>
             <a:fillRect/>
           </a:stretch>
@@ -6424,7 +9033,7 @@
           <p:cNvPr id="4" name="TextBox 5">
             <a:extLst>
               <a:ext uri="{FF2B5EF4-FFF2-40B4-BE49-F238E27FC236}">
-                <a16:creationId xmlns:a16="http://schemas.microsoft.com/office/drawing/2014/main" xmlns="" xmlns:lc="http://schemas.openxmlformats.org/drawingml/2006/lockedCanvas" id="{F7043567-4147-88C3-F094-05513D23DB95}"/>
+                <a16:creationId xmlns:lc="http://schemas.openxmlformats.org/drawingml/2006/lockedCanvas" xmlns="" xmlns:a16="http://schemas.microsoft.com/office/drawing/2014/main" id="{F7043567-4147-88C3-F094-05513D23DB95}"/>
               </a:ext>
             </a:extLst>
           </p:cNvPr>
@@ -6818,7 +9427,7 @@
           <p:cNvPr id="4" name="TextBox 5">
             <a:extLst>
               <a:ext uri="{FF2B5EF4-FFF2-40B4-BE49-F238E27FC236}">
-                <a16:creationId xmlns:a16="http://schemas.microsoft.com/office/drawing/2014/main" xmlns="" xmlns:lc="http://schemas.openxmlformats.org/drawingml/2006/lockedCanvas" id="{F7043567-4147-88C3-F094-05513D23DB95}"/>
+                <a16:creationId xmlns:lc="http://schemas.openxmlformats.org/drawingml/2006/lockedCanvas" xmlns="" xmlns:a16="http://schemas.microsoft.com/office/drawing/2014/main" id="{F7043567-4147-88C3-F094-05513D23DB95}"/>
               </a:ext>
             </a:extLst>
           </p:cNvPr>
@@ -7223,7 +9832,7 @@
           <p:cNvPr id="4" name="TextBox 5">
             <a:extLst>
               <a:ext uri="{FF2B5EF4-FFF2-40B4-BE49-F238E27FC236}">
-                <a16:creationId xmlns:a16="http://schemas.microsoft.com/office/drawing/2014/main" xmlns="" xmlns:lc="http://schemas.openxmlformats.org/drawingml/2006/lockedCanvas" id="{F7043567-4147-88C3-F094-05513D23DB95}"/>
+                <a16:creationId xmlns:lc="http://schemas.openxmlformats.org/drawingml/2006/lockedCanvas" xmlns="" xmlns:a16="http://schemas.microsoft.com/office/drawing/2014/main" id="{F7043567-4147-88C3-F094-05513D23DB95}"/>
               </a:ext>
             </a:extLst>
           </p:cNvPr>
@@ -7600,7 +10209,7 @@
           <p:cNvPr id="5" name="TextBox 5">
             <a:extLst>
               <a:ext uri="{FF2B5EF4-FFF2-40B4-BE49-F238E27FC236}">
-                <a16:creationId xmlns:a16="http://schemas.microsoft.com/office/drawing/2014/main" xmlns="" xmlns:lc="http://schemas.openxmlformats.org/drawingml/2006/lockedCanvas" id="{F7043567-4147-88C3-F094-05513D23DB95}"/>
+                <a16:creationId xmlns:lc="http://schemas.openxmlformats.org/drawingml/2006/lockedCanvas" xmlns="" xmlns:a16="http://schemas.microsoft.com/office/drawing/2014/main" id="{F7043567-4147-88C3-F094-05513D23DB95}"/>
               </a:ext>
             </a:extLst>
           </p:cNvPr>
@@ -8159,7 +10768,7 @@
           <p:cNvPr id="4" name="TextBox 5">
             <a:extLst>
               <a:ext uri="{FF2B5EF4-FFF2-40B4-BE49-F238E27FC236}">
-                <a16:creationId xmlns:a16="http://schemas.microsoft.com/office/drawing/2014/main" xmlns="" xmlns:lc="http://schemas.openxmlformats.org/drawingml/2006/lockedCanvas" id="{F7043567-4147-88C3-F094-05513D23DB95}"/>
+                <a16:creationId xmlns:lc="http://schemas.openxmlformats.org/drawingml/2006/lockedCanvas" xmlns="" xmlns:a16="http://schemas.microsoft.com/office/drawing/2014/main" id="{F7043567-4147-88C3-F094-05513D23DB95}"/>
               </a:ext>
             </a:extLst>
           </p:cNvPr>
@@ -8452,7 +11061,7 @@
           <p:cNvPr id="8" name="TextBox 5">
             <a:extLst>
               <a:ext uri="{FF2B5EF4-FFF2-40B4-BE49-F238E27FC236}">
-                <a16:creationId xmlns:a16="http://schemas.microsoft.com/office/drawing/2014/main" xmlns="" xmlns:lc="http://schemas.openxmlformats.org/drawingml/2006/lockedCanvas" id="{F7043567-4147-88C3-F094-05513D23DB95}"/>
+                <a16:creationId xmlns:lc="http://schemas.openxmlformats.org/drawingml/2006/lockedCanvas" xmlns="" xmlns:a16="http://schemas.microsoft.com/office/drawing/2014/main" id="{F7043567-4147-88C3-F094-05513D23DB95}"/>
               </a:ext>
             </a:extLst>
           </p:cNvPr>
@@ -8722,7 +11331,7 @@
           </p:nvPr>
         </p:nvPicPr>
         <p:blipFill>
-          <a:blip r:embed="rId2"/>
+          <a:blip r:embed="rId3"/>
           <a:stretch>
             <a:fillRect/>
           </a:stretch>
@@ -8747,7 +11356,7 @@
           <p:cNvPr id="6" name="TextBox 5">
             <a:extLst>
               <a:ext uri="{FF2B5EF4-FFF2-40B4-BE49-F238E27FC236}">
-                <a16:creationId xmlns:a16="http://schemas.microsoft.com/office/drawing/2014/main" xmlns="" xmlns:lc="http://schemas.openxmlformats.org/drawingml/2006/lockedCanvas" id="{F7043567-4147-88C3-F094-05513D23DB95}"/>
+                <a16:creationId xmlns:lc="http://schemas.openxmlformats.org/drawingml/2006/lockedCanvas" xmlns="" xmlns:a16="http://schemas.microsoft.com/office/drawing/2014/main" id="{F7043567-4147-88C3-F094-05513D23DB95}"/>
               </a:ext>
             </a:extLst>
           </p:cNvPr>
@@ -9017,7 +11626,7 @@
           </p:nvPr>
         </p:nvPicPr>
         <p:blipFill>
-          <a:blip r:embed="rId2" cstate="print">
+          <a:blip r:embed="rId3" cstate="print">
             <a:extLst>
               <a:ext uri="{28A0092B-C50C-407E-A947-70E740481C1C}">
                 <a14:useLocalDpi xmlns:a14="http://schemas.microsoft.com/office/drawing/2010/main" val="0"/>
@@ -9050,7 +11659,7 @@
           <p:cNvPr id="6" name="TextBox 5">
             <a:extLst>
               <a:ext uri="{FF2B5EF4-FFF2-40B4-BE49-F238E27FC236}">
-                <a16:creationId xmlns:a16="http://schemas.microsoft.com/office/drawing/2014/main" xmlns="" xmlns:lc="http://schemas.openxmlformats.org/drawingml/2006/lockedCanvas" id="{F7043567-4147-88C3-F094-05513D23DB95}"/>
+                <a16:creationId xmlns:lc="http://schemas.openxmlformats.org/drawingml/2006/lockedCanvas" xmlns="" xmlns:a16="http://schemas.microsoft.com/office/drawing/2014/main" id="{F7043567-4147-88C3-F094-05513D23DB95}"/>
               </a:ext>
             </a:extLst>
           </p:cNvPr>
@@ -9320,7 +11929,7 @@
           </p:nvPr>
         </p:nvPicPr>
         <p:blipFill>
-          <a:blip r:embed="rId2">
+          <a:blip r:embed="rId3">
             <a:extLst>
               <a:ext uri="{28A0092B-C50C-407E-A947-70E740481C1C}">
                 <a14:useLocalDpi xmlns:a14="http://schemas.microsoft.com/office/drawing/2010/main" val="0"/>
@@ -9351,7 +11960,7 @@
           <p:cNvPr id="5" name="TextBox 5">
             <a:extLst>
               <a:ext uri="{FF2B5EF4-FFF2-40B4-BE49-F238E27FC236}">
-                <a16:creationId xmlns:a16="http://schemas.microsoft.com/office/drawing/2014/main" xmlns="" xmlns:lc="http://schemas.openxmlformats.org/drawingml/2006/lockedCanvas" id="{F7043567-4147-88C3-F094-05513D23DB95}"/>
+                <a16:creationId xmlns:lc="http://schemas.openxmlformats.org/drawingml/2006/lockedCanvas" xmlns="" xmlns:a16="http://schemas.microsoft.com/office/drawing/2014/main" id="{F7043567-4147-88C3-F094-05513D23DB95}"/>
               </a:ext>
             </a:extLst>
           </p:cNvPr>
@@ -9621,7 +12230,7 @@
           </p:nvPr>
         </p:nvPicPr>
         <p:blipFill>
-          <a:blip r:embed="rId2">
+          <a:blip r:embed="rId3">
             <a:extLst>
               <a:ext uri="{28A0092B-C50C-407E-A947-70E740481C1C}">
                 <a14:useLocalDpi xmlns:a14="http://schemas.microsoft.com/office/drawing/2010/main" val="0"/>
@@ -9652,7 +12261,7 @@
           <p:cNvPr id="4" name="TextBox 5">
             <a:extLst>
               <a:ext uri="{FF2B5EF4-FFF2-40B4-BE49-F238E27FC236}">
-                <a16:creationId xmlns:a16="http://schemas.microsoft.com/office/drawing/2014/main" xmlns="" xmlns:lc="http://schemas.openxmlformats.org/drawingml/2006/lockedCanvas" id="{F7043567-4147-88C3-F094-05513D23DB95}"/>
+                <a16:creationId xmlns:lc="http://schemas.openxmlformats.org/drawingml/2006/lockedCanvas" xmlns="" xmlns:a16="http://schemas.microsoft.com/office/drawing/2014/main" id="{F7043567-4147-88C3-F094-05513D23DB95}"/>
               </a:ext>
             </a:extLst>
           </p:cNvPr>
@@ -9922,7 +12531,7 @@
           </p:nvPr>
         </p:nvPicPr>
         <p:blipFill>
-          <a:blip r:embed="rId2">
+          <a:blip r:embed="rId3">
             <a:extLst>
               <a:ext uri="{28A0092B-C50C-407E-A947-70E740481C1C}">
                 <a14:useLocalDpi xmlns:a14="http://schemas.microsoft.com/office/drawing/2010/main" val="0"/>
@@ -9953,7 +12562,7 @@
           <p:cNvPr id="4" name="TextBox 5">
             <a:extLst>
               <a:ext uri="{FF2B5EF4-FFF2-40B4-BE49-F238E27FC236}">
-                <a16:creationId xmlns:a16="http://schemas.microsoft.com/office/drawing/2014/main" xmlns="" xmlns:lc="http://schemas.openxmlformats.org/drawingml/2006/lockedCanvas" id="{F7043567-4147-88C3-F094-05513D23DB95}"/>
+                <a16:creationId xmlns:lc="http://schemas.openxmlformats.org/drawingml/2006/lockedCanvas" xmlns="" xmlns:a16="http://schemas.microsoft.com/office/drawing/2014/main" id="{F7043567-4147-88C3-F094-05513D23DB95}"/>
               </a:ext>
             </a:extLst>
           </p:cNvPr>

</xml_diff>